<commit_message>
Changeings in "Projektauftrag" + "Arbeitspakete"
</commit_message>
<xml_diff>
--- a/documents/projectmanagement/Planung/Arbeitspakete.pptx
+++ b/documents/projectmanagement/Planung/Arbeitspakete.pptx
@@ -114,6 +114,11 @@
       </a:defRPr>
     </a:lvl9pPr>
   </p:defaultTextStyle>
+  <p:extLst>
+    <p:ext uri="{EFAFB233-063F-42B5-8137-9DF3F51BA10A}">
+      <p15:sldGuideLst xmlns:p15="http://schemas.microsoft.com/office/powerpoint/2012/main"/>
+    </p:ext>
+  </p:extLst>
 </p:presentation>
 </file>
 
@@ -9942,87 +9947,87 @@
     </dgm:pt>
   </dgm:ptLst>
   <dgm:cxnLst>
+    <dgm:cxn modelId="{F96BCFEA-8F2A-4C66-8A60-5697CE214617}" srcId="{D5B0C5AB-1A0C-4FBB-B5C8-1AED8427A126}" destId="{82A1462A-81AD-42C2-90BF-5468391F2673}" srcOrd="0" destOrd="0" parTransId="{9E152079-0AA9-4500-B4E4-C34714BF433E}" sibTransId="{047A6A53-FB6B-4C34-8D58-E7412702AAC8}"/>
+    <dgm:cxn modelId="{DED4B206-769C-43BF-BBB5-4BBA8370C97A}" type="presOf" srcId="{695B9890-A0B3-4D1F-B5C8-EFB002240621}" destId="{454684F1-C471-46F3-BAC4-2D91AD8974E4}" srcOrd="0" destOrd="0" presId="urn:microsoft.com/office/officeart/2005/8/layout/hierarchy4"/>
+    <dgm:cxn modelId="{E552581B-8A3F-4805-8142-7962D26EFAE1}" type="presOf" srcId="{F0BCB0BC-556E-449B-86F7-62A5FA6572F0}" destId="{78E18B86-D2AC-480B-A960-3C64CE0ACB5F}" srcOrd="0" destOrd="0" presId="urn:microsoft.com/office/officeart/2005/8/layout/hierarchy4"/>
+    <dgm:cxn modelId="{B568EE7B-4796-47D5-B940-F7BE2C48D541}" srcId="{7233F472-5AD0-488F-823E-AB684E1B90A7}" destId="{4964D2D3-AEBA-4A45-B14B-5C8E9D8B9E4B}" srcOrd="2" destOrd="0" parTransId="{311A0B1E-B601-44C6-96ED-9A1860785FE2}" sibTransId="{3F84FEE0-D50B-4660-98E4-81A9AE64048C}"/>
+    <dgm:cxn modelId="{6423558B-6BF5-46D9-901F-9469BA90710A}" srcId="{8052CE9C-B566-4944-BAF7-24722EBE8E4B}" destId="{30BFD9D6-5903-49A9-89E5-181B0DEDC7C2}" srcOrd="4" destOrd="0" parTransId="{48338E46-FE72-4558-8DCA-0198067C94F5}" sibTransId="{D60BCF95-AD49-4A52-942B-87FCD94C954E}"/>
+    <dgm:cxn modelId="{D00E06E6-EB0D-423E-9628-9AFA4A6F33EF}" type="presOf" srcId="{E5236834-88F9-4DA4-A749-F9AF048C259A}" destId="{5CD0AD9A-BE32-4C42-A0E2-2276ACEB345F}" srcOrd="0" destOrd="0" presId="urn:microsoft.com/office/officeart/2005/8/layout/hierarchy4"/>
+    <dgm:cxn modelId="{5C8762D1-6D31-49CE-B8E2-581A0AB5611F}" type="presOf" srcId="{8052CE9C-B566-4944-BAF7-24722EBE8E4B}" destId="{6A92BCA9-784A-400C-84F8-576684994CF4}" srcOrd="0" destOrd="0" presId="urn:microsoft.com/office/officeart/2005/8/layout/hierarchy4"/>
+    <dgm:cxn modelId="{B6E06B13-4BAB-46B8-A4CD-01AED486B18D}" type="presOf" srcId="{896525B4-2A21-4F6D-B91A-9BD141FD4F81}" destId="{164771C7-6A86-4C93-8015-5EA2F6D55817}" srcOrd="0" destOrd="0" presId="urn:microsoft.com/office/officeart/2005/8/layout/hierarchy4"/>
+    <dgm:cxn modelId="{694D8EAE-AB45-4829-A8D3-AD9F0CB7F576}" type="presOf" srcId="{4A57402C-4985-4B98-B991-E0CFC4B99E59}" destId="{E2E9CDE7-DCE5-4DE5-BCDB-DBDD7A17A910}" srcOrd="0" destOrd="0" presId="urn:microsoft.com/office/officeart/2005/8/layout/hierarchy4"/>
+    <dgm:cxn modelId="{726E34FD-BD1D-4669-B4E4-590E34D93485}" srcId="{69864CEF-5157-4106-8090-543F8D357164}" destId="{463CAF73-C9A4-4ACE-BC6B-87914DFA02FD}" srcOrd="0" destOrd="0" parTransId="{8831531C-2EA4-4B68-B2BF-10FEC43A7581}" sibTransId="{15ED991A-F500-4661-8CF6-44674CBD11CA}"/>
+    <dgm:cxn modelId="{785CFE81-05C9-4208-AEFE-DA938CCA61B5}" type="presOf" srcId="{2B2C2B2E-04AD-473A-B4D3-3C32E5DDD2BA}" destId="{96008BAD-6E1D-49FA-9535-06B0B4CEA68B}" srcOrd="0" destOrd="0" presId="urn:microsoft.com/office/officeart/2005/8/layout/hierarchy4"/>
+    <dgm:cxn modelId="{24F2E643-4B00-4134-A8F6-E815EC0910DC}" srcId="{D434636E-7D85-44C9-8E93-E01D5BA82E21}" destId="{D5B0C5AB-1A0C-4FBB-B5C8-1AED8427A126}" srcOrd="0" destOrd="0" parTransId="{E2EF273A-226C-4A60-AB04-1098911BA4F8}" sibTransId="{483316DA-A68F-4058-AB67-98E17AB80392}"/>
+    <dgm:cxn modelId="{02E339B2-F9E2-4350-8A7C-4E3664636405}" srcId="{DD799618-554E-4A3E-9C4F-DE7E92060013}" destId="{837D7104-6EA3-4365-9F3A-8CBB86216267}" srcOrd="1" destOrd="0" parTransId="{41F2A25A-25EB-45E3-B94E-19742D3C70C6}" sibTransId="{9602C8D6-BF57-4BF8-90BE-5F066EBA0FC3}"/>
+    <dgm:cxn modelId="{F28EF2AF-3373-496C-93BD-9C7A33E0761B}" srcId="{DD799618-554E-4A3E-9C4F-DE7E92060013}" destId="{1C51F772-99D9-433A-8FE1-D4674B994702}" srcOrd="0" destOrd="0" parTransId="{00181B6B-73FB-46E3-91D0-BD2C838A2433}" sibTransId="{E9E395B0-C8E5-4E64-8710-C3A7707677C9}"/>
+    <dgm:cxn modelId="{DFE26D28-DE41-4C96-80ED-4783B543F65A}" type="presOf" srcId="{113F5C9A-C6DB-4E45-B36C-C13CEC53E005}" destId="{F0DEB06C-855D-49FB-B969-7B8FE0C69DA4}" srcOrd="0" destOrd="0" presId="urn:microsoft.com/office/officeart/2005/8/layout/hierarchy4"/>
+    <dgm:cxn modelId="{E4240772-2D8C-4372-BEEB-B2B33FB91927}" type="presOf" srcId="{DD799618-554E-4A3E-9C4F-DE7E92060013}" destId="{98B18068-9578-4B4B-84A5-CDEC9E8B2DF3}" srcOrd="0" destOrd="0" presId="urn:microsoft.com/office/officeart/2005/8/layout/hierarchy4"/>
+    <dgm:cxn modelId="{11BD4F9D-4C5A-4EA6-9C14-E9862A0DF6CC}" type="presOf" srcId="{3D838B01-A275-4F63-BE2D-490DFED65CD3}" destId="{41A09248-2BF6-4236-80B9-6C333240238E}" srcOrd="0" destOrd="0" presId="urn:microsoft.com/office/officeart/2005/8/layout/hierarchy4"/>
+    <dgm:cxn modelId="{5B179777-5751-4B84-AE8E-EB2C3D1B1DCD}" type="presOf" srcId="{4964D2D3-AEBA-4A45-B14B-5C8E9D8B9E4B}" destId="{C34D62DE-607D-4ADA-865E-DAA66DBC9DC1}" srcOrd="0" destOrd="0" presId="urn:microsoft.com/office/officeart/2005/8/layout/hierarchy4"/>
+    <dgm:cxn modelId="{02847A51-A843-4578-98E6-DAE2543D3006}" type="presOf" srcId="{30BFD9D6-5903-49A9-89E5-181B0DEDC7C2}" destId="{0058E322-1197-436D-A008-086C1A6C1153}" srcOrd="0" destOrd="0" presId="urn:microsoft.com/office/officeart/2005/8/layout/hierarchy4"/>
+    <dgm:cxn modelId="{01DC8DF1-D317-4A02-B666-DC7A3D4C531E}" type="presOf" srcId="{25DE0665-8A9E-4AF1-A17E-A26E16D35A6E}" destId="{29A1E861-C3F9-4A3A-8391-FD796E599503}" srcOrd="0" destOrd="0" presId="urn:microsoft.com/office/officeart/2005/8/layout/hierarchy4"/>
+    <dgm:cxn modelId="{BA40A711-5378-488E-9AE3-845BAF66D0FB}" srcId="{82A1462A-81AD-42C2-90BF-5468391F2673}" destId="{6168BF5D-66BF-471E-9BA6-91C93E0D8E04}" srcOrd="0" destOrd="0" parTransId="{B1E0BE85-5742-4330-8DD5-31F043FBBFE3}" sibTransId="{C67376CF-21B8-418E-A9F4-D3144D1DEF9B}"/>
+    <dgm:cxn modelId="{F27824EE-408E-4836-A61D-038D1A3A2878}" srcId="{B5326564-FBEB-4B86-BD41-A8EF11D56995}" destId="{8E46B9FA-4FB6-4237-9872-7C34C9D363F4}" srcOrd="0" destOrd="0" parTransId="{7A75A2ED-A926-49D6-8094-4B2B552F45D2}" sibTransId="{35B426F9-6B96-4F91-9EEE-03F3D9671D31}"/>
+    <dgm:cxn modelId="{A4A05ECF-097F-4397-93A0-921DBE566055}" srcId="{69864CEF-5157-4106-8090-543F8D357164}" destId="{C4795D55-2785-4971-BC3D-93FB185D704E}" srcOrd="5" destOrd="0" parTransId="{A0FAB73F-DE12-4F79-96CF-05FC5C99C10E}" sibTransId="{B896113C-3E93-4EE7-A861-53E86206EFB8}"/>
+    <dgm:cxn modelId="{07906358-FD75-4FE3-86A3-69CA3635164A}" srcId="{CACCD36B-4FDE-476A-86FE-CB7387FC4CE8}" destId="{F4F19C0A-6D76-4B4F-B4DE-6FE9AEDE3FCE}" srcOrd="0" destOrd="0" parTransId="{80DB582E-FD76-49CF-BA72-7777FE963654}" sibTransId="{27F7B9E4-BFC8-48C2-99E8-7A5172E96E25}"/>
+    <dgm:cxn modelId="{A57742A5-840E-492D-8349-8D8C604C65C8}" srcId="{FAF914B6-99EC-4003-B59C-6B61778F7BF7}" destId="{F0BCB0BC-556E-449B-86F7-62A5FA6572F0}" srcOrd="2" destOrd="0" parTransId="{387D5B01-5BA0-4E81-979E-1E6F6416697E}" sibTransId="{68DE544A-C0A5-4132-B824-DD68E317BD77}"/>
+    <dgm:cxn modelId="{2C5C5265-35DB-459A-AFC1-44576A39F982}" srcId="{CACCD36B-4FDE-476A-86FE-CB7387FC4CE8}" destId="{1ECEBA31-39B5-4ED3-8571-F71E70745793}" srcOrd="2" destOrd="0" parTransId="{21CD5AE3-4CE6-4910-B044-D113331C7DA9}" sibTransId="{7774644D-5B0E-4D25-983A-7A2B92653BBE}"/>
+    <dgm:cxn modelId="{EF43FB71-5E3C-4692-81F9-B5063503BD73}" srcId="{69864CEF-5157-4106-8090-543F8D357164}" destId="{090D51A3-9CB3-45A9-B6A8-57998C94C21B}" srcOrd="3" destOrd="0" parTransId="{0FCFF34A-2463-49F3-ADA3-AE9EE5162CBF}" sibTransId="{1D719E18-D5A0-4DF2-BBEC-B4ADACBCF7F0}"/>
+    <dgm:cxn modelId="{A88E8EB6-B6EA-424B-ADE9-0ECF941EA1FD}" type="presOf" srcId="{090D51A3-9CB3-45A9-B6A8-57998C94C21B}" destId="{902C8943-ECDE-45D5-B395-E644BE5F5857}" srcOrd="0" destOrd="0" presId="urn:microsoft.com/office/officeart/2005/8/layout/hierarchy4"/>
+    <dgm:cxn modelId="{B9BF5801-86B5-4C58-A97E-5F136183D065}" type="presOf" srcId="{1C51F772-99D9-433A-8FE1-D4674B994702}" destId="{77DB12F8-45B9-4859-A31E-D1AAB214090A}" srcOrd="0" destOrd="0" presId="urn:microsoft.com/office/officeart/2005/8/layout/hierarchy4"/>
+    <dgm:cxn modelId="{F4CECDAB-C575-4F22-966D-444DD59750CD}" srcId="{CACCD36B-4FDE-476A-86FE-CB7387FC4CE8}" destId="{2C83E808-0E1C-47C7-AA09-16C84223DDDF}" srcOrd="3" destOrd="0" parTransId="{A8F53146-0112-4A4C-BE6E-42DA1E4B27F4}" sibTransId="{C1679A96-5616-4FCD-B07C-3F0771448A2A}"/>
+    <dgm:cxn modelId="{92495F98-C855-436C-AB63-8BCA4DF44D83}" srcId="{8052CE9C-B566-4944-BAF7-24722EBE8E4B}" destId="{113F5C9A-C6DB-4E45-B36C-C13CEC53E005}" srcOrd="1" destOrd="0" parTransId="{9BAA8D21-11C1-4516-ACA4-031E404701C8}" sibTransId="{E91F26FF-21B5-4A5B-A590-7989FF04D983}"/>
+    <dgm:cxn modelId="{2FE2646F-C6F1-4DA6-AB3F-E459DFA81BB3}" type="presOf" srcId="{E284042C-20FE-4268-AC7E-1C5A99D65F4F}" destId="{106D8AC7-034D-4040-BD0F-C2A006F58F62}" srcOrd="0" destOrd="0" presId="urn:microsoft.com/office/officeart/2005/8/layout/hierarchy4"/>
+    <dgm:cxn modelId="{9A4314B8-E393-418F-9CDE-223799E0FA4D}" srcId="{E5236834-88F9-4DA4-A749-F9AF048C259A}" destId="{69864CEF-5157-4106-8090-543F8D357164}" srcOrd="1" destOrd="0" parTransId="{9EE51C1A-B9EF-47AB-97D1-C87DE0BFBF81}" sibTransId="{93EC1DE7-1856-4D9A-98D2-1AD62CAB5D8F}"/>
+    <dgm:cxn modelId="{B94E5622-5890-43B6-9D5C-6296A83386E8}" type="presOf" srcId="{69864CEF-5157-4106-8090-543F8D357164}" destId="{21171A74-C831-4CCC-9163-B17F12C3665A}" srcOrd="0" destOrd="0" presId="urn:microsoft.com/office/officeart/2005/8/layout/hierarchy4"/>
+    <dgm:cxn modelId="{FF7E81E4-B664-4792-948E-9404A208C223}" srcId="{FAF914B6-99EC-4003-B59C-6B61778F7BF7}" destId="{451511D5-9698-43DB-AC78-B4CC044EF837}" srcOrd="1" destOrd="0" parTransId="{59E278F8-75B4-483C-87E7-7DABB42B9761}" sibTransId="{AA593F06-81F0-41D8-A661-8C53A18C3A11}"/>
+    <dgm:cxn modelId="{2FB69565-F2D6-470A-801C-DD9C679A148E}" type="presOf" srcId="{837D7104-6EA3-4365-9F3A-8CBB86216267}" destId="{023E5A65-1311-4958-AD91-EAC920DC0AF7}" srcOrd="0" destOrd="0" presId="urn:microsoft.com/office/officeart/2005/8/layout/hierarchy4"/>
+    <dgm:cxn modelId="{E5A86503-F1ED-4F10-B44E-1E768AC99607}" type="presOf" srcId="{2C83E808-0E1C-47C7-AA09-16C84223DDDF}" destId="{6FD73614-3D85-4E26-85D1-294E83293721}" srcOrd="0" destOrd="0" presId="urn:microsoft.com/office/officeart/2005/8/layout/hierarchy4"/>
+    <dgm:cxn modelId="{D17F395F-B07C-4446-86F6-4F979AE06B48}" srcId="{8052CE9C-B566-4944-BAF7-24722EBE8E4B}" destId="{91DCF9E5-B3D7-458A-AFEA-DA7EA5DE8156}" srcOrd="2" destOrd="0" parTransId="{DE0622D8-2370-4FBB-AF68-70630EBA9882}" sibTransId="{4709B9E5-3954-4F73-9011-7B1CEB0709A3}"/>
+    <dgm:cxn modelId="{199FBCF2-868E-45EB-A6A8-B35E1D968EFD}" srcId="{7233F472-5AD0-488F-823E-AB684E1B90A7}" destId="{B49CB8EE-772F-4F6A-B5A3-7E7FE6F512B3}" srcOrd="1" destOrd="0" parTransId="{DD35827C-D8FC-4ABA-A557-BA19C370F4E1}" sibTransId="{E52A986E-ACF3-461D-92FF-508BBB611827}"/>
+    <dgm:cxn modelId="{3CB877BE-5CF9-4017-BD8A-F06517D250E2}" type="presOf" srcId="{6168BF5D-66BF-471E-9BA6-91C93E0D8E04}" destId="{BFDA3BC1-055B-4BEA-8AC0-C1B709E1CE61}" srcOrd="0" destOrd="0" presId="urn:microsoft.com/office/officeart/2005/8/layout/hierarchy4"/>
+    <dgm:cxn modelId="{A5294D80-AAA6-4BFA-A898-F60E91759FAF}" type="presOf" srcId="{FAF914B6-99EC-4003-B59C-6B61778F7BF7}" destId="{C842A458-1709-49C2-B512-7A83580D606B}" srcOrd="0" destOrd="0" presId="urn:microsoft.com/office/officeart/2005/8/layout/hierarchy4"/>
+    <dgm:cxn modelId="{5A85BF61-E084-4691-8A72-287E2910D6F7}" type="presOf" srcId="{5278A937-81D2-4EBC-9DD3-3AED02A701B0}" destId="{E84D2AFA-A234-4397-B507-D9D270F2896B}" srcOrd="0" destOrd="0" presId="urn:microsoft.com/office/officeart/2005/8/layout/hierarchy4"/>
+    <dgm:cxn modelId="{CBAC481E-11DE-4AB6-B13C-1B7AAD002303}" type="presOf" srcId="{7233F472-5AD0-488F-823E-AB684E1B90A7}" destId="{C6E69324-4915-4657-9255-9E99FBAADB57}" srcOrd="0" destOrd="0" presId="urn:microsoft.com/office/officeart/2005/8/layout/hierarchy4"/>
+    <dgm:cxn modelId="{0563988D-E62F-4350-9CED-2F1B5FCFEF78}" srcId="{8052CE9C-B566-4944-BAF7-24722EBE8E4B}" destId="{896525B4-2A21-4F6D-B91A-9BD141FD4F81}" srcOrd="0" destOrd="0" parTransId="{4F5EF07F-938B-43B6-8E75-4090763D4902}" sibTransId="{C50F3BEC-486C-4F00-A48D-929A078A8D77}"/>
+    <dgm:cxn modelId="{9BB9E997-0162-4FAB-891E-8FCF5A697554}" srcId="{E5236834-88F9-4DA4-A749-F9AF048C259A}" destId="{FAF914B6-99EC-4003-B59C-6B61778F7BF7}" srcOrd="4" destOrd="0" parTransId="{2C194F60-1E3B-4669-B48E-B83C3C315127}" sibTransId="{DF56E7C3-5029-4419-91F5-D44F0F7333E9}"/>
+    <dgm:cxn modelId="{82DF5BEB-5EAB-427F-86BB-55CFD4BE97BB}" type="presOf" srcId="{BBDBDAB7-7269-4A9E-B868-88B67F4CD2B6}" destId="{E6055A57-9D66-4176-909C-5119927CEF83}" srcOrd="0" destOrd="0" presId="urn:microsoft.com/office/officeart/2005/8/layout/hierarchy4"/>
+    <dgm:cxn modelId="{D60C5995-46C7-4F03-94F3-7C0EC9D607DC}" srcId="{D5B0C5AB-1A0C-4FBB-B5C8-1AED8427A126}" destId="{CACCD36B-4FDE-476A-86FE-CB7387FC4CE8}" srcOrd="1" destOrd="0" parTransId="{744CF3AA-8E5E-4259-9C11-C2CB1EA39ACF}" sibTransId="{7B4F09AA-4CDB-477B-92E6-B0C3BFE49A91}"/>
+    <dgm:cxn modelId="{DC8165E5-A45B-4CD5-9CDC-BAF5A985163A}" type="presOf" srcId="{B49CB8EE-772F-4F6A-B5A3-7E7FE6F512B3}" destId="{C11BF453-F7C5-4AA3-813E-50BDD8DCBF28}" srcOrd="0" destOrd="0" presId="urn:microsoft.com/office/officeart/2005/8/layout/hierarchy4"/>
+    <dgm:cxn modelId="{8D7AC182-271F-49C7-ACA0-F07C55BC7FF4}" srcId="{69864CEF-5157-4106-8090-543F8D357164}" destId="{9D568DC1-8FF4-4EA8-B166-18FE6389BF46}" srcOrd="1" destOrd="0" parTransId="{5150C3AF-7D74-4164-BACA-5E395F917D49}" sibTransId="{E07AFA0B-8857-43CB-8B61-E7855AF9B06D}"/>
+    <dgm:cxn modelId="{C31D0FA6-F923-4745-85C1-CE1B2B4E19E7}" type="presOf" srcId="{D5B0C5AB-1A0C-4FBB-B5C8-1AED8427A126}" destId="{019ACCC9-5EDB-4AB1-9323-EF5AAD46AF80}" srcOrd="0" destOrd="0" presId="urn:microsoft.com/office/officeart/2005/8/layout/hierarchy4"/>
+    <dgm:cxn modelId="{FC1384E2-ED18-47A7-84BE-304AEEAEC739}" srcId="{FAF914B6-99EC-4003-B59C-6B61778F7BF7}" destId="{2B2C2B2E-04AD-473A-B4D3-3C32E5DDD2BA}" srcOrd="0" destOrd="0" parTransId="{F0D0E9DB-606F-4DA6-BB5F-EA0898BC893F}" sibTransId="{FB4952E6-671F-4630-BCDF-A7531051BA87}"/>
+    <dgm:cxn modelId="{3D774DB1-7C27-4543-B4E1-C0093CCBD2B5}" type="presOf" srcId="{CDC218BC-EFB2-4477-BE90-22DD30830905}" destId="{FEEFDD34-BB8B-4839-A669-40CA07521950}" srcOrd="0" destOrd="0" presId="urn:microsoft.com/office/officeart/2005/8/layout/hierarchy4"/>
+    <dgm:cxn modelId="{A2B28AE0-54C0-4846-A6C0-7077ACBE160A}" srcId="{8052CE9C-B566-4944-BAF7-24722EBE8E4B}" destId="{25DE0665-8A9E-4AF1-A17E-A26E16D35A6E}" srcOrd="3" destOrd="0" parTransId="{FFF7CC4A-1706-491F-8042-D495A0E763E9}" sibTransId="{100F6FCE-FCAD-4617-B558-73BC39256759}"/>
+    <dgm:cxn modelId="{E1012053-3449-4D8D-BBDA-3500B232A1A8}" srcId="{D5B0C5AB-1A0C-4FBB-B5C8-1AED8427A126}" destId="{B5326564-FBEB-4B86-BD41-A8EF11D56995}" srcOrd="2" destOrd="0" parTransId="{73C5170A-E177-48E8-9DBF-1B57201E0DA4}" sibTransId="{AA435247-F6C6-4BD1-88B5-98FE9A39A21B}"/>
+    <dgm:cxn modelId="{EE045BFA-E0EC-48ED-859D-7E09D512DCA5}" srcId="{E5236834-88F9-4DA4-A749-F9AF048C259A}" destId="{7233F472-5AD0-488F-823E-AB684E1B90A7}" srcOrd="0" destOrd="0" parTransId="{D81990A1-806B-4C05-A13A-2DFCD1265CB7}" sibTransId="{76E2816D-A643-4268-BA8C-39915B801F47}"/>
+    <dgm:cxn modelId="{81A03EE8-EAE5-4BB0-888F-729170642C83}" srcId="{E5236834-88F9-4DA4-A749-F9AF048C259A}" destId="{8052CE9C-B566-4944-BAF7-24722EBE8E4B}" srcOrd="3" destOrd="0" parTransId="{D0034481-679F-4C28-B864-21DFA95A7BD7}" sibTransId="{848B117C-8E22-4B09-81CD-361F2E0A7825}"/>
+    <dgm:cxn modelId="{688C1543-FC34-418D-B9C4-0058420E9227}" type="presOf" srcId="{1ECEBA31-39B5-4ED3-8571-F71E70745793}" destId="{4F86F50A-309D-40D8-B5AE-05A5B173B5BF}" srcOrd="0" destOrd="0" presId="urn:microsoft.com/office/officeart/2005/8/layout/hierarchy4"/>
+    <dgm:cxn modelId="{BEFA3A00-0287-4693-B934-E2BD55A63512}" type="presOf" srcId="{8E46B9FA-4FB6-4237-9872-7C34C9D363F4}" destId="{5CFE348B-3366-4EF1-AD60-D1702172D5FC}" srcOrd="0" destOrd="0" presId="urn:microsoft.com/office/officeart/2005/8/layout/hierarchy4"/>
+    <dgm:cxn modelId="{D2CA3BBD-B4AF-4017-8597-E39B4792FA40}" srcId="{CACCD36B-4FDE-476A-86FE-CB7387FC4CE8}" destId="{3D838B01-A275-4F63-BE2D-490DFED65CD3}" srcOrd="1" destOrd="0" parTransId="{01798D21-61F2-4810-972C-E7BF918C9AF9}" sibTransId="{898DCED7-6616-4B49-A5A6-EEFA299F287F}"/>
+    <dgm:cxn modelId="{C6C08BB2-FAB3-44CB-A00C-FE94EFD9B3F9}" type="presOf" srcId="{5D6A5001-45DD-4EB9-8FA3-93D34F22F51C}" destId="{7604A8B0-A474-4CE4-BE66-FB4A8E8F6A7C}" srcOrd="0" destOrd="0" presId="urn:microsoft.com/office/officeart/2005/8/layout/hierarchy4"/>
+    <dgm:cxn modelId="{05176EBD-6D7A-473D-87DA-7DB9C30C4D3E}" srcId="{7233F472-5AD0-488F-823E-AB684E1B90A7}" destId="{5278A937-81D2-4EBC-9DD3-3AED02A701B0}" srcOrd="0" destOrd="0" parTransId="{9076CAB7-2782-4DCE-9D5D-CB7FC9973519}" sibTransId="{074C2B4D-FE2A-42AC-85AA-D3BFA14B44EB}"/>
+    <dgm:cxn modelId="{9FA13CCF-8D49-4DDE-A3C1-75E591B4843D}" srcId="{82A1462A-81AD-42C2-90BF-5468391F2673}" destId="{8869F930-DA37-4B93-AE35-107B6DD4337A}" srcOrd="1" destOrd="0" parTransId="{3D37532C-18CA-4E52-901F-798476C77D3D}" sibTransId="{398FCD69-3371-48BD-93B5-39F85E3ED521}"/>
+    <dgm:cxn modelId="{16488E58-AECD-49A0-A191-165A2C263044}" srcId="{D5B0C5AB-1A0C-4FBB-B5C8-1AED8427A126}" destId="{E5236834-88F9-4DA4-A749-F9AF048C259A}" srcOrd="3" destOrd="0" parTransId="{A701E959-D325-4FF0-8FC2-21D9CEBCCEF0}" sibTransId="{00D2D5E9-2CCE-412C-980F-5D182F219EC5}"/>
+    <dgm:cxn modelId="{E28D180B-F594-49FC-89BB-064EFC2F5F7F}" srcId="{DD799618-554E-4A3E-9C4F-DE7E92060013}" destId="{5D6A5001-45DD-4EB9-8FA3-93D34F22F51C}" srcOrd="2" destOrd="0" parTransId="{B89A4205-4784-4B88-96A7-961A04605FF6}" sibTransId="{F95790B8-0013-4040-B2D9-A7E931D4BB3E}"/>
+    <dgm:cxn modelId="{193BC26B-A115-4440-BA44-DC6F85ACA7A0}" srcId="{69864CEF-5157-4106-8090-543F8D357164}" destId="{BBDBDAB7-7269-4A9E-B868-88B67F4CD2B6}" srcOrd="4" destOrd="0" parTransId="{62B0B4EC-02C4-4CE9-83FF-026F575CEBC7}" sibTransId="{696FC5EE-F5DB-4B5F-A420-274856D51EC5}"/>
     <dgm:cxn modelId="{E25EC29B-029F-45B0-8595-491E4671E40D}" srcId="{69864CEF-5157-4106-8090-543F8D357164}" destId="{CDC218BC-EFB2-4477-BE90-22DD30830905}" srcOrd="2" destOrd="0" parTransId="{62897FBC-5F61-4446-BE0E-CFADBA65177E}" sibTransId="{B235874F-4B44-4B47-83D1-9FB6188848B7}"/>
-    <dgm:cxn modelId="{B9BF5801-86B5-4C58-A97E-5F136183D065}" type="presOf" srcId="{1C51F772-99D9-433A-8FE1-D4674B994702}" destId="{77DB12F8-45B9-4859-A31E-D1AAB214090A}" srcOrd="0" destOrd="0" presId="urn:microsoft.com/office/officeart/2005/8/layout/hierarchy4"/>
-    <dgm:cxn modelId="{FFA3DE30-A15C-4297-B2E9-A6EF537CEAC0}" type="presOf" srcId="{B5326564-FBEB-4B86-BD41-A8EF11D56995}" destId="{546544D8-39F1-417C-8C9A-11ABD3D8C9BD}" srcOrd="0" destOrd="0" presId="urn:microsoft.com/office/officeart/2005/8/layout/hierarchy4"/>
-    <dgm:cxn modelId="{01DC8DF1-D317-4A02-B666-DC7A3D4C531E}" type="presOf" srcId="{25DE0665-8A9E-4AF1-A17E-A26E16D35A6E}" destId="{29A1E861-C3F9-4A3A-8391-FD796E599503}" srcOrd="0" destOrd="0" presId="urn:microsoft.com/office/officeart/2005/8/layout/hierarchy4"/>
-    <dgm:cxn modelId="{199FBCF2-868E-45EB-A6A8-B35E1D968EFD}" srcId="{7233F472-5AD0-488F-823E-AB684E1B90A7}" destId="{B49CB8EE-772F-4F6A-B5A3-7E7FE6F512B3}" srcOrd="1" destOrd="0" parTransId="{DD35827C-D8FC-4ABA-A557-BA19C370F4E1}" sibTransId="{E52A986E-ACF3-461D-92FF-508BBB611827}"/>
-    <dgm:cxn modelId="{9A4314B8-E393-418F-9CDE-223799E0FA4D}" srcId="{E5236834-88F9-4DA4-A749-F9AF048C259A}" destId="{69864CEF-5157-4106-8090-543F8D357164}" srcOrd="1" destOrd="0" parTransId="{9EE51C1A-B9EF-47AB-97D1-C87DE0BFBF81}" sibTransId="{93EC1DE7-1856-4D9A-98D2-1AD62CAB5D8F}"/>
-    <dgm:cxn modelId="{69C3972D-2265-4709-B74C-8BFE14BF1C1E}" srcId="{DD799618-554E-4A3E-9C4F-DE7E92060013}" destId="{695B9890-A0B3-4D1F-B5C8-EFB002240621}" srcOrd="3" destOrd="0" parTransId="{E9B04242-9B81-409D-ADAF-844A2137E9FA}" sibTransId="{4E2CEFA5-C349-43A3-9760-A4531F6B5F42}"/>
-    <dgm:cxn modelId="{EF43FB71-5E3C-4692-81F9-B5063503BD73}" srcId="{69864CEF-5157-4106-8090-543F8D357164}" destId="{090D51A3-9CB3-45A9-B6A8-57998C94C21B}" srcOrd="3" destOrd="0" parTransId="{0FCFF34A-2463-49F3-ADA3-AE9EE5162CBF}" sibTransId="{1D719E18-D5A0-4DF2-BBEC-B4ADACBCF7F0}"/>
-    <dgm:cxn modelId="{BEFA3A00-0287-4693-B934-E2BD55A63512}" type="presOf" srcId="{8E46B9FA-4FB6-4237-9872-7C34C9D363F4}" destId="{5CFE348B-3366-4EF1-AD60-D1702172D5FC}" srcOrd="0" destOrd="0" presId="urn:microsoft.com/office/officeart/2005/8/layout/hierarchy4"/>
-    <dgm:cxn modelId="{C31D0FA6-F923-4745-85C1-CE1B2B4E19E7}" type="presOf" srcId="{D5B0C5AB-1A0C-4FBB-B5C8-1AED8427A126}" destId="{019ACCC9-5EDB-4AB1-9323-EF5AAD46AF80}" srcOrd="0" destOrd="0" presId="urn:microsoft.com/office/officeart/2005/8/layout/hierarchy4"/>
-    <dgm:cxn modelId="{F4CECDAB-C575-4F22-966D-444DD59750CD}" srcId="{CACCD36B-4FDE-476A-86FE-CB7387FC4CE8}" destId="{2C83E808-0E1C-47C7-AA09-16C84223DDDF}" srcOrd="3" destOrd="0" parTransId="{A8F53146-0112-4A4C-BE6E-42DA1E4B27F4}" sibTransId="{C1679A96-5616-4FCD-B07C-3F0771448A2A}"/>
-    <dgm:cxn modelId="{32ADE498-7A02-427D-883C-3F54664DD12A}" type="presOf" srcId="{8869F930-DA37-4B93-AE35-107B6DD4337A}" destId="{CF3213AC-44DE-4FD3-8A51-7AB92E16B5D8}" srcOrd="0" destOrd="0" presId="urn:microsoft.com/office/officeart/2005/8/layout/hierarchy4"/>
     <dgm:cxn modelId="{EB372E2A-0E21-4190-ADF5-1E85EAEB0021}" type="presOf" srcId="{D434636E-7D85-44C9-8E93-E01D5BA82E21}" destId="{1A900704-DB42-4E94-97AC-CDC005849B47}" srcOrd="0" destOrd="0" presId="urn:microsoft.com/office/officeart/2005/8/layout/hierarchy4"/>
-    <dgm:cxn modelId="{F96BCFEA-8F2A-4C66-8A60-5697CE214617}" srcId="{D5B0C5AB-1A0C-4FBB-B5C8-1AED8427A126}" destId="{82A1462A-81AD-42C2-90BF-5468391F2673}" srcOrd="0" destOrd="0" parTransId="{9E152079-0AA9-4500-B4E4-C34714BF433E}" sibTransId="{047A6A53-FB6B-4C34-8D58-E7412702AAC8}"/>
-    <dgm:cxn modelId="{D17F395F-B07C-4446-86F6-4F979AE06B48}" srcId="{8052CE9C-B566-4944-BAF7-24722EBE8E4B}" destId="{91DCF9E5-B3D7-458A-AFEA-DA7EA5DE8156}" srcOrd="2" destOrd="0" parTransId="{DE0622D8-2370-4FBB-AF68-70630EBA9882}" sibTransId="{4709B9E5-3954-4F73-9011-7B1CEB0709A3}"/>
-    <dgm:cxn modelId="{82DF5BEB-5EAB-427F-86BB-55CFD4BE97BB}" type="presOf" srcId="{BBDBDAB7-7269-4A9E-B868-88B67F4CD2B6}" destId="{E6055A57-9D66-4176-909C-5119927CEF83}" srcOrd="0" destOrd="0" presId="urn:microsoft.com/office/officeart/2005/8/layout/hierarchy4"/>
-    <dgm:cxn modelId="{AB3FF02E-CBF2-4ACE-A124-645678C36EE3}" srcId="{B5326564-FBEB-4B86-BD41-A8EF11D56995}" destId="{4A57402C-4985-4B98-B991-E0CFC4B99E59}" srcOrd="1" destOrd="0" parTransId="{9C32C4CF-3981-4FCE-901D-FCC3B22E39E0}" sibTransId="{2F23E3BB-4D08-45F8-954C-EBC01645A156}"/>
-    <dgm:cxn modelId="{F28EF2AF-3373-496C-93BD-9C7A33E0761B}" srcId="{DD799618-554E-4A3E-9C4F-DE7E92060013}" destId="{1C51F772-99D9-433A-8FE1-D4674B994702}" srcOrd="0" destOrd="0" parTransId="{00181B6B-73FB-46E3-91D0-BD2C838A2433}" sibTransId="{E9E395B0-C8E5-4E64-8710-C3A7707677C9}"/>
-    <dgm:cxn modelId="{E552581B-8A3F-4805-8142-7962D26EFAE1}" type="presOf" srcId="{F0BCB0BC-556E-449B-86F7-62A5FA6572F0}" destId="{78E18B86-D2AC-480B-A960-3C64CE0ACB5F}" srcOrd="0" destOrd="0" presId="urn:microsoft.com/office/officeart/2005/8/layout/hierarchy4"/>
-    <dgm:cxn modelId="{2C5C5265-35DB-459A-AFC1-44576A39F982}" srcId="{CACCD36B-4FDE-476A-86FE-CB7387FC4CE8}" destId="{1ECEBA31-39B5-4ED3-8571-F71E70745793}" srcOrd="2" destOrd="0" parTransId="{21CD5AE3-4CE6-4910-B044-D113331C7DA9}" sibTransId="{7774644D-5B0E-4D25-983A-7A2B92653BBE}"/>
-    <dgm:cxn modelId="{726E34FD-BD1D-4669-B4E4-590E34D93485}" srcId="{69864CEF-5157-4106-8090-543F8D357164}" destId="{463CAF73-C9A4-4ACE-BC6B-87914DFA02FD}" srcOrd="0" destOrd="0" parTransId="{8831531C-2EA4-4B68-B2BF-10FEC43A7581}" sibTransId="{15ED991A-F500-4661-8CF6-44674CBD11CA}"/>
-    <dgm:cxn modelId="{02E339B2-F9E2-4350-8A7C-4E3664636405}" srcId="{DD799618-554E-4A3E-9C4F-DE7E92060013}" destId="{837D7104-6EA3-4365-9F3A-8CBB86216267}" srcOrd="1" destOrd="0" parTransId="{41F2A25A-25EB-45E3-B94E-19742D3C70C6}" sibTransId="{9602C8D6-BF57-4BF8-90BE-5F066EBA0FC3}"/>
-    <dgm:cxn modelId="{EE045BFA-E0EC-48ED-859D-7E09D512DCA5}" srcId="{E5236834-88F9-4DA4-A749-F9AF048C259A}" destId="{7233F472-5AD0-488F-823E-AB684E1B90A7}" srcOrd="0" destOrd="0" parTransId="{D81990A1-806B-4C05-A13A-2DFCD1265CB7}" sibTransId="{76E2816D-A643-4268-BA8C-39915B801F47}"/>
-    <dgm:cxn modelId="{38BD91BF-F2F6-4388-ACB6-CF5ACAFF8896}" type="presOf" srcId="{F4F19C0A-6D76-4B4F-B4DE-6FE9AEDE3FCE}" destId="{145BF377-035C-403A-9A96-F5AE683E92C6}" srcOrd="0" destOrd="0" presId="urn:microsoft.com/office/officeart/2005/8/layout/hierarchy4"/>
-    <dgm:cxn modelId="{24F2E643-4B00-4134-A8F6-E815EC0910DC}" srcId="{D434636E-7D85-44C9-8E93-E01D5BA82E21}" destId="{D5B0C5AB-1A0C-4FBB-B5C8-1AED8427A126}" srcOrd="0" destOrd="0" parTransId="{E2EF273A-226C-4A60-AB04-1098911BA4F8}" sibTransId="{483316DA-A68F-4058-AB67-98E17AB80392}"/>
-    <dgm:cxn modelId="{694D8EAE-AB45-4829-A8D3-AD9F0CB7F576}" type="presOf" srcId="{4A57402C-4985-4B98-B991-E0CFC4B99E59}" destId="{E2E9CDE7-DCE5-4DE5-BCDB-DBDD7A17A910}" srcOrd="0" destOrd="0" presId="urn:microsoft.com/office/officeart/2005/8/layout/hierarchy4"/>
-    <dgm:cxn modelId="{9136AF5D-0AA7-4E19-B885-963FCFB61893}" type="presOf" srcId="{9D568DC1-8FF4-4EA8-B166-18FE6389BF46}" destId="{7E069352-F61A-45C9-BE49-D3150A5E417A}" srcOrd="0" destOrd="0" presId="urn:microsoft.com/office/officeart/2005/8/layout/hierarchy4"/>
     <dgm:cxn modelId="{19215BA8-7D72-417B-B2A5-931C8C5A8B20}" type="presOf" srcId="{82A1462A-81AD-42C2-90BF-5468391F2673}" destId="{16212DC7-D67F-4BDB-BD49-CD59770A2095}" srcOrd="0" destOrd="0" presId="urn:microsoft.com/office/officeart/2005/8/layout/hierarchy4"/>
-    <dgm:cxn modelId="{E5A86503-F1ED-4F10-B44E-1E768AC99607}" type="presOf" srcId="{2C83E808-0E1C-47C7-AA09-16C84223DDDF}" destId="{6FD73614-3D85-4E26-85D1-294E83293721}" srcOrd="0" destOrd="0" presId="urn:microsoft.com/office/officeart/2005/8/layout/hierarchy4"/>
-    <dgm:cxn modelId="{DED4B206-769C-43BF-BBB5-4BBA8370C97A}" type="presOf" srcId="{695B9890-A0B3-4D1F-B5C8-EFB002240621}" destId="{454684F1-C471-46F3-BAC4-2D91AD8974E4}" srcOrd="0" destOrd="0" presId="urn:microsoft.com/office/officeart/2005/8/layout/hierarchy4"/>
-    <dgm:cxn modelId="{3D774DB1-7C27-4543-B4E1-C0093CCBD2B5}" type="presOf" srcId="{CDC218BC-EFB2-4477-BE90-22DD30830905}" destId="{FEEFDD34-BB8B-4839-A669-40CA07521950}" srcOrd="0" destOrd="0" presId="urn:microsoft.com/office/officeart/2005/8/layout/hierarchy4"/>
-    <dgm:cxn modelId="{81A03EE8-EAE5-4BB0-888F-729170642C83}" srcId="{E5236834-88F9-4DA4-A749-F9AF048C259A}" destId="{8052CE9C-B566-4944-BAF7-24722EBE8E4B}" srcOrd="3" destOrd="0" parTransId="{D0034481-679F-4C28-B864-21DFA95A7BD7}" sibTransId="{848B117C-8E22-4B09-81CD-361F2E0A7825}"/>
-    <dgm:cxn modelId="{FDE85D14-8736-47AF-96F2-863164548B42}" type="presOf" srcId="{CACCD36B-4FDE-476A-86FE-CB7387FC4CE8}" destId="{084E608C-A490-4B89-A739-2F17E47C5984}" srcOrd="0" destOrd="0" presId="urn:microsoft.com/office/officeart/2005/8/layout/hierarchy4"/>
-    <dgm:cxn modelId="{5C8762D1-6D31-49CE-B8E2-581A0AB5611F}" type="presOf" srcId="{8052CE9C-B566-4944-BAF7-24722EBE8E4B}" destId="{6A92BCA9-784A-400C-84F8-576684994CF4}" srcOrd="0" destOrd="0" presId="urn:microsoft.com/office/officeart/2005/8/layout/hierarchy4"/>
-    <dgm:cxn modelId="{8D7AC182-271F-49C7-ACA0-F07C55BC7FF4}" srcId="{69864CEF-5157-4106-8090-543F8D357164}" destId="{9D568DC1-8FF4-4EA8-B166-18FE6389BF46}" srcOrd="1" destOrd="0" parTransId="{5150C3AF-7D74-4164-BACA-5E395F917D49}" sibTransId="{E07AFA0B-8857-43CB-8B61-E7855AF9B06D}"/>
-    <dgm:cxn modelId="{B94E5622-5890-43B6-9D5C-6296A83386E8}" type="presOf" srcId="{69864CEF-5157-4106-8090-543F8D357164}" destId="{21171A74-C831-4CCC-9163-B17F12C3665A}" srcOrd="0" destOrd="0" presId="urn:microsoft.com/office/officeart/2005/8/layout/hierarchy4"/>
-    <dgm:cxn modelId="{574795F8-DFD4-49CB-BC6B-43E7F6C81324}" type="presOf" srcId="{C4795D55-2785-4971-BC3D-93FB185D704E}" destId="{2ACFD550-1C11-4AEC-AB1A-FD2BD557F95A}" srcOrd="0" destOrd="0" presId="urn:microsoft.com/office/officeart/2005/8/layout/hierarchy4"/>
-    <dgm:cxn modelId="{0563988D-E62F-4350-9CED-2F1B5FCFEF78}" srcId="{8052CE9C-B566-4944-BAF7-24722EBE8E4B}" destId="{896525B4-2A21-4F6D-B91A-9BD141FD4F81}" srcOrd="0" destOrd="0" parTransId="{4F5EF07F-938B-43B6-8E75-4090763D4902}" sibTransId="{C50F3BEC-486C-4F00-A48D-929A078A8D77}"/>
-    <dgm:cxn modelId="{C6C08BB2-FAB3-44CB-A00C-FE94EFD9B3F9}" type="presOf" srcId="{5D6A5001-45DD-4EB9-8FA3-93D34F22F51C}" destId="{7604A8B0-A474-4CE4-BE66-FB4A8E8F6A7C}" srcOrd="0" destOrd="0" presId="urn:microsoft.com/office/officeart/2005/8/layout/hierarchy4"/>
-    <dgm:cxn modelId="{2FE2646F-C6F1-4DA6-AB3F-E459DFA81BB3}" type="presOf" srcId="{E284042C-20FE-4268-AC7E-1C5A99D65F4F}" destId="{106D8AC7-034D-4040-BD0F-C2A006F58F62}" srcOrd="0" destOrd="0" presId="urn:microsoft.com/office/officeart/2005/8/layout/hierarchy4"/>
-    <dgm:cxn modelId="{07906358-FD75-4FE3-86A3-69CA3635164A}" srcId="{CACCD36B-4FDE-476A-86FE-CB7387FC4CE8}" destId="{F4F19C0A-6D76-4B4F-B4DE-6FE9AEDE3FCE}" srcOrd="0" destOrd="0" parTransId="{80DB582E-FD76-49CF-BA72-7777FE963654}" sibTransId="{27F7B9E4-BFC8-48C2-99E8-7A5172E96E25}"/>
-    <dgm:cxn modelId="{16488E58-AECD-49A0-A191-165A2C263044}" srcId="{D5B0C5AB-1A0C-4FBB-B5C8-1AED8427A126}" destId="{E5236834-88F9-4DA4-A749-F9AF048C259A}" srcOrd="3" destOrd="0" parTransId="{A701E959-D325-4FF0-8FC2-21D9CEBCCEF0}" sibTransId="{00D2D5E9-2CCE-412C-980F-5D182F219EC5}"/>
-    <dgm:cxn modelId="{688C1543-FC34-418D-B9C4-0058420E9227}" type="presOf" srcId="{1ECEBA31-39B5-4ED3-8571-F71E70745793}" destId="{4F86F50A-309D-40D8-B5AE-05A5B173B5BF}" srcOrd="0" destOrd="0" presId="urn:microsoft.com/office/officeart/2005/8/layout/hierarchy4"/>
-    <dgm:cxn modelId="{A57742A5-840E-492D-8349-8D8C604C65C8}" srcId="{FAF914B6-99EC-4003-B59C-6B61778F7BF7}" destId="{F0BCB0BC-556E-449B-86F7-62A5FA6572F0}" srcOrd="2" destOrd="0" parTransId="{387D5B01-5BA0-4E81-979E-1E6F6416697E}" sibTransId="{68DE544A-C0A5-4132-B824-DD68E317BD77}"/>
-    <dgm:cxn modelId="{9BB9E997-0162-4FAB-891E-8FCF5A697554}" srcId="{E5236834-88F9-4DA4-A749-F9AF048C259A}" destId="{FAF914B6-99EC-4003-B59C-6B61778F7BF7}" srcOrd="4" destOrd="0" parTransId="{2C194F60-1E3B-4669-B48E-B83C3C315127}" sibTransId="{DF56E7C3-5029-4419-91F5-D44F0F7333E9}"/>
-    <dgm:cxn modelId="{B6E06B13-4BAB-46B8-A4CD-01AED486B18D}" type="presOf" srcId="{896525B4-2A21-4F6D-B91A-9BD141FD4F81}" destId="{164771C7-6A86-4C93-8015-5EA2F6D55817}" srcOrd="0" destOrd="0" presId="urn:microsoft.com/office/officeart/2005/8/layout/hierarchy4"/>
-    <dgm:cxn modelId="{B568EE7B-4796-47D5-B940-F7BE2C48D541}" srcId="{7233F472-5AD0-488F-823E-AB684E1B90A7}" destId="{4964D2D3-AEBA-4A45-B14B-5C8E9D8B9E4B}" srcOrd="2" destOrd="0" parTransId="{311A0B1E-B601-44C6-96ED-9A1860785FE2}" sibTransId="{3F84FEE0-D50B-4660-98E4-81A9AE64048C}"/>
-    <dgm:cxn modelId="{FF7E81E4-B664-4792-948E-9404A208C223}" srcId="{FAF914B6-99EC-4003-B59C-6B61778F7BF7}" destId="{451511D5-9698-43DB-AC78-B4CC044EF837}" srcOrd="1" destOrd="0" parTransId="{59E278F8-75B4-483C-87E7-7DABB42B9761}" sibTransId="{AA593F06-81F0-41D8-A661-8C53A18C3A11}"/>
-    <dgm:cxn modelId="{92495F98-C855-436C-AB63-8BCA4DF44D83}" srcId="{8052CE9C-B566-4944-BAF7-24722EBE8E4B}" destId="{113F5C9A-C6DB-4E45-B36C-C13CEC53E005}" srcOrd="1" destOrd="0" parTransId="{9BAA8D21-11C1-4516-ACA4-031E404701C8}" sibTransId="{E91F26FF-21B5-4A5B-A590-7989FF04D983}"/>
-    <dgm:cxn modelId="{A5294D80-AAA6-4BFA-A898-F60E91759FAF}" type="presOf" srcId="{FAF914B6-99EC-4003-B59C-6B61778F7BF7}" destId="{C842A458-1709-49C2-B512-7A83580D606B}" srcOrd="0" destOrd="0" presId="urn:microsoft.com/office/officeart/2005/8/layout/hierarchy4"/>
-    <dgm:cxn modelId="{E1012053-3449-4D8D-BBDA-3500B232A1A8}" srcId="{D5B0C5AB-1A0C-4FBB-B5C8-1AED8427A126}" destId="{B5326564-FBEB-4B86-BD41-A8EF11D56995}" srcOrd="2" destOrd="0" parTransId="{73C5170A-E177-48E8-9DBF-1B57201E0DA4}" sibTransId="{AA435247-F6C6-4BD1-88B5-98FE9A39A21B}"/>
-    <dgm:cxn modelId="{6423558B-6BF5-46D9-901F-9469BA90710A}" srcId="{8052CE9C-B566-4944-BAF7-24722EBE8E4B}" destId="{30BFD9D6-5903-49A9-89E5-181B0DEDC7C2}" srcOrd="4" destOrd="0" parTransId="{48338E46-FE72-4558-8DCA-0198067C94F5}" sibTransId="{D60BCF95-AD49-4A52-942B-87FCD94C954E}"/>
-    <dgm:cxn modelId="{A4A05ECF-097F-4397-93A0-921DBE566055}" srcId="{69864CEF-5157-4106-8090-543F8D357164}" destId="{C4795D55-2785-4971-BC3D-93FB185D704E}" srcOrd="5" destOrd="0" parTransId="{A0FAB73F-DE12-4F79-96CF-05FC5C99C10E}" sibTransId="{B896113C-3E93-4EE7-A861-53E86206EFB8}"/>
-    <dgm:cxn modelId="{E28D180B-F594-49FC-89BB-064EFC2F5F7F}" srcId="{DD799618-554E-4A3E-9C4F-DE7E92060013}" destId="{5D6A5001-45DD-4EB9-8FA3-93D34F22F51C}" srcOrd="2" destOrd="0" parTransId="{B89A4205-4784-4B88-96A7-961A04605FF6}" sibTransId="{F95790B8-0013-4040-B2D9-A7E931D4BB3E}"/>
-    <dgm:cxn modelId="{F102D476-93D0-4556-8B12-663DCEA900D7}" type="presOf" srcId="{463CAF73-C9A4-4ACE-BC6B-87914DFA02FD}" destId="{C4E89544-CCCF-4E83-AFD8-1F95C1839F85}" srcOrd="0" destOrd="0" presId="urn:microsoft.com/office/officeart/2005/8/layout/hierarchy4"/>
-    <dgm:cxn modelId="{CBAC481E-11DE-4AB6-B13C-1B7AAD002303}" type="presOf" srcId="{7233F472-5AD0-488F-823E-AB684E1B90A7}" destId="{C6E69324-4915-4657-9255-9E99FBAADB57}" srcOrd="0" destOrd="0" presId="urn:microsoft.com/office/officeart/2005/8/layout/hierarchy4"/>
-    <dgm:cxn modelId="{193BC26B-A115-4440-BA44-DC6F85ACA7A0}" srcId="{69864CEF-5157-4106-8090-543F8D357164}" destId="{BBDBDAB7-7269-4A9E-B868-88B67F4CD2B6}" srcOrd="4" destOrd="0" parTransId="{62B0B4EC-02C4-4CE9-83FF-026F575CEBC7}" sibTransId="{696FC5EE-F5DB-4B5F-A420-274856D51EC5}"/>
-    <dgm:cxn modelId="{D60C5995-46C7-4F03-94F3-7C0EC9D607DC}" srcId="{D5B0C5AB-1A0C-4FBB-B5C8-1AED8427A126}" destId="{CACCD36B-4FDE-476A-86FE-CB7387FC4CE8}" srcOrd="1" destOrd="0" parTransId="{744CF3AA-8E5E-4259-9C11-C2CB1EA39ACF}" sibTransId="{7B4F09AA-4CDB-477B-92E6-B0C3BFE49A91}"/>
     <dgm:cxn modelId="{5FEF4AB6-6C63-486E-8417-5038CF269BB7}" srcId="{E5236834-88F9-4DA4-A749-F9AF048C259A}" destId="{DD799618-554E-4A3E-9C4F-DE7E92060013}" srcOrd="2" destOrd="0" parTransId="{A08B9E1F-134D-41A3-9648-185C5B69D487}" sibTransId="{C23DDE0D-EFC5-40DB-8258-D742B3CC5A07}"/>
     <dgm:cxn modelId="{B9893C6F-1886-4266-8B1D-A5BFD0971FDC}" srcId="{82A1462A-81AD-42C2-90BF-5468391F2673}" destId="{E284042C-20FE-4268-AC7E-1C5A99D65F4F}" srcOrd="2" destOrd="0" parTransId="{6492F573-A280-42BF-B7AB-079BD3B16EFF}" sibTransId="{7329045A-576F-4BB5-9F57-FBC6F4D3AB24}"/>
-    <dgm:cxn modelId="{2FB69565-F2D6-470A-801C-DD9C679A148E}" type="presOf" srcId="{837D7104-6EA3-4365-9F3A-8CBB86216267}" destId="{023E5A65-1311-4958-AD91-EAC920DC0AF7}" srcOrd="0" destOrd="0" presId="urn:microsoft.com/office/officeart/2005/8/layout/hierarchy4"/>
-    <dgm:cxn modelId="{F27824EE-408E-4836-A61D-038D1A3A2878}" srcId="{B5326564-FBEB-4B86-BD41-A8EF11D56995}" destId="{8E46B9FA-4FB6-4237-9872-7C34C9D363F4}" srcOrd="0" destOrd="0" parTransId="{7A75A2ED-A926-49D6-8094-4B2B552F45D2}" sibTransId="{35B426F9-6B96-4F91-9EEE-03F3D9671D31}"/>
-    <dgm:cxn modelId="{5A85BF61-E084-4691-8A72-287E2910D6F7}" type="presOf" srcId="{5278A937-81D2-4EBC-9DD3-3AED02A701B0}" destId="{E84D2AFA-A234-4397-B507-D9D270F2896B}" srcOrd="0" destOrd="0" presId="urn:microsoft.com/office/officeart/2005/8/layout/hierarchy4"/>
-    <dgm:cxn modelId="{3CB877BE-5CF9-4017-BD8A-F06517D250E2}" type="presOf" srcId="{6168BF5D-66BF-471E-9BA6-91C93E0D8E04}" destId="{BFDA3BC1-055B-4BEA-8AC0-C1B709E1CE61}" srcOrd="0" destOrd="0" presId="urn:microsoft.com/office/officeart/2005/8/layout/hierarchy4"/>
-    <dgm:cxn modelId="{11BD4F9D-4C5A-4EA6-9C14-E9862A0DF6CC}" type="presOf" srcId="{3D838B01-A275-4F63-BE2D-490DFED65CD3}" destId="{41A09248-2BF6-4236-80B9-6C333240238E}" srcOrd="0" destOrd="0" presId="urn:microsoft.com/office/officeart/2005/8/layout/hierarchy4"/>
-    <dgm:cxn modelId="{DFE26D28-DE41-4C96-80ED-4783B543F65A}" type="presOf" srcId="{113F5C9A-C6DB-4E45-B36C-C13CEC53E005}" destId="{F0DEB06C-855D-49FB-B969-7B8FE0C69DA4}" srcOrd="0" destOrd="0" presId="urn:microsoft.com/office/officeart/2005/8/layout/hierarchy4"/>
-    <dgm:cxn modelId="{E4240772-2D8C-4372-BEEB-B2B33FB91927}" type="presOf" srcId="{DD799618-554E-4A3E-9C4F-DE7E92060013}" destId="{98B18068-9578-4B4B-84A5-CDEC9E8B2DF3}" srcOrd="0" destOrd="0" presId="urn:microsoft.com/office/officeart/2005/8/layout/hierarchy4"/>
-    <dgm:cxn modelId="{DC8165E5-A45B-4CD5-9CDC-BAF5A985163A}" type="presOf" srcId="{B49CB8EE-772F-4F6A-B5A3-7E7FE6F512B3}" destId="{C11BF453-F7C5-4AA3-813E-50BDD8DCBF28}" srcOrd="0" destOrd="0" presId="urn:microsoft.com/office/officeart/2005/8/layout/hierarchy4"/>
-    <dgm:cxn modelId="{A88E8EB6-B6EA-424B-ADE9-0ECF941EA1FD}" type="presOf" srcId="{090D51A3-9CB3-45A9-B6A8-57998C94C21B}" destId="{902C8943-ECDE-45D5-B395-E644BE5F5857}" srcOrd="0" destOrd="0" presId="urn:microsoft.com/office/officeart/2005/8/layout/hierarchy4"/>
-    <dgm:cxn modelId="{D2CA3BBD-B4AF-4017-8597-E39B4792FA40}" srcId="{CACCD36B-4FDE-476A-86FE-CB7387FC4CE8}" destId="{3D838B01-A275-4F63-BE2D-490DFED65CD3}" srcOrd="1" destOrd="0" parTransId="{01798D21-61F2-4810-972C-E7BF918C9AF9}" sibTransId="{898DCED7-6616-4B49-A5A6-EEFA299F287F}"/>
-    <dgm:cxn modelId="{05176EBD-6D7A-473D-87DA-7DB9C30C4D3E}" srcId="{7233F472-5AD0-488F-823E-AB684E1B90A7}" destId="{5278A937-81D2-4EBC-9DD3-3AED02A701B0}" srcOrd="0" destOrd="0" parTransId="{9076CAB7-2782-4DCE-9D5D-CB7FC9973519}" sibTransId="{074C2B4D-FE2A-42AC-85AA-D3BFA14B44EB}"/>
-    <dgm:cxn modelId="{FC1384E2-ED18-47A7-84BE-304AEEAEC739}" srcId="{FAF914B6-99EC-4003-B59C-6B61778F7BF7}" destId="{2B2C2B2E-04AD-473A-B4D3-3C32E5DDD2BA}" srcOrd="0" destOrd="0" parTransId="{F0D0E9DB-606F-4DA6-BB5F-EA0898BC893F}" sibTransId="{FB4952E6-671F-4630-BCDF-A7531051BA87}"/>
-    <dgm:cxn modelId="{BA40A711-5378-488E-9AE3-845BAF66D0FB}" srcId="{82A1462A-81AD-42C2-90BF-5468391F2673}" destId="{6168BF5D-66BF-471E-9BA6-91C93E0D8E04}" srcOrd="0" destOrd="0" parTransId="{B1E0BE85-5742-4330-8DD5-31F043FBBFE3}" sibTransId="{C67376CF-21B8-418E-A9F4-D3144D1DEF9B}"/>
-    <dgm:cxn modelId="{02847A51-A843-4578-98E6-DAE2543D3006}" type="presOf" srcId="{30BFD9D6-5903-49A9-89E5-181B0DEDC7C2}" destId="{0058E322-1197-436D-A008-086C1A6C1153}" srcOrd="0" destOrd="0" presId="urn:microsoft.com/office/officeart/2005/8/layout/hierarchy4"/>
     <dgm:cxn modelId="{DB75BC14-FEAE-4167-9E62-15D04FADC582}" type="presOf" srcId="{451511D5-9698-43DB-AC78-B4CC044EF837}" destId="{32A22710-EEBD-4437-8F49-BB12154C1B86}" srcOrd="0" destOrd="0" presId="urn:microsoft.com/office/officeart/2005/8/layout/hierarchy4"/>
-    <dgm:cxn modelId="{9FA13CCF-8D49-4DDE-A3C1-75E591B4843D}" srcId="{82A1462A-81AD-42C2-90BF-5468391F2673}" destId="{8869F930-DA37-4B93-AE35-107B6DD4337A}" srcOrd="1" destOrd="0" parTransId="{3D37532C-18CA-4E52-901F-798476C77D3D}" sibTransId="{398FCD69-3371-48BD-93B5-39F85E3ED521}"/>
-    <dgm:cxn modelId="{A2B28AE0-54C0-4846-A6C0-7077ACBE160A}" srcId="{8052CE9C-B566-4944-BAF7-24722EBE8E4B}" destId="{25DE0665-8A9E-4AF1-A17E-A26E16D35A6E}" srcOrd="3" destOrd="0" parTransId="{FFF7CC4A-1706-491F-8042-D495A0E763E9}" sibTransId="{100F6FCE-FCAD-4617-B558-73BC39256759}"/>
+    <dgm:cxn modelId="{FFA3DE30-A15C-4297-B2E9-A6EF537CEAC0}" type="presOf" srcId="{B5326564-FBEB-4B86-BD41-A8EF11D56995}" destId="{546544D8-39F1-417C-8C9A-11ABD3D8C9BD}" srcOrd="0" destOrd="0" presId="urn:microsoft.com/office/officeart/2005/8/layout/hierarchy4"/>
+    <dgm:cxn modelId="{38BD91BF-F2F6-4388-ACB6-CF5ACAFF8896}" type="presOf" srcId="{F4F19C0A-6D76-4B4F-B4DE-6FE9AEDE3FCE}" destId="{145BF377-035C-403A-9A96-F5AE683E92C6}" srcOrd="0" destOrd="0" presId="urn:microsoft.com/office/officeart/2005/8/layout/hierarchy4"/>
+    <dgm:cxn modelId="{F102D476-93D0-4556-8B12-663DCEA900D7}" type="presOf" srcId="{463CAF73-C9A4-4ACE-BC6B-87914DFA02FD}" destId="{C4E89544-CCCF-4E83-AFD8-1F95C1839F85}" srcOrd="0" destOrd="0" presId="urn:microsoft.com/office/officeart/2005/8/layout/hierarchy4"/>
+    <dgm:cxn modelId="{69C3972D-2265-4709-B74C-8BFE14BF1C1E}" srcId="{DD799618-554E-4A3E-9C4F-DE7E92060013}" destId="{695B9890-A0B3-4D1F-B5C8-EFB002240621}" srcOrd="3" destOrd="0" parTransId="{E9B04242-9B81-409D-ADAF-844A2137E9FA}" sibTransId="{4E2CEFA5-C349-43A3-9760-A4531F6B5F42}"/>
+    <dgm:cxn modelId="{32ADE498-7A02-427D-883C-3F54664DD12A}" type="presOf" srcId="{8869F930-DA37-4B93-AE35-107B6DD4337A}" destId="{CF3213AC-44DE-4FD3-8A51-7AB92E16B5D8}" srcOrd="0" destOrd="0" presId="urn:microsoft.com/office/officeart/2005/8/layout/hierarchy4"/>
+    <dgm:cxn modelId="{574795F8-DFD4-49CB-BC6B-43E7F6C81324}" type="presOf" srcId="{C4795D55-2785-4971-BC3D-93FB185D704E}" destId="{2ACFD550-1C11-4AEC-AB1A-FD2BD557F95A}" srcOrd="0" destOrd="0" presId="urn:microsoft.com/office/officeart/2005/8/layout/hierarchy4"/>
+    <dgm:cxn modelId="{FDE85D14-8736-47AF-96F2-863164548B42}" type="presOf" srcId="{CACCD36B-4FDE-476A-86FE-CB7387FC4CE8}" destId="{084E608C-A490-4B89-A739-2F17E47C5984}" srcOrd="0" destOrd="0" presId="urn:microsoft.com/office/officeart/2005/8/layout/hierarchy4"/>
+    <dgm:cxn modelId="{9136AF5D-0AA7-4E19-B885-963FCFB61893}" type="presOf" srcId="{9D568DC1-8FF4-4EA8-B166-18FE6389BF46}" destId="{7E069352-F61A-45C9-BE49-D3150A5E417A}" srcOrd="0" destOrd="0" presId="urn:microsoft.com/office/officeart/2005/8/layout/hierarchy4"/>
     <dgm:cxn modelId="{E4801FE4-2928-4397-8C13-F5BE35D6A8F5}" type="presOf" srcId="{91DCF9E5-B3D7-458A-AFEA-DA7EA5DE8156}" destId="{CD353D81-134A-469C-BD58-7189D53E07E6}" srcOrd="0" destOrd="0" presId="urn:microsoft.com/office/officeart/2005/8/layout/hierarchy4"/>
-    <dgm:cxn modelId="{785CFE81-05C9-4208-AEFE-DA938CCA61B5}" type="presOf" srcId="{2B2C2B2E-04AD-473A-B4D3-3C32E5DDD2BA}" destId="{96008BAD-6E1D-49FA-9535-06B0B4CEA68B}" srcOrd="0" destOrd="0" presId="urn:microsoft.com/office/officeart/2005/8/layout/hierarchy4"/>
-    <dgm:cxn modelId="{5B179777-5751-4B84-AE8E-EB2C3D1B1DCD}" type="presOf" srcId="{4964D2D3-AEBA-4A45-B14B-5C8E9D8B9E4B}" destId="{C34D62DE-607D-4ADA-865E-DAA66DBC9DC1}" srcOrd="0" destOrd="0" presId="urn:microsoft.com/office/officeart/2005/8/layout/hierarchy4"/>
-    <dgm:cxn modelId="{D00E06E6-EB0D-423E-9628-9AFA4A6F33EF}" type="presOf" srcId="{E5236834-88F9-4DA4-A749-F9AF048C259A}" destId="{5CD0AD9A-BE32-4C42-A0E2-2276ACEB345F}" srcOrd="0" destOrd="0" presId="urn:microsoft.com/office/officeart/2005/8/layout/hierarchy4"/>
+    <dgm:cxn modelId="{AB3FF02E-CBF2-4ACE-A124-645678C36EE3}" srcId="{B5326564-FBEB-4B86-BD41-A8EF11D56995}" destId="{4A57402C-4985-4B98-B991-E0CFC4B99E59}" srcOrd="1" destOrd="0" parTransId="{9C32C4CF-3981-4FCE-901D-FCC3B22E39E0}" sibTransId="{2F23E3BB-4D08-45F8-954C-EBC01645A156}"/>
     <dgm:cxn modelId="{A78A2683-BCC9-4BB8-84E4-A9FEB5DB74D1}" type="presParOf" srcId="{1A900704-DB42-4E94-97AC-CDC005849B47}" destId="{7144254F-9D7D-4EC3-BB9B-A76B491C5C61}" srcOrd="0" destOrd="0" presId="urn:microsoft.com/office/officeart/2005/8/layout/hierarchy4"/>
     <dgm:cxn modelId="{E1A9325A-5C3F-411F-9F41-D32C5C1DD681}" type="presParOf" srcId="{7144254F-9D7D-4EC3-BB9B-A76B491C5C61}" destId="{019ACCC9-5EDB-4AB1-9323-EF5AAD46AF80}" srcOrd="0" destOrd="0" presId="urn:microsoft.com/office/officeart/2005/8/layout/hierarchy4"/>
     <dgm:cxn modelId="{7AED9358-1EF8-4857-A632-A10E27F1D7D4}" type="presParOf" srcId="{7144254F-9D7D-4EC3-BB9B-A76B491C5C61}" destId="{4A48E3D6-392F-44F7-8E29-A94E3DE55057}" srcOrd="1" destOrd="0" presId="urn:microsoft.com/office/officeart/2005/8/layout/hierarchy4"/>
@@ -10218,7 +10223,6 @@
             <a:rPr lang="de-DE"/>
             <a:t>Abschluss</a:t>
           </a:r>
-          <a:endParaRPr lang="de-DE"/>
         </a:p>
       </dgm:t>
     </dgm:pt>
@@ -10499,10 +10503,9 @@
         <a:lstStyle/>
         <a:p>
           <a:r>
-            <a:rPr lang="de-DE"/>
+            <a:rPr lang="de-DE" dirty="0"/>
             <a:t>Design</a:t>
           </a:r>
-          <a:endParaRPr lang="de-DE"/>
         </a:p>
       </dgm:t>
     </dgm:pt>
@@ -10537,13 +10540,8 @@
         <a:p>
           <a:r>
             <a:rPr lang="de-DE" dirty="0"/>
-            <a:t>Mock </a:t>
+            <a:t>Konzept</a:t>
           </a:r>
-          <a:r>
-            <a:rPr lang="de-DE" dirty="0" err="1"/>
-            <a:t>Up</a:t>
-          </a:r>
-          <a:endParaRPr lang="de-DE" dirty="0"/>
         </a:p>
       </dgm:t>
     </dgm:pt>
@@ -10569,7 +10567,152 @@
         </a:p>
       </dgm:t>
     </dgm:pt>
-    <dgm:pt modelId="{A64E232F-0E51-44F4-AA70-DBCFADAD54D1}">
+    <dgm:pt modelId="{45141E16-EE06-45B8-95DA-DA9B3279F4EA}">
+      <dgm:prSet phldrT="[Text]"/>
+      <dgm:spPr/>
+      <dgm:t>
+        <a:bodyPr/>
+        <a:lstStyle/>
+        <a:p>
+          <a:r>
+            <a:rPr lang="de-DE" dirty="0"/>
+            <a:t>Umsetzung</a:t>
+          </a:r>
+        </a:p>
+      </dgm:t>
+    </dgm:pt>
+    <dgm:pt modelId="{D6EB6FDE-062E-4602-BC0B-E1961E9B6A21}" type="parTrans" cxnId="{51AB6A5D-80DD-44C4-9A42-F2520C55EFE0}">
+      <dgm:prSet/>
+      <dgm:spPr/>
+      <dgm:t>
+        <a:bodyPr/>
+        <a:lstStyle/>
+        <a:p>
+          <a:endParaRPr lang="de-DE"/>
+        </a:p>
+      </dgm:t>
+    </dgm:pt>
+    <dgm:pt modelId="{E45CEA43-6F7B-4083-B8F3-E5F933E95139}" type="sibTrans" cxnId="{51AB6A5D-80DD-44C4-9A42-F2520C55EFE0}">
+      <dgm:prSet/>
+      <dgm:spPr/>
+      <dgm:t>
+        <a:bodyPr/>
+        <a:lstStyle/>
+        <a:p>
+          <a:endParaRPr lang="de-DE"/>
+        </a:p>
+      </dgm:t>
+    </dgm:pt>
+    <dgm:pt modelId="{A8E9FD59-6112-40B1-B594-D24F5A24FF94}">
+      <dgm:prSet phldrT="[Text]"/>
+      <dgm:spPr/>
+      <dgm:t>
+        <a:bodyPr/>
+        <a:lstStyle/>
+        <a:p>
+          <a:r>
+            <a:rPr lang="de-DE" dirty="0"/>
+            <a:t>HTML</a:t>
+          </a:r>
+        </a:p>
+      </dgm:t>
+    </dgm:pt>
+    <dgm:pt modelId="{232818BD-629F-42B8-B5BE-404E55D5C272}" type="parTrans" cxnId="{F84AF8B3-35A9-4F74-BDB1-E7AB4A35E19F}">
+      <dgm:prSet/>
+      <dgm:spPr/>
+      <dgm:t>
+        <a:bodyPr/>
+        <a:lstStyle/>
+        <a:p>
+          <a:endParaRPr lang="de-DE"/>
+        </a:p>
+      </dgm:t>
+    </dgm:pt>
+    <dgm:pt modelId="{C07EDA8B-B676-4987-A3A4-4A79DADC0A66}" type="sibTrans" cxnId="{F84AF8B3-35A9-4F74-BDB1-E7AB4A35E19F}">
+      <dgm:prSet/>
+      <dgm:spPr/>
+      <dgm:t>
+        <a:bodyPr/>
+        <a:lstStyle/>
+        <a:p>
+          <a:endParaRPr lang="de-DE"/>
+        </a:p>
+      </dgm:t>
+    </dgm:pt>
+    <dgm:pt modelId="{205803A0-926E-4272-BBE9-AB3388C70ADE}">
+      <dgm:prSet phldrT="[Text]"/>
+      <dgm:spPr/>
+      <dgm:t>
+        <a:bodyPr/>
+        <a:lstStyle/>
+        <a:p>
+          <a:r>
+            <a:rPr lang="de-DE" dirty="0"/>
+            <a:t>CSS</a:t>
+          </a:r>
+        </a:p>
+      </dgm:t>
+    </dgm:pt>
+    <dgm:pt modelId="{AF888009-72EF-4F4C-8229-7E64C6F66A8F}" type="parTrans" cxnId="{1C57B2D5-71D3-4CB2-906F-EF749B0B53B3}">
+      <dgm:prSet/>
+      <dgm:spPr/>
+      <dgm:t>
+        <a:bodyPr/>
+        <a:lstStyle/>
+        <a:p>
+          <a:endParaRPr lang="de-DE"/>
+        </a:p>
+      </dgm:t>
+    </dgm:pt>
+    <dgm:pt modelId="{FE748CFE-CEED-4085-BF2A-0F2A32BE0E3D}" type="sibTrans" cxnId="{1C57B2D5-71D3-4CB2-906F-EF749B0B53B3}">
+      <dgm:prSet/>
+      <dgm:spPr/>
+      <dgm:t>
+        <a:bodyPr/>
+        <a:lstStyle/>
+        <a:p>
+          <a:endParaRPr lang="de-DE"/>
+        </a:p>
+      </dgm:t>
+    </dgm:pt>
+    <dgm:pt modelId="{019A6906-1D18-423F-8FDA-F5ACBAFDD54E}">
+      <dgm:prSet phldrT="[Text]"/>
+      <dgm:spPr/>
+      <dgm:t>
+        <a:bodyPr/>
+        <a:lstStyle/>
+        <a:p>
+          <a:r>
+            <a:rPr lang="de-DE" dirty="0" err="1"/>
+            <a:t>MockUp</a:t>
+          </a:r>
+          <a:endParaRPr lang="de-DE" dirty="0"/>
+        </a:p>
+      </dgm:t>
+    </dgm:pt>
+    <dgm:pt modelId="{E345F0D6-B674-4410-A464-05DA8A1C96ED}" type="parTrans" cxnId="{24BF0F9F-1EB8-49D2-819E-53CC609931F9}">
+      <dgm:prSet/>
+      <dgm:spPr/>
+      <dgm:t>
+        <a:bodyPr/>
+        <a:lstStyle/>
+        <a:p>
+          <a:endParaRPr lang="de-DE"/>
+        </a:p>
+      </dgm:t>
+    </dgm:pt>
+    <dgm:pt modelId="{7273747E-27EC-4DAD-BBA6-761BF75459E5}" type="sibTrans" cxnId="{24BF0F9F-1EB8-49D2-819E-53CC609931F9}">
+      <dgm:prSet/>
+      <dgm:spPr/>
+      <dgm:t>
+        <a:bodyPr/>
+        <a:lstStyle/>
+        <a:p>
+          <a:endParaRPr lang="de-DE"/>
+        </a:p>
+      </dgm:t>
+    </dgm:pt>
+    <dgm:pt modelId="{9799B337-65D9-4A80-BB22-90E652A3BA84}">
       <dgm:prSet phldrT="[Text]"/>
       <dgm:spPr/>
       <dgm:t>
@@ -10584,7 +10727,7 @@
         </a:p>
       </dgm:t>
     </dgm:pt>
-    <dgm:pt modelId="{1C741759-511B-42D7-A9DC-3FD1078DC99D}" type="parTrans" cxnId="{9D82CB97-9DDE-45CF-84AF-2880481FFA27}">
+    <dgm:pt modelId="{E2D1D8F8-5819-4032-8070-A543F207A9D7}" type="parTrans" cxnId="{CC3F5100-9C7C-46F3-BAD2-DC2AB0B9689D}">
       <dgm:prSet/>
       <dgm:spPr/>
       <dgm:t>
@@ -10595,43 +10738,7 @@
         </a:p>
       </dgm:t>
     </dgm:pt>
-    <dgm:pt modelId="{8010D92C-61E8-43C1-9505-6EFB344F0AEE}" type="sibTrans" cxnId="{9D82CB97-9DDE-45CF-84AF-2880481FFA27}">
-      <dgm:prSet/>
-      <dgm:spPr/>
-      <dgm:t>
-        <a:bodyPr/>
-        <a:lstStyle/>
-        <a:p>
-          <a:endParaRPr lang="de-DE"/>
-        </a:p>
-      </dgm:t>
-    </dgm:pt>
-    <dgm:pt modelId="{2E9F9C20-DB83-4F45-AE2D-F963A5803174}">
-      <dgm:prSet phldrT="[Text]"/>
-      <dgm:spPr/>
-      <dgm:t>
-        <a:bodyPr/>
-        <a:lstStyle/>
-        <a:p>
-          <a:r>
-            <a:rPr lang="de-DE" dirty="0"/>
-            <a:t>HTML / CSS Umsetzung</a:t>
-          </a:r>
-        </a:p>
-      </dgm:t>
-    </dgm:pt>
-    <dgm:pt modelId="{377DCD11-CABB-45E6-98AE-8E4F55C5C426}" type="parTrans" cxnId="{C1871B34-7177-40F9-9F8B-BF00C2A60719}">
-      <dgm:prSet/>
-      <dgm:spPr/>
-      <dgm:t>
-        <a:bodyPr/>
-        <a:lstStyle/>
-        <a:p>
-          <a:endParaRPr lang="de-DE"/>
-        </a:p>
-      </dgm:t>
-    </dgm:pt>
-    <dgm:pt modelId="{70AED0EF-CB6B-4D73-BDF7-80108045872A}" type="sibTrans" cxnId="{C1871B34-7177-40F9-9F8B-BF00C2A60719}">
+    <dgm:pt modelId="{64A79FF1-09C3-4C22-835B-AD0D1F61E6E5}" type="sibTrans" cxnId="{CC3F5100-9C7C-46F3-BAD2-DC2AB0B9689D}">
       <dgm:prSet/>
       <dgm:spPr/>
       <dgm:t>
@@ -10674,88 +10781,166 @@
       <dgm:prSet presAssocID="{F5C46F3C-6D63-4422-BAC9-FEDE7040A974}" presName="horzOne" presStyleCnt="0"/>
       <dgm:spPr/>
     </dgm:pt>
-    <dgm:pt modelId="{42DE55D2-0B59-4807-9308-593ACF088935}" type="pres">
-      <dgm:prSet presAssocID="{E8D7ABBA-C760-407B-AB97-881DC528F9D3}" presName="vertTwo" presStyleCnt="0"/>
-      <dgm:spPr/>
-    </dgm:pt>
-    <dgm:pt modelId="{E691C4EA-E48E-43BD-A0E8-701801E40CF7}" type="pres">
-      <dgm:prSet presAssocID="{E8D7ABBA-C760-407B-AB97-881DC528F9D3}" presName="txTwo" presStyleLbl="node2" presStyleIdx="0" presStyleCnt="3">
+    <dgm:pt modelId="{201D2DE5-05F2-4940-80C4-77697F0A1E2B}" type="pres">
+      <dgm:prSet presAssocID="{45141E16-EE06-45B8-95DA-DA9B3279F4EA}" presName="vertTwo" presStyleCnt="0"/>
+      <dgm:spPr/>
+    </dgm:pt>
+    <dgm:pt modelId="{7BD4B7AB-17A7-4E45-8E06-9DAFAB1DB37C}" type="pres">
+      <dgm:prSet presAssocID="{45141E16-EE06-45B8-95DA-DA9B3279F4EA}" presName="txTwo" presStyleLbl="node2" presStyleIdx="0" presStyleCnt="2">
         <dgm:presLayoutVars>
           <dgm:chPref val="3"/>
         </dgm:presLayoutVars>
       </dgm:prSet>
       <dgm:spPr/>
     </dgm:pt>
-    <dgm:pt modelId="{9ABE7BFC-5788-463D-95C5-B639E8F326A5}" type="pres">
-      <dgm:prSet presAssocID="{E8D7ABBA-C760-407B-AB97-881DC528F9D3}" presName="horzTwo" presStyleCnt="0"/>
-      <dgm:spPr/>
-    </dgm:pt>
-    <dgm:pt modelId="{A0F24FBE-52EE-4206-AC63-1B6E36F4AF9B}" type="pres">
-      <dgm:prSet presAssocID="{3F781C4A-FDE2-4846-BE7A-0C4A8476E2E9}" presName="sibSpaceTwo" presStyleCnt="0"/>
-      <dgm:spPr/>
-    </dgm:pt>
-    <dgm:pt modelId="{B206D50A-C52C-457B-BBCC-BDC1F2DA6799}" type="pres">
-      <dgm:prSet presAssocID="{A64E232F-0E51-44F4-AA70-DBCFADAD54D1}" presName="vertTwo" presStyleCnt="0"/>
-      <dgm:spPr/>
-    </dgm:pt>
-    <dgm:pt modelId="{C3482519-EAE5-4F94-A27A-77F4E460E113}" type="pres">
-      <dgm:prSet presAssocID="{A64E232F-0E51-44F4-AA70-DBCFADAD54D1}" presName="txTwo" presStyleLbl="node2" presStyleIdx="1" presStyleCnt="3">
+    <dgm:pt modelId="{FF5918D5-41A5-4187-838E-4F04A0484FB2}" type="pres">
+      <dgm:prSet presAssocID="{45141E16-EE06-45B8-95DA-DA9B3279F4EA}" presName="parTransTwo" presStyleCnt="0"/>
+      <dgm:spPr/>
+    </dgm:pt>
+    <dgm:pt modelId="{C0FEBA03-BEC7-4F0D-9A35-80FD5F577E17}" type="pres">
+      <dgm:prSet presAssocID="{45141E16-EE06-45B8-95DA-DA9B3279F4EA}" presName="horzTwo" presStyleCnt="0"/>
+      <dgm:spPr/>
+    </dgm:pt>
+    <dgm:pt modelId="{D082A621-824E-4BCA-8DC8-BFB49BA7B1DB}" type="pres">
+      <dgm:prSet presAssocID="{A8E9FD59-6112-40B1-B594-D24F5A24FF94}" presName="vertThree" presStyleCnt="0"/>
+      <dgm:spPr/>
+    </dgm:pt>
+    <dgm:pt modelId="{60097A8B-5568-4FBC-916D-575075825EAB}" type="pres">
+      <dgm:prSet presAssocID="{A8E9FD59-6112-40B1-B594-D24F5A24FF94}" presName="txThree" presStyleLbl="node3" presStyleIdx="0" presStyleCnt="4">
         <dgm:presLayoutVars>
           <dgm:chPref val="3"/>
         </dgm:presLayoutVars>
       </dgm:prSet>
       <dgm:spPr/>
     </dgm:pt>
-    <dgm:pt modelId="{694869B0-6456-476C-8B30-6E4D37E71BE9}" type="pres">
-      <dgm:prSet presAssocID="{A64E232F-0E51-44F4-AA70-DBCFADAD54D1}" presName="horzTwo" presStyleCnt="0"/>
-      <dgm:spPr/>
-    </dgm:pt>
-    <dgm:pt modelId="{4488F77F-00DF-49B7-A321-62F26861B94C}" type="pres">
-      <dgm:prSet presAssocID="{8010D92C-61E8-43C1-9505-6EFB344F0AEE}" presName="sibSpaceTwo" presStyleCnt="0"/>
-      <dgm:spPr/>
-    </dgm:pt>
-    <dgm:pt modelId="{EEFE818A-8F94-466D-AF01-837B9C7110E9}" type="pres">
-      <dgm:prSet presAssocID="{2E9F9C20-DB83-4F45-AE2D-F963A5803174}" presName="vertTwo" presStyleCnt="0"/>
-      <dgm:spPr/>
-    </dgm:pt>
-    <dgm:pt modelId="{6AC255C2-61BA-42D6-954F-512C42364D51}" type="pres">
-      <dgm:prSet presAssocID="{2E9F9C20-DB83-4F45-AE2D-F963A5803174}" presName="txTwo" presStyleLbl="node2" presStyleIdx="2" presStyleCnt="3">
+    <dgm:pt modelId="{239DB43E-3005-44C6-B652-61B3EBE2640B}" type="pres">
+      <dgm:prSet presAssocID="{A8E9FD59-6112-40B1-B594-D24F5A24FF94}" presName="horzThree" presStyleCnt="0"/>
+      <dgm:spPr/>
+    </dgm:pt>
+    <dgm:pt modelId="{0900FC41-5C6D-445D-96E8-D3F77ED10E21}" type="pres">
+      <dgm:prSet presAssocID="{C07EDA8B-B676-4987-A3A4-4A79DADC0A66}" presName="sibSpaceThree" presStyleCnt="0"/>
+      <dgm:spPr/>
+    </dgm:pt>
+    <dgm:pt modelId="{5B4E3D02-38E9-4B53-AA27-B58B00031151}" type="pres">
+      <dgm:prSet presAssocID="{205803A0-926E-4272-BBE9-AB3388C70ADE}" presName="vertThree" presStyleCnt="0"/>
+      <dgm:spPr/>
+    </dgm:pt>
+    <dgm:pt modelId="{D43B44A2-6CE7-4681-B3D9-CB8A666F1D0C}" type="pres">
+      <dgm:prSet presAssocID="{205803A0-926E-4272-BBE9-AB3388C70ADE}" presName="txThree" presStyleLbl="node3" presStyleIdx="1" presStyleCnt="4">
         <dgm:presLayoutVars>
           <dgm:chPref val="3"/>
         </dgm:presLayoutVars>
       </dgm:prSet>
       <dgm:spPr/>
     </dgm:pt>
-    <dgm:pt modelId="{12412640-55CF-4337-A6CF-27D9156F330B}" type="pres">
-      <dgm:prSet presAssocID="{2E9F9C20-DB83-4F45-AE2D-F963A5803174}" presName="horzTwo" presStyleCnt="0"/>
+    <dgm:pt modelId="{BA62D10D-599A-4030-A734-9CB6DBA04742}" type="pres">
+      <dgm:prSet presAssocID="{205803A0-926E-4272-BBE9-AB3388C70ADE}" presName="horzThree" presStyleCnt="0"/>
+      <dgm:spPr/>
+    </dgm:pt>
+    <dgm:pt modelId="{E21EC8F8-40AF-4717-84A4-5C3CF807E0AF}" type="pres">
+      <dgm:prSet presAssocID="{E45CEA43-6F7B-4083-B8F3-E5F933E95139}" presName="sibSpaceTwo" presStyleCnt="0"/>
+      <dgm:spPr/>
+    </dgm:pt>
+    <dgm:pt modelId="{42DE55D2-0B59-4807-9308-593ACF088935}" type="pres">
+      <dgm:prSet presAssocID="{E8D7ABBA-C760-407B-AB97-881DC528F9D3}" presName="vertTwo" presStyleCnt="0"/>
+      <dgm:spPr/>
+    </dgm:pt>
+    <dgm:pt modelId="{E691C4EA-E48E-43BD-A0E8-701801E40CF7}" type="pres">
+      <dgm:prSet presAssocID="{E8D7ABBA-C760-407B-AB97-881DC528F9D3}" presName="txTwo" presStyleLbl="node2" presStyleIdx="1" presStyleCnt="2">
+        <dgm:presLayoutVars>
+          <dgm:chPref val="3"/>
+        </dgm:presLayoutVars>
+      </dgm:prSet>
+      <dgm:spPr/>
+    </dgm:pt>
+    <dgm:pt modelId="{5331D28A-E952-4CBC-81D6-70EF6180062B}" type="pres">
+      <dgm:prSet presAssocID="{E8D7ABBA-C760-407B-AB97-881DC528F9D3}" presName="parTransTwo" presStyleCnt="0"/>
+      <dgm:spPr/>
+    </dgm:pt>
+    <dgm:pt modelId="{9ABE7BFC-5788-463D-95C5-B639E8F326A5}" type="pres">
+      <dgm:prSet presAssocID="{E8D7ABBA-C760-407B-AB97-881DC528F9D3}" presName="horzTwo" presStyleCnt="0"/>
+      <dgm:spPr/>
+    </dgm:pt>
+    <dgm:pt modelId="{2E938C2E-8357-414B-A1C2-F3845A9A8977}" type="pres">
+      <dgm:prSet presAssocID="{019A6906-1D18-423F-8FDA-F5ACBAFDD54E}" presName="vertThree" presStyleCnt="0"/>
+      <dgm:spPr/>
+    </dgm:pt>
+    <dgm:pt modelId="{79DABC98-E30B-4D43-9D9B-EBB1E15DFF45}" type="pres">
+      <dgm:prSet presAssocID="{019A6906-1D18-423F-8FDA-F5ACBAFDD54E}" presName="txThree" presStyleLbl="node3" presStyleIdx="2" presStyleCnt="4">
+        <dgm:presLayoutVars>
+          <dgm:chPref val="3"/>
+        </dgm:presLayoutVars>
+      </dgm:prSet>
+      <dgm:spPr/>
+    </dgm:pt>
+    <dgm:pt modelId="{4D45EB07-BCB5-43EA-967F-742013AE4CB6}" type="pres">
+      <dgm:prSet presAssocID="{019A6906-1D18-423F-8FDA-F5ACBAFDD54E}" presName="horzThree" presStyleCnt="0"/>
+      <dgm:spPr/>
+    </dgm:pt>
+    <dgm:pt modelId="{BC0A9B18-EF1F-4974-9444-179EDC9D060A}" type="pres">
+      <dgm:prSet presAssocID="{7273747E-27EC-4DAD-BBA6-761BF75459E5}" presName="sibSpaceThree" presStyleCnt="0"/>
+      <dgm:spPr/>
+    </dgm:pt>
+    <dgm:pt modelId="{23237127-AB65-45C2-9336-50B6FEC2BAF3}" type="pres">
+      <dgm:prSet presAssocID="{9799B337-65D9-4A80-BB22-90E652A3BA84}" presName="vertThree" presStyleCnt="0"/>
+      <dgm:spPr/>
+    </dgm:pt>
+    <dgm:pt modelId="{1D258615-A3E1-47DC-A6C2-09D2AFE3E8B9}" type="pres">
+      <dgm:prSet presAssocID="{9799B337-65D9-4A80-BB22-90E652A3BA84}" presName="txThree" presStyleLbl="node3" presStyleIdx="3" presStyleCnt="4">
+        <dgm:presLayoutVars>
+          <dgm:chPref val="3"/>
+        </dgm:presLayoutVars>
+      </dgm:prSet>
+      <dgm:spPr/>
+    </dgm:pt>
+    <dgm:pt modelId="{3D658503-DBD6-4FB6-957F-1A00AB1294ED}" type="pres">
+      <dgm:prSet presAssocID="{9799B337-65D9-4A80-BB22-90E652A3BA84}" presName="horzThree" presStyleCnt="0"/>
       <dgm:spPr/>
     </dgm:pt>
   </dgm:ptLst>
   <dgm:cxnLst>
-    <dgm:cxn modelId="{C1871B34-7177-40F9-9F8B-BF00C2A60719}" srcId="{F5C46F3C-6D63-4422-BAC9-FEDE7040A974}" destId="{2E9F9C20-DB83-4F45-AE2D-F963A5803174}" srcOrd="2" destOrd="0" parTransId="{377DCD11-CABB-45E6-98AE-8E4F55C5C426}" sibTransId="{70AED0EF-CB6B-4D73-BDF7-80108045872A}"/>
+    <dgm:cxn modelId="{1FF4CD5B-04FA-4687-A7FA-91EED1DC43F3}" type="presOf" srcId="{205803A0-926E-4272-BBE9-AB3388C70ADE}" destId="{D43B44A2-6CE7-4681-B3D9-CB8A666F1D0C}" srcOrd="0" destOrd="0" presId="urn:microsoft.com/office/officeart/2005/8/layout/hierarchy4"/>
+    <dgm:cxn modelId="{444F4C54-0697-48F1-98C6-D07F77B81885}" type="presOf" srcId="{E8D7ABBA-C760-407B-AB97-881DC528F9D3}" destId="{E691C4EA-E48E-43BD-A0E8-701801E40CF7}" srcOrd="0" destOrd="0" presId="urn:microsoft.com/office/officeart/2005/8/layout/hierarchy4"/>
+    <dgm:cxn modelId="{37547156-4A1E-43B8-9AA2-9F1A9C773EF5}" srcId="{F5C46F3C-6D63-4422-BAC9-FEDE7040A974}" destId="{E8D7ABBA-C760-407B-AB97-881DC528F9D3}" srcOrd="1" destOrd="0" parTransId="{78626A68-CBF6-402C-BECB-192673C18C87}" sibTransId="{3F781C4A-FDE2-4846-BE7A-0C4A8476E2E9}"/>
+    <dgm:cxn modelId="{5DBA685E-6944-48FB-81A8-B031A1198868}" type="presOf" srcId="{F5C46F3C-6D63-4422-BAC9-FEDE7040A974}" destId="{31B77679-7168-4F66-A654-55995E52E901}" srcOrd="0" destOrd="0" presId="urn:microsoft.com/office/officeart/2005/8/layout/hierarchy4"/>
+    <dgm:cxn modelId="{13D86ED1-4755-4F03-9A0A-EEE73E0CB104}" type="presOf" srcId="{A8E9FD59-6112-40B1-B594-D24F5A24FF94}" destId="{60097A8B-5568-4FBC-916D-575075825EAB}" srcOrd="0" destOrd="0" presId="urn:microsoft.com/office/officeart/2005/8/layout/hierarchy4"/>
+    <dgm:cxn modelId="{6A8BF7E1-E613-4978-AEB3-2A5D571FB46B}" srcId="{4474AA86-B194-42EA-BB61-05899D7EBFC2}" destId="{F5C46F3C-6D63-4422-BAC9-FEDE7040A974}" srcOrd="0" destOrd="0" parTransId="{E459F894-CE30-44FD-A9EF-46CEAA5AE2BB}" sibTransId="{6C2ADF2F-A0BB-4427-B757-6D844B1F8294}"/>
+    <dgm:cxn modelId="{ECC93354-44FA-4AC8-BA4E-6A49967D165C}" type="presOf" srcId="{9799B337-65D9-4A80-BB22-90E652A3BA84}" destId="{1D258615-A3E1-47DC-A6C2-09D2AFE3E8B9}" srcOrd="0" destOrd="0" presId="urn:microsoft.com/office/officeart/2005/8/layout/hierarchy4"/>
+    <dgm:cxn modelId="{1C57B2D5-71D3-4CB2-906F-EF749B0B53B3}" srcId="{45141E16-EE06-45B8-95DA-DA9B3279F4EA}" destId="{205803A0-926E-4272-BBE9-AB3388C70ADE}" srcOrd="1" destOrd="0" parTransId="{AF888009-72EF-4F4C-8229-7E64C6F66A8F}" sibTransId="{FE748CFE-CEED-4085-BF2A-0F2A32BE0E3D}"/>
+    <dgm:cxn modelId="{CC3F5100-9C7C-46F3-BAD2-DC2AB0B9689D}" srcId="{E8D7ABBA-C760-407B-AB97-881DC528F9D3}" destId="{9799B337-65D9-4A80-BB22-90E652A3BA84}" srcOrd="1" destOrd="0" parTransId="{E2D1D8F8-5819-4032-8070-A543F207A9D7}" sibTransId="{64A79FF1-09C3-4C22-835B-AD0D1F61E6E5}"/>
+    <dgm:cxn modelId="{F84AF8B3-35A9-4F74-BDB1-E7AB4A35E19F}" srcId="{45141E16-EE06-45B8-95DA-DA9B3279F4EA}" destId="{A8E9FD59-6112-40B1-B594-D24F5A24FF94}" srcOrd="0" destOrd="0" parTransId="{232818BD-629F-42B8-B5BE-404E55D5C272}" sibTransId="{C07EDA8B-B676-4987-A3A4-4A79DADC0A66}"/>
+    <dgm:cxn modelId="{A5EFB624-64F6-4C5C-913F-EAC3748E34BE}" type="presOf" srcId="{019A6906-1D18-423F-8FDA-F5ACBAFDD54E}" destId="{79DABC98-E30B-4D43-9D9B-EBB1E15DFF45}" srcOrd="0" destOrd="0" presId="urn:microsoft.com/office/officeart/2005/8/layout/hierarchy4"/>
     <dgm:cxn modelId="{E805275B-439C-4258-BE61-FD3417FAAD7B}" type="presOf" srcId="{4474AA86-B194-42EA-BB61-05899D7EBFC2}" destId="{0721AE21-7D28-4A94-98E4-A4A7151A6981}" srcOrd="0" destOrd="0" presId="urn:microsoft.com/office/officeart/2005/8/layout/hierarchy4"/>
-    <dgm:cxn modelId="{03A6123F-7F23-4C02-8C2E-735C5D178E3F}" type="presOf" srcId="{A64E232F-0E51-44F4-AA70-DBCFADAD54D1}" destId="{C3482519-EAE5-4F94-A27A-77F4E460E113}" srcOrd="0" destOrd="0" presId="urn:microsoft.com/office/officeart/2005/8/layout/hierarchy4"/>
-    <dgm:cxn modelId="{37547156-4A1E-43B8-9AA2-9F1A9C773EF5}" srcId="{F5C46F3C-6D63-4422-BAC9-FEDE7040A974}" destId="{E8D7ABBA-C760-407B-AB97-881DC528F9D3}" srcOrd="0" destOrd="0" parTransId="{78626A68-CBF6-402C-BECB-192673C18C87}" sibTransId="{3F781C4A-FDE2-4846-BE7A-0C4A8476E2E9}"/>
-    <dgm:cxn modelId="{5DBA685E-6944-48FB-81A8-B031A1198868}" type="presOf" srcId="{F5C46F3C-6D63-4422-BAC9-FEDE7040A974}" destId="{31B77679-7168-4F66-A654-55995E52E901}" srcOrd="0" destOrd="0" presId="urn:microsoft.com/office/officeart/2005/8/layout/hierarchy4"/>
-    <dgm:cxn modelId="{6A8BF7E1-E613-4978-AEB3-2A5D571FB46B}" srcId="{4474AA86-B194-42EA-BB61-05899D7EBFC2}" destId="{F5C46F3C-6D63-4422-BAC9-FEDE7040A974}" srcOrd="0" destOrd="0" parTransId="{E459F894-CE30-44FD-A9EF-46CEAA5AE2BB}" sibTransId="{6C2ADF2F-A0BB-4427-B757-6D844B1F8294}"/>
-    <dgm:cxn modelId="{BD94DC7C-942B-4970-B0CD-218697975B82}" type="presOf" srcId="{2E9F9C20-DB83-4F45-AE2D-F963A5803174}" destId="{6AC255C2-61BA-42D6-954F-512C42364D51}" srcOrd="0" destOrd="0" presId="urn:microsoft.com/office/officeart/2005/8/layout/hierarchy4"/>
-    <dgm:cxn modelId="{0739B7AF-57BD-45CD-9A97-966210F85C86}" type="presOf" srcId="{E8D7ABBA-C760-407B-AB97-881DC528F9D3}" destId="{E691C4EA-E48E-43BD-A0E8-701801E40CF7}" srcOrd="0" destOrd="0" presId="urn:microsoft.com/office/officeart/2005/8/layout/hierarchy4"/>
-    <dgm:cxn modelId="{9D82CB97-9DDE-45CF-84AF-2880481FFA27}" srcId="{F5C46F3C-6D63-4422-BAC9-FEDE7040A974}" destId="{A64E232F-0E51-44F4-AA70-DBCFADAD54D1}" srcOrd="1" destOrd="0" parTransId="{1C741759-511B-42D7-A9DC-3FD1078DC99D}" sibTransId="{8010D92C-61E8-43C1-9505-6EFB344F0AEE}"/>
+    <dgm:cxn modelId="{24BF0F9F-1EB8-49D2-819E-53CC609931F9}" srcId="{E8D7ABBA-C760-407B-AB97-881DC528F9D3}" destId="{019A6906-1D18-423F-8FDA-F5ACBAFDD54E}" srcOrd="0" destOrd="0" parTransId="{E345F0D6-B674-4410-A464-05DA8A1C96ED}" sibTransId="{7273747E-27EC-4DAD-BBA6-761BF75459E5}"/>
+    <dgm:cxn modelId="{80278F90-AA29-47EF-8CF9-13FBAC526840}" type="presOf" srcId="{45141E16-EE06-45B8-95DA-DA9B3279F4EA}" destId="{7BD4B7AB-17A7-4E45-8E06-9DAFAB1DB37C}" srcOrd="0" destOrd="0" presId="urn:microsoft.com/office/officeart/2005/8/layout/hierarchy4"/>
+    <dgm:cxn modelId="{51AB6A5D-80DD-44C4-9A42-F2520C55EFE0}" srcId="{F5C46F3C-6D63-4422-BAC9-FEDE7040A974}" destId="{45141E16-EE06-45B8-95DA-DA9B3279F4EA}" srcOrd="0" destOrd="0" parTransId="{D6EB6FDE-062E-4602-BC0B-E1961E9B6A21}" sibTransId="{E45CEA43-6F7B-4083-B8F3-E5F933E95139}"/>
     <dgm:cxn modelId="{D7A8343C-B1B1-4862-A37A-99B6E6FDB592}" type="presParOf" srcId="{0721AE21-7D28-4A94-98E4-A4A7151A6981}" destId="{FCFFC6D5-3541-464A-9CBB-6B858D678FFF}" srcOrd="0" destOrd="0" presId="urn:microsoft.com/office/officeart/2005/8/layout/hierarchy4"/>
     <dgm:cxn modelId="{DAE00A35-57DD-4D31-809E-07E343BB504D}" type="presParOf" srcId="{FCFFC6D5-3541-464A-9CBB-6B858D678FFF}" destId="{31B77679-7168-4F66-A654-55995E52E901}" srcOrd="0" destOrd="0" presId="urn:microsoft.com/office/officeart/2005/8/layout/hierarchy4"/>
-    <dgm:cxn modelId="{30102409-BA3F-4BBB-9F7C-F5E7C37C8EB5}" type="presParOf" srcId="{FCFFC6D5-3541-464A-9CBB-6B858D678FFF}" destId="{6FEC6FBF-3A15-4B2E-AB53-B60D308D6969}" srcOrd="1" destOrd="0" presId="urn:microsoft.com/office/officeart/2005/8/layout/hierarchy4"/>
+    <dgm:cxn modelId="{87A30AEE-8AB2-4C55-8C50-A0395A9D2C51}" type="presParOf" srcId="{FCFFC6D5-3541-464A-9CBB-6B858D678FFF}" destId="{6FEC6FBF-3A15-4B2E-AB53-B60D308D6969}" srcOrd="1" destOrd="0" presId="urn:microsoft.com/office/officeart/2005/8/layout/hierarchy4"/>
     <dgm:cxn modelId="{21F6D609-9EAB-4C6D-9C41-030A8D2D6365}" type="presParOf" srcId="{FCFFC6D5-3541-464A-9CBB-6B858D678FFF}" destId="{6B6B1CE6-D655-4F8B-8EC1-9AC33E1E651D}" srcOrd="2" destOrd="0" presId="urn:microsoft.com/office/officeart/2005/8/layout/hierarchy4"/>
-    <dgm:cxn modelId="{74FBA63E-46DE-4D85-8730-E7D1533FDC0A}" type="presParOf" srcId="{6B6B1CE6-D655-4F8B-8EC1-9AC33E1E651D}" destId="{42DE55D2-0B59-4807-9308-593ACF088935}" srcOrd="0" destOrd="0" presId="urn:microsoft.com/office/officeart/2005/8/layout/hierarchy4"/>
-    <dgm:cxn modelId="{46095A1B-078B-4643-A03A-4DEAC88D9AB4}" type="presParOf" srcId="{42DE55D2-0B59-4807-9308-593ACF088935}" destId="{E691C4EA-E48E-43BD-A0E8-701801E40CF7}" srcOrd="0" destOrd="0" presId="urn:microsoft.com/office/officeart/2005/8/layout/hierarchy4"/>
-    <dgm:cxn modelId="{40E95B64-9461-4C42-8BB8-874C96C132AE}" type="presParOf" srcId="{42DE55D2-0B59-4807-9308-593ACF088935}" destId="{9ABE7BFC-5788-463D-95C5-B639E8F326A5}" srcOrd="1" destOrd="0" presId="urn:microsoft.com/office/officeart/2005/8/layout/hierarchy4"/>
-    <dgm:cxn modelId="{CF30FFF2-0C10-40C8-9496-B1BB3DCD03D1}" type="presParOf" srcId="{6B6B1CE6-D655-4F8B-8EC1-9AC33E1E651D}" destId="{A0F24FBE-52EE-4206-AC63-1B6E36F4AF9B}" srcOrd="1" destOrd="0" presId="urn:microsoft.com/office/officeart/2005/8/layout/hierarchy4"/>
-    <dgm:cxn modelId="{8DC634E8-4558-4434-8311-B0F709D2D5A3}" type="presParOf" srcId="{6B6B1CE6-D655-4F8B-8EC1-9AC33E1E651D}" destId="{B206D50A-C52C-457B-BBCC-BDC1F2DA6799}" srcOrd="2" destOrd="0" presId="urn:microsoft.com/office/officeart/2005/8/layout/hierarchy4"/>
-    <dgm:cxn modelId="{5B4C953B-FC94-427A-96D7-6406363C72E1}" type="presParOf" srcId="{B206D50A-C52C-457B-BBCC-BDC1F2DA6799}" destId="{C3482519-EAE5-4F94-A27A-77F4E460E113}" srcOrd="0" destOrd="0" presId="urn:microsoft.com/office/officeart/2005/8/layout/hierarchy4"/>
-    <dgm:cxn modelId="{3D8C590E-C7FB-4621-A408-6A880AFF94CB}" type="presParOf" srcId="{B206D50A-C52C-457B-BBCC-BDC1F2DA6799}" destId="{694869B0-6456-476C-8B30-6E4D37E71BE9}" srcOrd="1" destOrd="0" presId="urn:microsoft.com/office/officeart/2005/8/layout/hierarchy4"/>
-    <dgm:cxn modelId="{E507060D-DDF6-4E5B-ABE9-2740EE75B428}" type="presParOf" srcId="{6B6B1CE6-D655-4F8B-8EC1-9AC33E1E651D}" destId="{4488F77F-00DF-49B7-A321-62F26861B94C}" srcOrd="3" destOrd="0" presId="urn:microsoft.com/office/officeart/2005/8/layout/hierarchy4"/>
-    <dgm:cxn modelId="{C637A206-8E72-41E9-8C5C-633558EA60AC}" type="presParOf" srcId="{6B6B1CE6-D655-4F8B-8EC1-9AC33E1E651D}" destId="{EEFE818A-8F94-466D-AF01-837B9C7110E9}" srcOrd="4" destOrd="0" presId="urn:microsoft.com/office/officeart/2005/8/layout/hierarchy4"/>
-    <dgm:cxn modelId="{D3A5444E-04C2-4967-A4C5-46B6DC6E1EF2}" type="presParOf" srcId="{EEFE818A-8F94-466D-AF01-837B9C7110E9}" destId="{6AC255C2-61BA-42D6-954F-512C42364D51}" srcOrd="0" destOrd="0" presId="urn:microsoft.com/office/officeart/2005/8/layout/hierarchy4"/>
-    <dgm:cxn modelId="{598B7D8D-8F9F-4964-BE4F-D8B51C2D729D}" type="presParOf" srcId="{EEFE818A-8F94-466D-AF01-837B9C7110E9}" destId="{12412640-55CF-4337-A6CF-27D9156F330B}" srcOrd="1" destOrd="0" presId="urn:microsoft.com/office/officeart/2005/8/layout/hierarchy4"/>
+    <dgm:cxn modelId="{3B5D0E31-ED08-4A48-90FD-3C01F5F6FAB2}" type="presParOf" srcId="{6B6B1CE6-D655-4F8B-8EC1-9AC33E1E651D}" destId="{201D2DE5-05F2-4940-80C4-77697F0A1E2B}" srcOrd="0" destOrd="0" presId="urn:microsoft.com/office/officeart/2005/8/layout/hierarchy4"/>
+    <dgm:cxn modelId="{C2333415-854C-4DC6-B043-09195D6EE714}" type="presParOf" srcId="{201D2DE5-05F2-4940-80C4-77697F0A1E2B}" destId="{7BD4B7AB-17A7-4E45-8E06-9DAFAB1DB37C}" srcOrd="0" destOrd="0" presId="urn:microsoft.com/office/officeart/2005/8/layout/hierarchy4"/>
+    <dgm:cxn modelId="{C7F9C8CC-1084-4E9A-A6D7-F65F2255A0C2}" type="presParOf" srcId="{201D2DE5-05F2-4940-80C4-77697F0A1E2B}" destId="{FF5918D5-41A5-4187-838E-4F04A0484FB2}" srcOrd="1" destOrd="0" presId="urn:microsoft.com/office/officeart/2005/8/layout/hierarchy4"/>
+    <dgm:cxn modelId="{9658C776-E55B-426B-B815-F002085563E1}" type="presParOf" srcId="{201D2DE5-05F2-4940-80C4-77697F0A1E2B}" destId="{C0FEBA03-BEC7-4F0D-9A35-80FD5F577E17}" srcOrd="2" destOrd="0" presId="urn:microsoft.com/office/officeart/2005/8/layout/hierarchy4"/>
+    <dgm:cxn modelId="{30438265-6D35-4BC1-9E32-021B217EF6EE}" type="presParOf" srcId="{C0FEBA03-BEC7-4F0D-9A35-80FD5F577E17}" destId="{D082A621-824E-4BCA-8DC8-BFB49BA7B1DB}" srcOrd="0" destOrd="0" presId="urn:microsoft.com/office/officeart/2005/8/layout/hierarchy4"/>
+    <dgm:cxn modelId="{7E6E1101-4A7D-4C7C-A852-3654E231F4EF}" type="presParOf" srcId="{D082A621-824E-4BCA-8DC8-BFB49BA7B1DB}" destId="{60097A8B-5568-4FBC-916D-575075825EAB}" srcOrd="0" destOrd="0" presId="urn:microsoft.com/office/officeart/2005/8/layout/hierarchy4"/>
+    <dgm:cxn modelId="{D032E004-72A7-4031-AB2B-9E7026040B4F}" type="presParOf" srcId="{D082A621-824E-4BCA-8DC8-BFB49BA7B1DB}" destId="{239DB43E-3005-44C6-B652-61B3EBE2640B}" srcOrd="1" destOrd="0" presId="urn:microsoft.com/office/officeart/2005/8/layout/hierarchy4"/>
+    <dgm:cxn modelId="{868830AF-10DE-4FA7-B461-CFB70764AB74}" type="presParOf" srcId="{C0FEBA03-BEC7-4F0D-9A35-80FD5F577E17}" destId="{0900FC41-5C6D-445D-96E8-D3F77ED10E21}" srcOrd="1" destOrd="0" presId="urn:microsoft.com/office/officeart/2005/8/layout/hierarchy4"/>
+    <dgm:cxn modelId="{C0E14BE4-3821-442A-A111-EBE5E7CF7E34}" type="presParOf" srcId="{C0FEBA03-BEC7-4F0D-9A35-80FD5F577E17}" destId="{5B4E3D02-38E9-4B53-AA27-B58B00031151}" srcOrd="2" destOrd="0" presId="urn:microsoft.com/office/officeart/2005/8/layout/hierarchy4"/>
+    <dgm:cxn modelId="{DAFCC97D-2A92-4729-ADCD-4873C73983ED}" type="presParOf" srcId="{5B4E3D02-38E9-4B53-AA27-B58B00031151}" destId="{D43B44A2-6CE7-4681-B3D9-CB8A666F1D0C}" srcOrd="0" destOrd="0" presId="urn:microsoft.com/office/officeart/2005/8/layout/hierarchy4"/>
+    <dgm:cxn modelId="{3A27BA0C-E51E-47CF-A47A-908001040FA8}" type="presParOf" srcId="{5B4E3D02-38E9-4B53-AA27-B58B00031151}" destId="{BA62D10D-599A-4030-A734-9CB6DBA04742}" srcOrd="1" destOrd="0" presId="urn:microsoft.com/office/officeart/2005/8/layout/hierarchy4"/>
+    <dgm:cxn modelId="{223BE5DB-18CC-46E0-B36F-5751DE580D55}" type="presParOf" srcId="{6B6B1CE6-D655-4F8B-8EC1-9AC33E1E651D}" destId="{E21EC8F8-40AF-4717-84A4-5C3CF807E0AF}" srcOrd="1" destOrd="0" presId="urn:microsoft.com/office/officeart/2005/8/layout/hierarchy4"/>
+    <dgm:cxn modelId="{69575DBB-5E9D-4105-8AF4-ED22FFC00F60}" type="presParOf" srcId="{6B6B1CE6-D655-4F8B-8EC1-9AC33E1E651D}" destId="{42DE55D2-0B59-4807-9308-593ACF088935}" srcOrd="2" destOrd="0" presId="urn:microsoft.com/office/officeart/2005/8/layout/hierarchy4"/>
+    <dgm:cxn modelId="{3E9E63EB-6F5A-484C-B10E-E687177455C1}" type="presParOf" srcId="{42DE55D2-0B59-4807-9308-593ACF088935}" destId="{E691C4EA-E48E-43BD-A0E8-701801E40CF7}" srcOrd="0" destOrd="0" presId="urn:microsoft.com/office/officeart/2005/8/layout/hierarchy4"/>
+    <dgm:cxn modelId="{D763DFE5-9035-47C9-9DE4-A3D85FA3176D}" type="presParOf" srcId="{42DE55D2-0B59-4807-9308-593ACF088935}" destId="{5331D28A-E952-4CBC-81D6-70EF6180062B}" srcOrd="1" destOrd="0" presId="urn:microsoft.com/office/officeart/2005/8/layout/hierarchy4"/>
+    <dgm:cxn modelId="{8573B9FF-434A-42B1-BC46-FEECF791BEE3}" type="presParOf" srcId="{42DE55D2-0B59-4807-9308-593ACF088935}" destId="{9ABE7BFC-5788-463D-95C5-B639E8F326A5}" srcOrd="2" destOrd="0" presId="urn:microsoft.com/office/officeart/2005/8/layout/hierarchy4"/>
+    <dgm:cxn modelId="{4E55819F-5F04-474A-A62E-1BEC9AAE8C4F}" type="presParOf" srcId="{9ABE7BFC-5788-463D-95C5-B639E8F326A5}" destId="{2E938C2E-8357-414B-A1C2-F3845A9A8977}" srcOrd="0" destOrd="0" presId="urn:microsoft.com/office/officeart/2005/8/layout/hierarchy4"/>
+    <dgm:cxn modelId="{D5BEC5C0-CBE1-4C84-8F61-6506D75DD2C1}" type="presParOf" srcId="{2E938C2E-8357-414B-A1C2-F3845A9A8977}" destId="{79DABC98-E30B-4D43-9D9B-EBB1E15DFF45}" srcOrd="0" destOrd="0" presId="urn:microsoft.com/office/officeart/2005/8/layout/hierarchy4"/>
+    <dgm:cxn modelId="{A907D99A-4EB5-43DB-93CD-24ABF2B4552A}" type="presParOf" srcId="{2E938C2E-8357-414B-A1C2-F3845A9A8977}" destId="{4D45EB07-BCB5-43EA-967F-742013AE4CB6}" srcOrd="1" destOrd="0" presId="urn:microsoft.com/office/officeart/2005/8/layout/hierarchy4"/>
+    <dgm:cxn modelId="{F4CC37FF-0916-41E9-A4DE-E090CD0372C9}" type="presParOf" srcId="{9ABE7BFC-5788-463D-95C5-B639E8F326A5}" destId="{BC0A9B18-EF1F-4974-9444-179EDC9D060A}" srcOrd="1" destOrd="0" presId="urn:microsoft.com/office/officeart/2005/8/layout/hierarchy4"/>
+    <dgm:cxn modelId="{2D7B342A-B3F1-435B-B5E1-76D66D802EC8}" type="presParOf" srcId="{9ABE7BFC-5788-463D-95C5-B639E8F326A5}" destId="{23237127-AB65-45C2-9336-50B6FEC2BAF3}" srcOrd="2" destOrd="0" presId="urn:microsoft.com/office/officeart/2005/8/layout/hierarchy4"/>
+    <dgm:cxn modelId="{588E5979-32BF-4B10-A6C9-05CD088A276B}" type="presParOf" srcId="{23237127-AB65-45C2-9336-50B6FEC2BAF3}" destId="{1D258615-A3E1-47DC-A6C2-09D2AFE3E8B9}" srcOrd="0" destOrd="0" presId="urn:microsoft.com/office/officeart/2005/8/layout/hierarchy4"/>
+    <dgm:cxn modelId="{1E64AE43-672F-4DFC-B19A-099FA22DEDBE}" type="presParOf" srcId="{23237127-AB65-45C2-9336-50B6FEC2BAF3}" destId="{3D658503-DBD6-4FB6-957F-1A00AB1294ED}" srcOrd="1" destOrd="0" presId="urn:microsoft.com/office/officeart/2005/8/layout/hierarchy4"/>
   </dgm:cxnLst>
   <dgm:bg/>
   <dgm:whole/>
@@ -10789,10 +10974,9 @@
         <a:lstStyle/>
         <a:p>
           <a:r>
-            <a:rPr lang="de-DE"/>
+            <a:rPr lang="de-DE" dirty="0"/>
             <a:t>Datenbankkonzept</a:t>
           </a:r>
-          <a:endParaRPr lang="de-DE"/>
         </a:p>
       </dgm:t>
     </dgm:pt>
@@ -10827,7 +11011,7 @@
         <a:p>
           <a:r>
             <a:rPr lang="de-DE" dirty="0"/>
-            <a:t>Analyse Datenhaltung</a:t>
+            <a:t>Umsetzung</a:t>
           </a:r>
         </a:p>
       </dgm:t>
@@ -10855,6 +11039,64 @@
       </dgm:t>
     </dgm:pt>
     <dgm:pt modelId="{CDA584ED-22DD-4E60-B1AA-206F5245C7EE}">
+      <dgm:prSet phldrT="[Text]"/>
+      <dgm:spPr/>
+      <dgm:t>
+        <a:bodyPr/>
+        <a:lstStyle/>
+        <a:p>
+          <a:r>
+            <a:rPr lang="de-DE" dirty="0"/>
+            <a:t>SQL Tabellen</a:t>
+          </a:r>
+        </a:p>
+      </dgm:t>
+    </dgm:pt>
+    <dgm:pt modelId="{24BE9495-08AF-4751-B249-454865941D66}" type="parTrans" cxnId="{F96AE14C-8125-4F74-BDA2-EA0E340DC275}">
+      <dgm:prSet/>
+      <dgm:spPr/>
+      <dgm:t>
+        <a:bodyPr/>
+        <a:lstStyle/>
+        <a:p>
+          <a:endParaRPr lang="de-DE"/>
+        </a:p>
+      </dgm:t>
+    </dgm:pt>
+    <dgm:pt modelId="{41BE9E98-E998-451E-B8EC-C36466A96ED0}" type="sibTrans" cxnId="{F96AE14C-8125-4F74-BDA2-EA0E340DC275}">
+      <dgm:prSet/>
+      <dgm:spPr/>
+      <dgm:t>
+        <a:bodyPr/>
+        <a:lstStyle/>
+        <a:p>
+          <a:endParaRPr lang="de-DE"/>
+        </a:p>
+      </dgm:t>
+    </dgm:pt>
+    <dgm:pt modelId="{05E9D5D4-AFAA-4D7A-9C47-6C715E01C091}">
+      <dgm:prSet phldrT="[Text]"/>
+      <dgm:spPr/>
+      <dgm:t>
+        <a:bodyPr/>
+        <a:lstStyle/>
+        <a:p>
+          <a:r>
+            <a:rPr lang="de-DE" dirty="0"/>
+            <a:t>Konzept / Analyse</a:t>
+          </a:r>
+        </a:p>
+      </dgm:t>
+    </dgm:pt>
+    <dgm:pt modelId="{D7B5D69F-9A09-4593-BC34-13CBDB2587A5}" type="parTrans" cxnId="{B189885D-C9E5-45DC-A6D8-EA405502F9FF}">
+      <dgm:prSet/>
+      <dgm:spPr/>
+    </dgm:pt>
+    <dgm:pt modelId="{838C9D48-609E-4A6C-81B6-A6411AE3C759}" type="sibTrans" cxnId="{B189885D-C9E5-45DC-A6D8-EA405502F9FF}">
+      <dgm:prSet/>
+      <dgm:spPr/>
+    </dgm:pt>
+    <dgm:pt modelId="{BE36232D-EC70-4CE7-9E4A-595BAFA1B4F5}">
       <dgm:prSet phldrT="[Text]"/>
       <dgm:spPr/>
       <dgm:t>
@@ -10868,29 +11110,15 @@
         </a:p>
       </dgm:t>
     </dgm:pt>
-    <dgm:pt modelId="{24BE9495-08AF-4751-B249-454865941D66}" type="parTrans" cxnId="{F96AE14C-8125-4F74-BDA2-EA0E340DC275}">
+    <dgm:pt modelId="{778D9F08-F8ED-4E80-8173-8630DDB41364}" type="parTrans" cxnId="{76F28B97-E342-47D0-B26A-4A02B365D11D}">
       <dgm:prSet/>
       <dgm:spPr/>
-      <dgm:t>
-        <a:bodyPr/>
-        <a:lstStyle/>
-        <a:p>
-          <a:endParaRPr lang="de-DE"/>
-        </a:p>
-      </dgm:t>
-    </dgm:pt>
-    <dgm:pt modelId="{41BE9E98-E998-451E-B8EC-C36466A96ED0}" type="sibTrans" cxnId="{F96AE14C-8125-4F74-BDA2-EA0E340DC275}">
+    </dgm:pt>
+    <dgm:pt modelId="{F1A7906B-9EC5-4730-8D94-9A1E28BDD32F}" type="sibTrans" cxnId="{76F28B97-E342-47D0-B26A-4A02B365D11D}">
       <dgm:prSet/>
       <dgm:spPr/>
-      <dgm:t>
-        <a:bodyPr/>
-        <a:lstStyle/>
-        <a:p>
-          <a:endParaRPr lang="de-DE"/>
-        </a:p>
-      </dgm:t>
-    </dgm:pt>
-    <dgm:pt modelId="{7A27F528-7068-4931-BB67-79DE39FF1A18}">
+    </dgm:pt>
+    <dgm:pt modelId="{95C83FDF-9BBA-4ED4-947A-F92BF0887ED2}">
       <dgm:prSet phldrT="[Text]"/>
       <dgm:spPr/>
       <dgm:t>
@@ -10899,34 +11127,20 @@
         <a:p>
           <a:r>
             <a:rPr lang="de-DE" dirty="0"/>
-            <a:t>Erstellung SQL</a:t>
+            <a:t> Analyse Datenhaltung</a:t>
           </a:r>
         </a:p>
       </dgm:t>
     </dgm:pt>
-    <dgm:pt modelId="{BA473D98-6527-4185-BD96-2EED7645AEB1}" type="parTrans" cxnId="{FFBB1EBA-D06C-4392-A1FA-D00ADC267BFF}">
+    <dgm:pt modelId="{55D114F5-9341-4C74-A1FB-DD9AB3417D7A}" type="parTrans" cxnId="{BF698602-8055-4688-86AE-3769D329152B}">
       <dgm:prSet/>
       <dgm:spPr/>
-      <dgm:t>
-        <a:bodyPr/>
-        <a:lstStyle/>
-        <a:p>
-          <a:endParaRPr lang="de-DE"/>
-        </a:p>
-      </dgm:t>
-    </dgm:pt>
-    <dgm:pt modelId="{6C7BA101-53EF-4566-8122-1551C03F5EE7}" type="sibTrans" cxnId="{FFBB1EBA-D06C-4392-A1FA-D00ADC267BFF}">
+    </dgm:pt>
+    <dgm:pt modelId="{66B8FFE7-13BF-4591-9C92-260EF96DE17F}" type="sibTrans" cxnId="{BF698602-8055-4688-86AE-3769D329152B}">
       <dgm:prSet/>
       <dgm:spPr/>
-      <dgm:t>
-        <a:bodyPr/>
-        <a:lstStyle/>
-        <a:p>
-          <a:endParaRPr lang="de-DE"/>
-        </a:p>
-      </dgm:t>
-    </dgm:pt>
-    <dgm:pt modelId="{CD0E2546-A229-4C8C-AD6B-D9E3C1394677}">
+    </dgm:pt>
+    <dgm:pt modelId="{B76F6BCC-4ED5-4B68-8D7E-2DCDC21098EA}">
       <dgm:prSet phldrT="[Text]"/>
       <dgm:spPr/>
       <dgm:t>
@@ -10935,32 +11149,18 @@
         <a:p>
           <a:r>
             <a:rPr lang="de-DE" dirty="0"/>
-            <a:t>SQL Abfragen</a:t>
+            <a:t>SQL Programmierung</a:t>
           </a:r>
         </a:p>
       </dgm:t>
     </dgm:pt>
-    <dgm:pt modelId="{B28722C4-EF41-40BA-9206-39DCD0D6FBA7}" type="parTrans" cxnId="{5094245A-8EAA-4C88-AF28-BA6ECD02060D}">
+    <dgm:pt modelId="{330C9092-33F4-4401-9480-59BC39D274D7}" type="parTrans" cxnId="{4A349358-232F-4862-9278-6DAD0D1558FA}">
       <dgm:prSet/>
       <dgm:spPr/>
-      <dgm:t>
-        <a:bodyPr/>
-        <a:lstStyle/>
-        <a:p>
-          <a:endParaRPr lang="de-DE"/>
-        </a:p>
-      </dgm:t>
-    </dgm:pt>
-    <dgm:pt modelId="{52A1B68C-E9A6-4FF4-8B2E-B5C725ABC89B}" type="sibTrans" cxnId="{5094245A-8EAA-4C88-AF28-BA6ECD02060D}">
+    </dgm:pt>
+    <dgm:pt modelId="{497F3E52-2515-4274-A7BB-A9CFF819A81A}" type="sibTrans" cxnId="{4A349358-232F-4862-9278-6DAD0D1558FA}">
       <dgm:prSet/>
       <dgm:spPr/>
-      <dgm:t>
-        <a:bodyPr/>
-        <a:lstStyle/>
-        <a:p>
-          <a:endParaRPr lang="de-DE"/>
-        </a:p>
-      </dgm:t>
     </dgm:pt>
     <dgm:pt modelId="{C2AD7895-39DB-42BB-B9F9-96D7A2295531}" type="pres">
       <dgm:prSet presAssocID="{6E3DBDD0-740C-4589-A773-645A35B42C41}" presName="Name0" presStyleCnt="0">
@@ -10994,114 +11194,166 @@
       <dgm:prSet presAssocID="{1F174DD3-C0DB-497B-B065-B207C035296F}" presName="horzOne" presStyleCnt="0"/>
       <dgm:spPr/>
     </dgm:pt>
-    <dgm:pt modelId="{64F1462F-E843-4683-B0B9-DAD75A00E14B}" type="pres">
-      <dgm:prSet presAssocID="{03A84A47-66BB-4672-B482-A66813DCEB63}" presName="vertTwo" presStyleCnt="0"/>
-      <dgm:spPr/>
-    </dgm:pt>
-    <dgm:pt modelId="{6B70D70C-EF4A-47DB-B009-FDEBA3A524F4}" type="pres">
-      <dgm:prSet presAssocID="{03A84A47-66BB-4672-B482-A66813DCEB63}" presName="txTwo" presStyleLbl="node2" presStyleIdx="0" presStyleCnt="4">
+    <dgm:pt modelId="{0EC8BAB8-D156-45D0-92CE-501A2CDD8816}" type="pres">
+      <dgm:prSet presAssocID="{05E9D5D4-AFAA-4D7A-9C47-6C715E01C091}" presName="vertTwo" presStyleCnt="0"/>
+      <dgm:spPr/>
+    </dgm:pt>
+    <dgm:pt modelId="{C4D0CBCA-A900-42C4-9CB8-9544DB8FC493}" type="pres">
+      <dgm:prSet presAssocID="{05E9D5D4-AFAA-4D7A-9C47-6C715E01C091}" presName="txTwo" presStyleLbl="node2" presStyleIdx="0" presStyleCnt="2">
         <dgm:presLayoutVars>
           <dgm:chPref val="3"/>
         </dgm:presLayoutVars>
       </dgm:prSet>
       <dgm:spPr/>
     </dgm:pt>
-    <dgm:pt modelId="{A2426F68-0345-40D9-8B47-8CEFF5D61CFA}" type="pres">
-      <dgm:prSet presAssocID="{03A84A47-66BB-4672-B482-A66813DCEB63}" presName="horzTwo" presStyleCnt="0"/>
-      <dgm:spPr/>
-    </dgm:pt>
-    <dgm:pt modelId="{293F34B1-5AEC-486D-B8CF-4D8359AD19FC}" type="pres">
-      <dgm:prSet presAssocID="{409ABCF8-35E9-4C4A-A01F-126999736871}" presName="sibSpaceTwo" presStyleCnt="0"/>
-      <dgm:spPr/>
-    </dgm:pt>
-    <dgm:pt modelId="{DF11F189-44EB-4F4D-BB73-517058796C68}" type="pres">
-      <dgm:prSet presAssocID="{CDA584ED-22DD-4E60-B1AA-206F5245C7EE}" presName="vertTwo" presStyleCnt="0"/>
-      <dgm:spPr/>
-    </dgm:pt>
-    <dgm:pt modelId="{77D0D594-A976-4F76-BB22-8AAF68AC054B}" type="pres">
-      <dgm:prSet presAssocID="{CDA584ED-22DD-4E60-B1AA-206F5245C7EE}" presName="txTwo" presStyleLbl="node2" presStyleIdx="1" presStyleCnt="4">
+    <dgm:pt modelId="{A88C77F8-BF17-42DE-ABAD-07BC219F3C33}" type="pres">
+      <dgm:prSet presAssocID="{05E9D5D4-AFAA-4D7A-9C47-6C715E01C091}" presName="parTransTwo" presStyleCnt="0"/>
+      <dgm:spPr/>
+    </dgm:pt>
+    <dgm:pt modelId="{15B44DD7-7EB5-4A29-8DDA-C20DB750BE77}" type="pres">
+      <dgm:prSet presAssocID="{05E9D5D4-AFAA-4D7A-9C47-6C715E01C091}" presName="horzTwo" presStyleCnt="0"/>
+      <dgm:spPr/>
+    </dgm:pt>
+    <dgm:pt modelId="{14229B7F-FEB9-4C2F-BA9E-5C462A47DBBD}" type="pres">
+      <dgm:prSet presAssocID="{BE36232D-EC70-4CE7-9E4A-595BAFA1B4F5}" presName="vertThree" presStyleCnt="0"/>
+      <dgm:spPr/>
+    </dgm:pt>
+    <dgm:pt modelId="{DCA89DAD-7D14-4B33-9BB1-39033B6780C1}" type="pres">
+      <dgm:prSet presAssocID="{BE36232D-EC70-4CE7-9E4A-595BAFA1B4F5}" presName="txThree" presStyleLbl="node3" presStyleIdx="0" presStyleCnt="4">
         <dgm:presLayoutVars>
           <dgm:chPref val="3"/>
         </dgm:presLayoutVars>
       </dgm:prSet>
       <dgm:spPr/>
     </dgm:pt>
-    <dgm:pt modelId="{2D4A4AFF-A61E-44F8-8764-DE59FC0CC5D5}" type="pres">
-      <dgm:prSet presAssocID="{CDA584ED-22DD-4E60-B1AA-206F5245C7EE}" presName="horzTwo" presStyleCnt="0"/>
-      <dgm:spPr/>
-    </dgm:pt>
-    <dgm:pt modelId="{5F1D6B1A-47DD-40EA-9B56-3064B81209AF}" type="pres">
-      <dgm:prSet presAssocID="{41BE9E98-E998-451E-B8EC-C36466A96ED0}" presName="sibSpaceTwo" presStyleCnt="0"/>
-      <dgm:spPr/>
-    </dgm:pt>
-    <dgm:pt modelId="{89AC9123-CFDF-4A73-A041-479D1C7E0990}" type="pres">
-      <dgm:prSet presAssocID="{7A27F528-7068-4931-BB67-79DE39FF1A18}" presName="vertTwo" presStyleCnt="0"/>
-      <dgm:spPr/>
-    </dgm:pt>
-    <dgm:pt modelId="{5F0CE19F-D7B0-4A05-8002-68E1CD3B36E7}" type="pres">
-      <dgm:prSet presAssocID="{7A27F528-7068-4931-BB67-79DE39FF1A18}" presName="txTwo" presStyleLbl="node2" presStyleIdx="2" presStyleCnt="4">
+    <dgm:pt modelId="{A54DD467-DBCF-4CD4-BCF9-3A4A4716A3B0}" type="pres">
+      <dgm:prSet presAssocID="{BE36232D-EC70-4CE7-9E4A-595BAFA1B4F5}" presName="horzThree" presStyleCnt="0"/>
+      <dgm:spPr/>
+    </dgm:pt>
+    <dgm:pt modelId="{DBCFC3AF-91E1-4782-9337-D17384D01B67}" type="pres">
+      <dgm:prSet presAssocID="{F1A7906B-9EC5-4730-8D94-9A1E28BDD32F}" presName="sibSpaceThree" presStyleCnt="0"/>
+      <dgm:spPr/>
+    </dgm:pt>
+    <dgm:pt modelId="{4BD0009E-B101-4B6E-87B7-762980B10E58}" type="pres">
+      <dgm:prSet presAssocID="{95C83FDF-9BBA-4ED4-947A-F92BF0887ED2}" presName="vertThree" presStyleCnt="0"/>
+      <dgm:spPr/>
+    </dgm:pt>
+    <dgm:pt modelId="{C1F43AFC-F18B-4DD8-9577-9434DCD3C50A}" type="pres">
+      <dgm:prSet presAssocID="{95C83FDF-9BBA-4ED4-947A-F92BF0887ED2}" presName="txThree" presStyleLbl="node3" presStyleIdx="1" presStyleCnt="4">
         <dgm:presLayoutVars>
           <dgm:chPref val="3"/>
         </dgm:presLayoutVars>
       </dgm:prSet>
       <dgm:spPr/>
     </dgm:pt>
-    <dgm:pt modelId="{37174FC2-ADD2-4EA4-AB0F-4DF066E2FDCA}" type="pres">
-      <dgm:prSet presAssocID="{7A27F528-7068-4931-BB67-79DE39FF1A18}" presName="horzTwo" presStyleCnt="0"/>
-      <dgm:spPr/>
-    </dgm:pt>
-    <dgm:pt modelId="{794FB1B8-F598-4E42-A9C5-DF5081D124BC}" type="pres">
-      <dgm:prSet presAssocID="{6C7BA101-53EF-4566-8122-1551C03F5EE7}" presName="sibSpaceTwo" presStyleCnt="0"/>
-      <dgm:spPr/>
-    </dgm:pt>
-    <dgm:pt modelId="{DB3409F8-5E91-4AA6-ABD8-750C85A71BA8}" type="pres">
-      <dgm:prSet presAssocID="{CD0E2546-A229-4C8C-AD6B-D9E3C1394677}" presName="vertTwo" presStyleCnt="0"/>
-      <dgm:spPr/>
-    </dgm:pt>
-    <dgm:pt modelId="{2FB4CB63-03B6-4728-9DF5-A1CB7309B6C8}" type="pres">
-      <dgm:prSet presAssocID="{CD0E2546-A229-4C8C-AD6B-D9E3C1394677}" presName="txTwo" presStyleLbl="node2" presStyleIdx="3" presStyleCnt="4">
+    <dgm:pt modelId="{E7CD6F91-4629-49EE-908C-6E0E27666DD0}" type="pres">
+      <dgm:prSet presAssocID="{95C83FDF-9BBA-4ED4-947A-F92BF0887ED2}" presName="horzThree" presStyleCnt="0"/>
+      <dgm:spPr/>
+    </dgm:pt>
+    <dgm:pt modelId="{68B6F937-0A6A-4861-AC0C-4557B42FFC31}" type="pres">
+      <dgm:prSet presAssocID="{838C9D48-609E-4A6C-81B6-A6411AE3C759}" presName="sibSpaceTwo" presStyleCnt="0"/>
+      <dgm:spPr/>
+    </dgm:pt>
+    <dgm:pt modelId="{64F1462F-E843-4683-B0B9-DAD75A00E14B}" type="pres">
+      <dgm:prSet presAssocID="{03A84A47-66BB-4672-B482-A66813DCEB63}" presName="vertTwo" presStyleCnt="0"/>
+      <dgm:spPr/>
+    </dgm:pt>
+    <dgm:pt modelId="{6B70D70C-EF4A-47DB-B009-FDEBA3A524F4}" type="pres">
+      <dgm:prSet presAssocID="{03A84A47-66BB-4672-B482-A66813DCEB63}" presName="txTwo" presStyleLbl="node2" presStyleIdx="1" presStyleCnt="2">
         <dgm:presLayoutVars>
           <dgm:chPref val="3"/>
         </dgm:presLayoutVars>
       </dgm:prSet>
       <dgm:spPr/>
     </dgm:pt>
-    <dgm:pt modelId="{04F5C5FC-CEB1-4751-8CCB-AD7DC46F403A}" type="pres">
-      <dgm:prSet presAssocID="{CD0E2546-A229-4C8C-AD6B-D9E3C1394677}" presName="horzTwo" presStyleCnt="0"/>
+    <dgm:pt modelId="{32A1FA68-51D6-4131-9BEF-EA5CDD6FA44C}" type="pres">
+      <dgm:prSet presAssocID="{03A84A47-66BB-4672-B482-A66813DCEB63}" presName="parTransTwo" presStyleCnt="0"/>
+      <dgm:spPr/>
+    </dgm:pt>
+    <dgm:pt modelId="{A2426F68-0345-40D9-8B47-8CEFF5D61CFA}" type="pres">
+      <dgm:prSet presAssocID="{03A84A47-66BB-4672-B482-A66813DCEB63}" presName="horzTwo" presStyleCnt="0"/>
+      <dgm:spPr/>
+    </dgm:pt>
+    <dgm:pt modelId="{A29924A8-72D5-441C-8B84-D0143E073A1E}" type="pres">
+      <dgm:prSet presAssocID="{CDA584ED-22DD-4E60-B1AA-206F5245C7EE}" presName="vertThree" presStyleCnt="0"/>
+      <dgm:spPr/>
+    </dgm:pt>
+    <dgm:pt modelId="{14EAB66A-1CF3-4287-9A42-298DAF92A41B}" type="pres">
+      <dgm:prSet presAssocID="{CDA584ED-22DD-4E60-B1AA-206F5245C7EE}" presName="txThree" presStyleLbl="node3" presStyleIdx="2" presStyleCnt="4">
+        <dgm:presLayoutVars>
+          <dgm:chPref val="3"/>
+        </dgm:presLayoutVars>
+      </dgm:prSet>
+      <dgm:spPr/>
+    </dgm:pt>
+    <dgm:pt modelId="{EE59312E-31AE-40D2-BB4F-504628C9A72A}" type="pres">
+      <dgm:prSet presAssocID="{CDA584ED-22DD-4E60-B1AA-206F5245C7EE}" presName="horzThree" presStyleCnt="0"/>
+      <dgm:spPr/>
+    </dgm:pt>
+    <dgm:pt modelId="{6399F604-A919-41E3-AC7E-F7B8D9457751}" type="pres">
+      <dgm:prSet presAssocID="{41BE9E98-E998-451E-B8EC-C36466A96ED0}" presName="sibSpaceThree" presStyleCnt="0"/>
+      <dgm:spPr/>
+    </dgm:pt>
+    <dgm:pt modelId="{5B4E5C40-3954-407D-87DC-9A0992398150}" type="pres">
+      <dgm:prSet presAssocID="{B76F6BCC-4ED5-4B68-8D7E-2DCDC21098EA}" presName="vertThree" presStyleCnt="0"/>
+      <dgm:spPr/>
+    </dgm:pt>
+    <dgm:pt modelId="{20F84B83-FF4B-4632-B676-4F44D91F6204}" type="pres">
+      <dgm:prSet presAssocID="{B76F6BCC-4ED5-4B68-8D7E-2DCDC21098EA}" presName="txThree" presStyleLbl="node3" presStyleIdx="3" presStyleCnt="4">
+        <dgm:presLayoutVars>
+          <dgm:chPref val="3"/>
+        </dgm:presLayoutVars>
+      </dgm:prSet>
+      <dgm:spPr/>
+    </dgm:pt>
+    <dgm:pt modelId="{F8B9DEAA-D77F-4A08-AB61-FAEEFF88DA0E}" type="pres">
+      <dgm:prSet presAssocID="{B76F6BCC-4ED5-4B68-8D7E-2DCDC21098EA}" presName="horzThree" presStyleCnt="0"/>
       <dgm:spPr/>
     </dgm:pt>
   </dgm:ptLst>
   <dgm:cxnLst>
-    <dgm:cxn modelId="{FFBB1EBA-D06C-4392-A1FA-D00ADC267BFF}" srcId="{1F174DD3-C0DB-497B-B065-B207C035296F}" destId="{7A27F528-7068-4931-BB67-79DE39FF1A18}" srcOrd="2" destOrd="0" parTransId="{BA473D98-6527-4185-BD96-2EED7645AEB1}" sibTransId="{6C7BA101-53EF-4566-8122-1551C03F5EE7}"/>
-    <dgm:cxn modelId="{5094245A-8EAA-4C88-AF28-BA6ECD02060D}" srcId="{1F174DD3-C0DB-497B-B065-B207C035296F}" destId="{CD0E2546-A229-4C8C-AD6B-D9E3C1394677}" srcOrd="3" destOrd="0" parTransId="{B28722C4-EF41-40BA-9206-39DCD0D6FBA7}" sibTransId="{52A1B68C-E9A6-4FF4-8B2E-B5C725ABC89B}"/>
-    <dgm:cxn modelId="{CC69A7E2-AB94-42EA-BC4E-EDF32B1C82BA}" type="presOf" srcId="{CDA584ED-22DD-4E60-B1AA-206F5245C7EE}" destId="{77D0D594-A976-4F76-BB22-8AAF68AC054B}" srcOrd="0" destOrd="0" presId="urn:microsoft.com/office/officeart/2005/8/layout/hierarchy4"/>
-    <dgm:cxn modelId="{CEF673E5-EC1C-4A62-B55C-DB2C0F0D22CF}" type="presOf" srcId="{CD0E2546-A229-4C8C-AD6B-D9E3C1394677}" destId="{2FB4CB63-03B6-4728-9DF5-A1CB7309B6C8}" srcOrd="0" destOrd="0" presId="urn:microsoft.com/office/officeart/2005/8/layout/hierarchy4"/>
-    <dgm:cxn modelId="{1D1B78F9-3C0D-4159-B68D-15347B18FA3E}" type="presOf" srcId="{03A84A47-66BB-4672-B482-A66813DCEB63}" destId="{6B70D70C-EF4A-47DB-B009-FDEBA3A524F4}" srcOrd="0" destOrd="0" presId="urn:microsoft.com/office/officeart/2005/8/layout/hierarchy4"/>
+    <dgm:cxn modelId="{B189885D-C9E5-45DC-A6D8-EA405502F9FF}" srcId="{1F174DD3-C0DB-497B-B065-B207C035296F}" destId="{05E9D5D4-AFAA-4D7A-9C47-6C715E01C091}" srcOrd="0" destOrd="0" parTransId="{D7B5D69F-9A09-4593-BC34-13CBDB2587A5}" sibTransId="{838C9D48-609E-4A6C-81B6-A6411AE3C759}"/>
+    <dgm:cxn modelId="{8A6A0581-9A99-48F3-90D3-B502E3AB5EE5}" type="presOf" srcId="{BE36232D-EC70-4CE7-9E4A-595BAFA1B4F5}" destId="{DCA89DAD-7D14-4B33-9BB1-39033B6780C1}" srcOrd="0" destOrd="0" presId="urn:microsoft.com/office/officeart/2005/8/layout/hierarchy4"/>
+    <dgm:cxn modelId="{52633613-C975-4BB5-BE8B-ADC51D673EA1}" type="presOf" srcId="{03A84A47-66BB-4672-B482-A66813DCEB63}" destId="{6B70D70C-EF4A-47DB-B009-FDEBA3A524F4}" srcOrd="0" destOrd="0" presId="urn:microsoft.com/office/officeart/2005/8/layout/hierarchy4"/>
+    <dgm:cxn modelId="{F96AE14C-8125-4F74-BDA2-EA0E340DC275}" srcId="{03A84A47-66BB-4672-B482-A66813DCEB63}" destId="{CDA584ED-22DD-4E60-B1AA-206F5245C7EE}" srcOrd="0" destOrd="0" parTransId="{24BE9495-08AF-4751-B249-454865941D66}" sibTransId="{41BE9E98-E998-451E-B8EC-C36466A96ED0}"/>
+    <dgm:cxn modelId="{8C2BBB43-86DC-49EC-B827-A8C42874EE36}" srcId="{1F174DD3-C0DB-497B-B065-B207C035296F}" destId="{03A84A47-66BB-4672-B482-A66813DCEB63}" srcOrd="1" destOrd="0" parTransId="{0CD45BEA-0762-479F-9476-257AD73A2BD4}" sibTransId="{409ABCF8-35E9-4C4A-A01F-126999736871}"/>
+    <dgm:cxn modelId="{926C5ADB-C1AA-4432-88D3-971BC2CA1E02}" type="presOf" srcId="{CDA584ED-22DD-4E60-B1AA-206F5245C7EE}" destId="{14EAB66A-1CF3-4287-9A42-298DAF92A41B}" srcOrd="0" destOrd="0" presId="urn:microsoft.com/office/officeart/2005/8/layout/hierarchy4"/>
+    <dgm:cxn modelId="{6368F5CC-563D-4E13-8C4D-D4D38D8DA144}" srcId="{6E3DBDD0-740C-4589-A773-645A35B42C41}" destId="{1F174DD3-C0DB-497B-B065-B207C035296F}" srcOrd="0" destOrd="0" parTransId="{3BA7BC99-AE92-4807-A2CC-80DE0D6A4D08}" sibTransId="{410FC15A-6565-40BE-A0C0-C0C6B9A9CCC2}"/>
+    <dgm:cxn modelId="{EC445831-BBFE-43E0-9664-706DC19A596A}" type="presOf" srcId="{05E9D5D4-AFAA-4D7A-9C47-6C715E01C091}" destId="{C4D0CBCA-A900-42C4-9CB8-9544DB8FC493}" srcOrd="0" destOrd="0" presId="urn:microsoft.com/office/officeart/2005/8/layout/hierarchy4"/>
+    <dgm:cxn modelId="{BF698602-8055-4688-86AE-3769D329152B}" srcId="{05E9D5D4-AFAA-4D7A-9C47-6C715E01C091}" destId="{95C83FDF-9BBA-4ED4-947A-F92BF0887ED2}" srcOrd="1" destOrd="0" parTransId="{55D114F5-9341-4C74-A1FB-DD9AB3417D7A}" sibTransId="{66B8FFE7-13BF-4591-9C92-260EF96DE17F}"/>
+    <dgm:cxn modelId="{E2EC24E9-8BF0-4C8A-930C-A6DC7EE7C9A6}" type="presOf" srcId="{95C83FDF-9BBA-4ED4-947A-F92BF0887ED2}" destId="{C1F43AFC-F18B-4DD8-9577-9434DCD3C50A}" srcOrd="0" destOrd="0" presId="urn:microsoft.com/office/officeart/2005/8/layout/hierarchy4"/>
+    <dgm:cxn modelId="{843DE763-7C67-451F-BDED-6E62934F6E89}" type="presOf" srcId="{B76F6BCC-4ED5-4B68-8D7E-2DCDC21098EA}" destId="{20F84B83-FF4B-4632-B676-4F44D91F6204}" srcOrd="0" destOrd="0" presId="urn:microsoft.com/office/officeart/2005/8/layout/hierarchy4"/>
+    <dgm:cxn modelId="{993BACDD-4CCC-49AF-B26D-7C58260B9D50}" type="presOf" srcId="{6E3DBDD0-740C-4589-A773-645A35B42C41}" destId="{C2AD7895-39DB-42BB-B9F9-96D7A2295531}" srcOrd="0" destOrd="0" presId="urn:microsoft.com/office/officeart/2005/8/layout/hierarchy4"/>
     <dgm:cxn modelId="{BA0411F6-9B55-452D-82D1-1980A2C77151}" type="presOf" srcId="{1F174DD3-C0DB-497B-B065-B207C035296F}" destId="{11BA99A9-BB38-4BAC-8F98-710E8D80418A}" srcOrd="0" destOrd="0" presId="urn:microsoft.com/office/officeart/2005/8/layout/hierarchy4"/>
-    <dgm:cxn modelId="{47C06081-F91C-4596-AFD4-B7E816AA07E5}" type="presOf" srcId="{7A27F528-7068-4931-BB67-79DE39FF1A18}" destId="{5F0CE19F-D7B0-4A05-8002-68E1CD3B36E7}" srcOrd="0" destOrd="0" presId="urn:microsoft.com/office/officeart/2005/8/layout/hierarchy4"/>
-    <dgm:cxn modelId="{6368F5CC-563D-4E13-8C4D-D4D38D8DA144}" srcId="{6E3DBDD0-740C-4589-A773-645A35B42C41}" destId="{1F174DD3-C0DB-497B-B065-B207C035296F}" srcOrd="0" destOrd="0" parTransId="{3BA7BC99-AE92-4807-A2CC-80DE0D6A4D08}" sibTransId="{410FC15A-6565-40BE-A0C0-C0C6B9A9CCC2}"/>
-    <dgm:cxn modelId="{993BACDD-4CCC-49AF-B26D-7C58260B9D50}" type="presOf" srcId="{6E3DBDD0-740C-4589-A773-645A35B42C41}" destId="{C2AD7895-39DB-42BB-B9F9-96D7A2295531}" srcOrd="0" destOrd="0" presId="urn:microsoft.com/office/officeart/2005/8/layout/hierarchy4"/>
-    <dgm:cxn modelId="{F96AE14C-8125-4F74-BDA2-EA0E340DC275}" srcId="{1F174DD3-C0DB-497B-B065-B207C035296F}" destId="{CDA584ED-22DD-4E60-B1AA-206F5245C7EE}" srcOrd="1" destOrd="0" parTransId="{24BE9495-08AF-4751-B249-454865941D66}" sibTransId="{41BE9E98-E998-451E-B8EC-C36466A96ED0}"/>
-    <dgm:cxn modelId="{8C2BBB43-86DC-49EC-B827-A8C42874EE36}" srcId="{1F174DD3-C0DB-497B-B065-B207C035296F}" destId="{03A84A47-66BB-4672-B482-A66813DCEB63}" srcOrd="0" destOrd="0" parTransId="{0CD45BEA-0762-479F-9476-257AD73A2BD4}" sibTransId="{409ABCF8-35E9-4C4A-A01F-126999736871}"/>
+    <dgm:cxn modelId="{4A349358-232F-4862-9278-6DAD0D1558FA}" srcId="{03A84A47-66BB-4672-B482-A66813DCEB63}" destId="{B76F6BCC-4ED5-4B68-8D7E-2DCDC21098EA}" srcOrd="1" destOrd="0" parTransId="{330C9092-33F4-4401-9480-59BC39D274D7}" sibTransId="{497F3E52-2515-4274-A7BB-A9CFF819A81A}"/>
+    <dgm:cxn modelId="{76F28B97-E342-47D0-B26A-4A02B365D11D}" srcId="{05E9D5D4-AFAA-4D7A-9C47-6C715E01C091}" destId="{BE36232D-EC70-4CE7-9E4A-595BAFA1B4F5}" srcOrd="0" destOrd="0" parTransId="{778D9F08-F8ED-4E80-8173-8630DDB41364}" sibTransId="{F1A7906B-9EC5-4730-8D94-9A1E28BDD32F}"/>
     <dgm:cxn modelId="{F93C3125-AE9A-4D43-8110-0D963CF1F3D6}" type="presParOf" srcId="{C2AD7895-39DB-42BB-B9F9-96D7A2295531}" destId="{3D565A58-58BC-4CA5-9E55-65BF1F4D5C85}" srcOrd="0" destOrd="0" presId="urn:microsoft.com/office/officeart/2005/8/layout/hierarchy4"/>
     <dgm:cxn modelId="{36C239D9-DD51-4000-A231-2239463D9392}" type="presParOf" srcId="{3D565A58-58BC-4CA5-9E55-65BF1F4D5C85}" destId="{11BA99A9-BB38-4BAC-8F98-710E8D80418A}" srcOrd="0" destOrd="0" presId="urn:microsoft.com/office/officeart/2005/8/layout/hierarchy4"/>
-    <dgm:cxn modelId="{6E196E1F-823E-4117-AFC3-A336C932DD4F}" type="presParOf" srcId="{3D565A58-58BC-4CA5-9E55-65BF1F4D5C85}" destId="{FA76CA10-7DC6-403C-B63E-0E52D25DD286}" srcOrd="1" destOrd="0" presId="urn:microsoft.com/office/officeart/2005/8/layout/hierarchy4"/>
+    <dgm:cxn modelId="{AEB1FCF3-3CB7-4D86-9AEE-55FF8318D986}" type="presParOf" srcId="{3D565A58-58BC-4CA5-9E55-65BF1F4D5C85}" destId="{FA76CA10-7DC6-403C-B63E-0E52D25DD286}" srcOrd="1" destOrd="0" presId="urn:microsoft.com/office/officeart/2005/8/layout/hierarchy4"/>
     <dgm:cxn modelId="{E62EB6DE-5031-40AF-A1A3-0D20D18CAC92}" type="presParOf" srcId="{3D565A58-58BC-4CA5-9E55-65BF1F4D5C85}" destId="{82982347-C13D-4694-ADFD-3A149D185206}" srcOrd="2" destOrd="0" presId="urn:microsoft.com/office/officeart/2005/8/layout/hierarchy4"/>
-    <dgm:cxn modelId="{A946B371-688A-4C3E-9236-AFA2AF0564D6}" type="presParOf" srcId="{82982347-C13D-4694-ADFD-3A149D185206}" destId="{64F1462F-E843-4683-B0B9-DAD75A00E14B}" srcOrd="0" destOrd="0" presId="urn:microsoft.com/office/officeart/2005/8/layout/hierarchy4"/>
-    <dgm:cxn modelId="{6B019C81-6961-42B4-8CBD-FAA13448F912}" type="presParOf" srcId="{64F1462F-E843-4683-B0B9-DAD75A00E14B}" destId="{6B70D70C-EF4A-47DB-B009-FDEBA3A524F4}" srcOrd="0" destOrd="0" presId="urn:microsoft.com/office/officeart/2005/8/layout/hierarchy4"/>
-    <dgm:cxn modelId="{0C9DF157-8162-43B4-905B-0A85144C3645}" type="presParOf" srcId="{64F1462F-E843-4683-B0B9-DAD75A00E14B}" destId="{A2426F68-0345-40D9-8B47-8CEFF5D61CFA}" srcOrd="1" destOrd="0" presId="urn:microsoft.com/office/officeart/2005/8/layout/hierarchy4"/>
-    <dgm:cxn modelId="{2071B03A-6A0B-4349-8E54-A7B299614642}" type="presParOf" srcId="{82982347-C13D-4694-ADFD-3A149D185206}" destId="{293F34B1-5AEC-486D-B8CF-4D8359AD19FC}" srcOrd="1" destOrd="0" presId="urn:microsoft.com/office/officeart/2005/8/layout/hierarchy4"/>
-    <dgm:cxn modelId="{ABE5330F-82F0-4727-BA29-83D4135CE546}" type="presParOf" srcId="{82982347-C13D-4694-ADFD-3A149D185206}" destId="{DF11F189-44EB-4F4D-BB73-517058796C68}" srcOrd="2" destOrd="0" presId="urn:microsoft.com/office/officeart/2005/8/layout/hierarchy4"/>
-    <dgm:cxn modelId="{8801185B-CAB6-47F5-93DC-792BB91BF6C6}" type="presParOf" srcId="{DF11F189-44EB-4F4D-BB73-517058796C68}" destId="{77D0D594-A976-4F76-BB22-8AAF68AC054B}" srcOrd="0" destOrd="0" presId="urn:microsoft.com/office/officeart/2005/8/layout/hierarchy4"/>
-    <dgm:cxn modelId="{573F6128-4971-4CA2-ACC2-C2E96B48AE9F}" type="presParOf" srcId="{DF11F189-44EB-4F4D-BB73-517058796C68}" destId="{2D4A4AFF-A61E-44F8-8764-DE59FC0CC5D5}" srcOrd="1" destOrd="0" presId="urn:microsoft.com/office/officeart/2005/8/layout/hierarchy4"/>
-    <dgm:cxn modelId="{6393F750-8E93-4F0F-B0E3-DD7178525E64}" type="presParOf" srcId="{82982347-C13D-4694-ADFD-3A149D185206}" destId="{5F1D6B1A-47DD-40EA-9B56-3064B81209AF}" srcOrd="3" destOrd="0" presId="urn:microsoft.com/office/officeart/2005/8/layout/hierarchy4"/>
-    <dgm:cxn modelId="{635F57AC-159C-4698-9133-9FA90C472E51}" type="presParOf" srcId="{82982347-C13D-4694-ADFD-3A149D185206}" destId="{89AC9123-CFDF-4A73-A041-479D1C7E0990}" srcOrd="4" destOrd="0" presId="urn:microsoft.com/office/officeart/2005/8/layout/hierarchy4"/>
-    <dgm:cxn modelId="{FE53F1DC-E794-4E55-A7DB-01EECA1F8E01}" type="presParOf" srcId="{89AC9123-CFDF-4A73-A041-479D1C7E0990}" destId="{5F0CE19F-D7B0-4A05-8002-68E1CD3B36E7}" srcOrd="0" destOrd="0" presId="urn:microsoft.com/office/officeart/2005/8/layout/hierarchy4"/>
-    <dgm:cxn modelId="{DB6ABF99-3D84-4218-8ED4-5AB63EE56A34}" type="presParOf" srcId="{89AC9123-CFDF-4A73-A041-479D1C7E0990}" destId="{37174FC2-ADD2-4EA4-AB0F-4DF066E2FDCA}" srcOrd="1" destOrd="0" presId="urn:microsoft.com/office/officeart/2005/8/layout/hierarchy4"/>
-    <dgm:cxn modelId="{C8BE6F8F-8F94-46A4-8BA3-9915B09FC827}" type="presParOf" srcId="{82982347-C13D-4694-ADFD-3A149D185206}" destId="{794FB1B8-F598-4E42-A9C5-DF5081D124BC}" srcOrd="5" destOrd="0" presId="urn:microsoft.com/office/officeart/2005/8/layout/hierarchy4"/>
-    <dgm:cxn modelId="{3384CC6C-B80E-492E-B762-8592D42AE6AA}" type="presParOf" srcId="{82982347-C13D-4694-ADFD-3A149D185206}" destId="{DB3409F8-5E91-4AA6-ABD8-750C85A71BA8}" srcOrd="6" destOrd="0" presId="urn:microsoft.com/office/officeart/2005/8/layout/hierarchy4"/>
-    <dgm:cxn modelId="{B27937DD-C3D0-4CBE-8F13-28A7413FE92B}" type="presParOf" srcId="{DB3409F8-5E91-4AA6-ABD8-750C85A71BA8}" destId="{2FB4CB63-03B6-4728-9DF5-A1CB7309B6C8}" srcOrd="0" destOrd="0" presId="urn:microsoft.com/office/officeart/2005/8/layout/hierarchy4"/>
-    <dgm:cxn modelId="{D698CEB1-9D44-4442-A171-137042E96D23}" type="presParOf" srcId="{DB3409F8-5E91-4AA6-ABD8-750C85A71BA8}" destId="{04F5C5FC-CEB1-4751-8CCB-AD7DC46F403A}" srcOrd="1" destOrd="0" presId="urn:microsoft.com/office/officeart/2005/8/layout/hierarchy4"/>
+    <dgm:cxn modelId="{182BF178-29F6-4534-9F56-DBCC675E2672}" type="presParOf" srcId="{82982347-C13D-4694-ADFD-3A149D185206}" destId="{0EC8BAB8-D156-45D0-92CE-501A2CDD8816}" srcOrd="0" destOrd="0" presId="urn:microsoft.com/office/officeart/2005/8/layout/hierarchy4"/>
+    <dgm:cxn modelId="{B05E0076-708E-40C3-BE0F-C9F494D0EEC1}" type="presParOf" srcId="{0EC8BAB8-D156-45D0-92CE-501A2CDD8816}" destId="{C4D0CBCA-A900-42C4-9CB8-9544DB8FC493}" srcOrd="0" destOrd="0" presId="urn:microsoft.com/office/officeart/2005/8/layout/hierarchy4"/>
+    <dgm:cxn modelId="{9D4E3AE2-FA73-44E8-A50A-8641D340D2CA}" type="presParOf" srcId="{0EC8BAB8-D156-45D0-92CE-501A2CDD8816}" destId="{A88C77F8-BF17-42DE-ABAD-07BC219F3C33}" srcOrd="1" destOrd="0" presId="urn:microsoft.com/office/officeart/2005/8/layout/hierarchy4"/>
+    <dgm:cxn modelId="{476E0BFC-4D02-4F03-8E7E-18076B7A941C}" type="presParOf" srcId="{0EC8BAB8-D156-45D0-92CE-501A2CDD8816}" destId="{15B44DD7-7EB5-4A29-8DDA-C20DB750BE77}" srcOrd="2" destOrd="0" presId="urn:microsoft.com/office/officeart/2005/8/layout/hierarchy4"/>
+    <dgm:cxn modelId="{76B4C1D1-7E8A-4D52-8FE7-B565A84A1FD9}" type="presParOf" srcId="{15B44DD7-7EB5-4A29-8DDA-C20DB750BE77}" destId="{14229B7F-FEB9-4C2F-BA9E-5C462A47DBBD}" srcOrd="0" destOrd="0" presId="urn:microsoft.com/office/officeart/2005/8/layout/hierarchy4"/>
+    <dgm:cxn modelId="{36EFF1AC-2DE0-493D-8B41-359E91744D6F}" type="presParOf" srcId="{14229B7F-FEB9-4C2F-BA9E-5C462A47DBBD}" destId="{DCA89DAD-7D14-4B33-9BB1-39033B6780C1}" srcOrd="0" destOrd="0" presId="urn:microsoft.com/office/officeart/2005/8/layout/hierarchy4"/>
+    <dgm:cxn modelId="{B3DB08D5-116A-488F-BF84-6C38910F073C}" type="presParOf" srcId="{14229B7F-FEB9-4C2F-BA9E-5C462A47DBBD}" destId="{A54DD467-DBCF-4CD4-BCF9-3A4A4716A3B0}" srcOrd="1" destOrd="0" presId="urn:microsoft.com/office/officeart/2005/8/layout/hierarchy4"/>
+    <dgm:cxn modelId="{89F7A1AE-0BE8-4314-922C-A010365DFBA3}" type="presParOf" srcId="{15B44DD7-7EB5-4A29-8DDA-C20DB750BE77}" destId="{DBCFC3AF-91E1-4782-9337-D17384D01B67}" srcOrd="1" destOrd="0" presId="urn:microsoft.com/office/officeart/2005/8/layout/hierarchy4"/>
+    <dgm:cxn modelId="{1B9A58CD-D8E9-42FE-BE28-86F0261F1808}" type="presParOf" srcId="{15B44DD7-7EB5-4A29-8DDA-C20DB750BE77}" destId="{4BD0009E-B101-4B6E-87B7-762980B10E58}" srcOrd="2" destOrd="0" presId="urn:microsoft.com/office/officeart/2005/8/layout/hierarchy4"/>
+    <dgm:cxn modelId="{30E5BDFB-34DC-4442-9D1B-D89B0AB36BC6}" type="presParOf" srcId="{4BD0009E-B101-4B6E-87B7-762980B10E58}" destId="{C1F43AFC-F18B-4DD8-9577-9434DCD3C50A}" srcOrd="0" destOrd="0" presId="urn:microsoft.com/office/officeart/2005/8/layout/hierarchy4"/>
+    <dgm:cxn modelId="{7FA736E3-7AB4-421B-ADC3-709AF05871E4}" type="presParOf" srcId="{4BD0009E-B101-4B6E-87B7-762980B10E58}" destId="{E7CD6F91-4629-49EE-908C-6E0E27666DD0}" srcOrd="1" destOrd="0" presId="urn:microsoft.com/office/officeart/2005/8/layout/hierarchy4"/>
+    <dgm:cxn modelId="{78DD75C4-79A2-434A-AF68-852407A2E6FC}" type="presParOf" srcId="{82982347-C13D-4694-ADFD-3A149D185206}" destId="{68B6F937-0A6A-4861-AC0C-4557B42FFC31}" srcOrd="1" destOrd="0" presId="urn:microsoft.com/office/officeart/2005/8/layout/hierarchy4"/>
+    <dgm:cxn modelId="{7507E9B0-A760-4A5A-AFC4-50D284E686F1}" type="presParOf" srcId="{82982347-C13D-4694-ADFD-3A149D185206}" destId="{64F1462F-E843-4683-B0B9-DAD75A00E14B}" srcOrd="2" destOrd="0" presId="urn:microsoft.com/office/officeart/2005/8/layout/hierarchy4"/>
+    <dgm:cxn modelId="{8CBB536A-0D64-4629-9B4E-F1B3B948D72F}" type="presParOf" srcId="{64F1462F-E843-4683-B0B9-DAD75A00E14B}" destId="{6B70D70C-EF4A-47DB-B009-FDEBA3A524F4}" srcOrd="0" destOrd="0" presId="urn:microsoft.com/office/officeart/2005/8/layout/hierarchy4"/>
+    <dgm:cxn modelId="{10BDF3B3-AC12-4630-8365-C154D8DC7B27}" type="presParOf" srcId="{64F1462F-E843-4683-B0B9-DAD75A00E14B}" destId="{32A1FA68-51D6-4131-9BEF-EA5CDD6FA44C}" srcOrd="1" destOrd="0" presId="urn:microsoft.com/office/officeart/2005/8/layout/hierarchy4"/>
+    <dgm:cxn modelId="{0A486386-21B7-4A6D-B8BD-942B99988C4A}" type="presParOf" srcId="{64F1462F-E843-4683-B0B9-DAD75A00E14B}" destId="{A2426F68-0345-40D9-8B47-8CEFF5D61CFA}" srcOrd="2" destOrd="0" presId="urn:microsoft.com/office/officeart/2005/8/layout/hierarchy4"/>
+    <dgm:cxn modelId="{84DEAAF3-FD81-4076-8556-946F50D69567}" type="presParOf" srcId="{A2426F68-0345-40D9-8B47-8CEFF5D61CFA}" destId="{A29924A8-72D5-441C-8B84-D0143E073A1E}" srcOrd="0" destOrd="0" presId="urn:microsoft.com/office/officeart/2005/8/layout/hierarchy4"/>
+    <dgm:cxn modelId="{4C1F0A0B-4BF3-47C6-AD12-FD32CDC11A17}" type="presParOf" srcId="{A29924A8-72D5-441C-8B84-D0143E073A1E}" destId="{14EAB66A-1CF3-4287-9A42-298DAF92A41B}" srcOrd="0" destOrd="0" presId="urn:microsoft.com/office/officeart/2005/8/layout/hierarchy4"/>
+    <dgm:cxn modelId="{63ED0217-8014-4C5C-AC2B-4938185D887C}" type="presParOf" srcId="{A29924A8-72D5-441C-8B84-D0143E073A1E}" destId="{EE59312E-31AE-40D2-BB4F-504628C9A72A}" srcOrd="1" destOrd="0" presId="urn:microsoft.com/office/officeart/2005/8/layout/hierarchy4"/>
+    <dgm:cxn modelId="{EB104C82-963E-4F88-B41E-B3AE35A48AD7}" type="presParOf" srcId="{A2426F68-0345-40D9-8B47-8CEFF5D61CFA}" destId="{6399F604-A919-41E3-AC7E-F7B8D9457751}" srcOrd="1" destOrd="0" presId="urn:microsoft.com/office/officeart/2005/8/layout/hierarchy4"/>
+    <dgm:cxn modelId="{BA82635D-E778-48D2-84DB-02511D7A18C1}" type="presParOf" srcId="{A2426F68-0345-40D9-8B47-8CEFF5D61CFA}" destId="{5B4E5C40-3954-407D-87DC-9A0992398150}" srcOrd="2" destOrd="0" presId="urn:microsoft.com/office/officeart/2005/8/layout/hierarchy4"/>
+    <dgm:cxn modelId="{B1DA4F63-804F-412D-B767-9384FC87DFD0}" type="presParOf" srcId="{5B4E5C40-3954-407D-87DC-9A0992398150}" destId="{20F84B83-FF4B-4632-B676-4F44D91F6204}" srcOrd="0" destOrd="0" presId="urn:microsoft.com/office/officeart/2005/8/layout/hierarchy4"/>
+    <dgm:cxn modelId="{F51CC1DD-846F-4CA3-ADAB-049D14B57AC9}" type="presParOf" srcId="{5B4E5C40-3954-407D-87DC-9A0992398150}" destId="{F8B9DEAA-D77F-4A08-AB61-FAEEFF88DA0E}" srcOrd="1" destOrd="0" presId="urn:microsoft.com/office/officeart/2005/8/layout/hierarchy4"/>
   </dgm:cxnLst>
   <dgm:bg/>
   <dgm:whole/>
@@ -11138,7 +11390,6 @@
             <a:rPr lang="de-DE"/>
             <a:t>Backend</a:t>
           </a:r>
-          <a:endParaRPr lang="de-DE"/>
         </a:p>
       </dgm:t>
     </dgm:pt>
@@ -11306,12 +11557,12 @@
     </dgm:pt>
   </dgm:ptLst>
   <dgm:cxnLst>
+    <dgm:cxn modelId="{85315A10-D6EE-4C41-B04C-30117F99154C}" type="presOf" srcId="{F3338FDA-8730-4CA9-AB69-ED3E1541350F}" destId="{E89445D8-64ED-4365-AAF0-91EB5358E27C}" srcOrd="0" destOrd="0" presId="urn:microsoft.com/office/officeart/2005/8/layout/hierarchy4"/>
+    <dgm:cxn modelId="{29C6899B-1982-4F0F-B371-EC2293E4D021}" type="presOf" srcId="{DA298040-066D-4C44-A650-92BC431F6B6B}" destId="{12DE90B4-5968-448F-B43B-A78F9C95DA2E}" srcOrd="0" destOrd="0" presId="urn:microsoft.com/office/officeart/2005/8/layout/hierarchy4"/>
+    <dgm:cxn modelId="{8BAA2CEC-37B9-4782-855B-0A2D2E5F47A8}" type="presOf" srcId="{2B5638D2-6872-4937-8B75-BFD8BE3E213D}" destId="{4190804F-B79F-429B-B2F2-EB5DBC70CA12}" srcOrd="0" destOrd="0" presId="urn:microsoft.com/office/officeart/2005/8/layout/hierarchy4"/>
+    <dgm:cxn modelId="{67A1CF0F-E090-4457-B5FA-C84142154901}" srcId="{2B5638D2-6872-4937-8B75-BFD8BE3E213D}" destId="{D19FF4D7-FE98-4F88-B5FE-8FBE97DC98CF}" srcOrd="1" destOrd="0" parTransId="{5AE0A726-15D8-4818-A2BC-A161D8D6EAC5}" sibTransId="{80F13CCD-BF33-44FE-8C0B-35D6E6FE70BD}"/>
     <dgm:cxn modelId="{D6872927-150C-4CEE-98C3-F6C6800925EF}" srcId="{2B5638D2-6872-4937-8B75-BFD8BE3E213D}" destId="{DA298040-066D-4C44-A650-92BC431F6B6B}" srcOrd="0" destOrd="0" parTransId="{C30A9159-0358-4546-B0A6-9EE92E1E76D1}" sibTransId="{88D6E222-3CFA-4EC5-9FDF-46F4CCEC21B8}"/>
-    <dgm:cxn modelId="{29C6899B-1982-4F0F-B371-EC2293E4D021}" type="presOf" srcId="{DA298040-066D-4C44-A650-92BC431F6B6B}" destId="{12DE90B4-5968-448F-B43B-A78F9C95DA2E}" srcOrd="0" destOrd="0" presId="urn:microsoft.com/office/officeart/2005/8/layout/hierarchy4"/>
     <dgm:cxn modelId="{70CB187B-6E33-4377-8F87-87951BAB9147}" srcId="{F3338FDA-8730-4CA9-AB69-ED3E1541350F}" destId="{2B5638D2-6872-4937-8B75-BFD8BE3E213D}" srcOrd="0" destOrd="0" parTransId="{09CE7EFD-65BB-4122-B549-DD73AA3445E4}" sibTransId="{E7D24DF4-CB01-4BA3-8B10-156C6B0A161D}"/>
-    <dgm:cxn modelId="{67A1CF0F-E090-4457-B5FA-C84142154901}" srcId="{2B5638D2-6872-4937-8B75-BFD8BE3E213D}" destId="{D19FF4D7-FE98-4F88-B5FE-8FBE97DC98CF}" srcOrd="1" destOrd="0" parTransId="{5AE0A726-15D8-4818-A2BC-A161D8D6EAC5}" sibTransId="{80F13CCD-BF33-44FE-8C0B-35D6E6FE70BD}"/>
-    <dgm:cxn modelId="{8BAA2CEC-37B9-4782-855B-0A2D2E5F47A8}" type="presOf" srcId="{2B5638D2-6872-4937-8B75-BFD8BE3E213D}" destId="{4190804F-B79F-429B-B2F2-EB5DBC70CA12}" srcOrd="0" destOrd="0" presId="urn:microsoft.com/office/officeart/2005/8/layout/hierarchy4"/>
-    <dgm:cxn modelId="{85315A10-D6EE-4C41-B04C-30117F99154C}" type="presOf" srcId="{F3338FDA-8730-4CA9-AB69-ED3E1541350F}" destId="{E89445D8-64ED-4365-AAF0-91EB5358E27C}" srcOrd="0" destOrd="0" presId="urn:microsoft.com/office/officeart/2005/8/layout/hierarchy4"/>
     <dgm:cxn modelId="{8F97E501-3BE4-4AE0-9CDC-78E0357AAC2A}" type="presOf" srcId="{D19FF4D7-FE98-4F88-B5FE-8FBE97DC98CF}" destId="{8AD44526-81AA-4D54-BD60-6395A80C1557}" srcOrd="0" destOrd="0" presId="urn:microsoft.com/office/officeart/2005/8/layout/hierarchy4"/>
     <dgm:cxn modelId="{8DC96127-5E0D-47BD-AE5F-484081AC9AF0}" type="presParOf" srcId="{E89445D8-64ED-4365-AAF0-91EB5358E27C}" destId="{7C2C2F48-7EA9-4250-8F3A-7CD7860B88E1}" srcOrd="0" destOrd="0" presId="urn:microsoft.com/office/officeart/2005/8/layout/hierarchy4"/>
     <dgm:cxn modelId="{16C59755-EA70-46AE-992F-B1FB63871095}" type="presParOf" srcId="{7C2C2F48-7EA9-4250-8F3A-7CD7860B88E1}" destId="{4190804F-B79F-429B-B2F2-EB5DBC70CA12}" srcOrd="0" destOrd="0" presId="urn:microsoft.com/office/officeart/2005/8/layout/hierarchy4"/>
@@ -11695,19 +11946,19 @@
     </dgm:pt>
   </dgm:ptLst>
   <dgm:cxnLst>
+    <dgm:cxn modelId="{43AD44C9-3799-4410-BDCD-927A906B0ED4}" type="presOf" srcId="{037D34C7-9B9B-42F5-890E-099207A36F57}" destId="{CBBE39D3-809D-4932-BC59-BFA624C6D6ED}" srcOrd="0" destOrd="0" presId="urn:microsoft.com/office/officeart/2005/8/layout/hierarchy4"/>
+    <dgm:cxn modelId="{7CFEEF20-4EF1-4990-86FC-20A24A77806A}" srcId="{0FDB4A77-EF03-4EA8-A489-ED45DB209D0F}" destId="{488DE1CD-0841-4579-87DD-4560FDAF17D7}" srcOrd="3" destOrd="0" parTransId="{AECF4EF2-AC41-4D54-9D24-4221DE2DC6FB}" sibTransId="{82FEF85E-857E-433B-A769-FEE9595DBFA7}"/>
     <dgm:cxn modelId="{11364E55-3D4C-40C3-8174-C940BF1C1B53}" type="presOf" srcId="{26843203-65BC-450B-ACFB-BA0ED32F7CD3}" destId="{A297442F-27AD-4BF6-989E-028856BECD73}" srcOrd="0" destOrd="0" presId="urn:microsoft.com/office/officeart/2005/8/layout/hierarchy4"/>
-    <dgm:cxn modelId="{43AD44C9-3799-4410-BDCD-927A906B0ED4}" type="presOf" srcId="{037D34C7-9B9B-42F5-890E-099207A36F57}" destId="{CBBE39D3-809D-4932-BC59-BFA624C6D6ED}" srcOrd="0" destOrd="0" presId="urn:microsoft.com/office/officeart/2005/8/layout/hierarchy4"/>
+    <dgm:cxn modelId="{B9B328D3-EA67-42E1-A5CC-9C588A258555}" type="presOf" srcId="{081F7420-42F4-426D-9FDF-5FE9EA86D700}" destId="{10ACDF6D-F867-46DA-A367-D132FAD3ECD7}" srcOrd="0" destOrd="0" presId="urn:microsoft.com/office/officeart/2005/8/layout/hierarchy4"/>
     <dgm:cxn modelId="{CB478299-6862-4404-9FB7-CFD8C6426F5B}" srcId="{0FDB4A77-EF03-4EA8-A489-ED45DB209D0F}" destId="{081F7420-42F4-426D-9FDF-5FE9EA86D700}" srcOrd="4" destOrd="0" parTransId="{E3F0D2D7-8823-4F2A-B93F-2565E183C3C0}" sibTransId="{E2AAA514-9808-45A7-8566-9D4484479636}"/>
-    <dgm:cxn modelId="{B9B328D3-EA67-42E1-A5CC-9C588A258555}" type="presOf" srcId="{081F7420-42F4-426D-9FDF-5FE9EA86D700}" destId="{10ACDF6D-F867-46DA-A367-D132FAD3ECD7}" srcOrd="0" destOrd="0" presId="urn:microsoft.com/office/officeart/2005/8/layout/hierarchy4"/>
+    <dgm:cxn modelId="{FB51215E-6B4B-4D8F-BAA7-482F3A073D69}" type="presOf" srcId="{B7951108-7A1A-4D8C-9194-4E8468C98F0D}" destId="{2049B4ED-CAC1-4475-B155-1E68DF109902}" srcOrd="0" destOrd="0" presId="urn:microsoft.com/office/officeart/2005/8/layout/hierarchy4"/>
+    <dgm:cxn modelId="{F0B8F33A-2993-43F2-A241-EA9F62B7BE7A}" srcId="{0FDB4A77-EF03-4EA8-A489-ED45DB209D0F}" destId="{26843203-65BC-450B-ACFB-BA0ED32F7CD3}" srcOrd="0" destOrd="0" parTransId="{F35BC39C-7CF1-4A5A-8F59-BB33C7DF0830}" sibTransId="{B55B1A72-64D4-40A8-828E-90AF411F1D53}"/>
+    <dgm:cxn modelId="{C4D63C2C-A637-4E40-A824-4CB27000023A}" srcId="{B7951108-7A1A-4D8C-9194-4E8468C98F0D}" destId="{0FDB4A77-EF03-4EA8-A489-ED45DB209D0F}" srcOrd="0" destOrd="0" parTransId="{54C6D7F9-522F-4632-8C0B-3D0769DC057B}" sibTransId="{09DB5056-0228-427C-81AD-50938BB609EF}"/>
+    <dgm:cxn modelId="{B62CB11F-FBFC-4D02-8751-BEC6C2CEF429}" type="presOf" srcId="{5180E2A4-FB2D-4572-BD0A-07B50D63D856}" destId="{CC58BFA0-8A7A-4242-9728-3FECC7AB79EE}" srcOrd="0" destOrd="0" presId="urn:microsoft.com/office/officeart/2005/8/layout/hierarchy4"/>
     <dgm:cxn modelId="{71BB7F0D-81FF-4695-A0AC-CCA12006D05D}" type="presOf" srcId="{0FDB4A77-EF03-4EA8-A489-ED45DB209D0F}" destId="{7943FF23-6CC4-4C61-A94C-9223816B49D4}" srcOrd="0" destOrd="0" presId="urn:microsoft.com/office/officeart/2005/8/layout/hierarchy4"/>
+    <dgm:cxn modelId="{5D45E615-C4E0-4D0A-AA1C-9982E91AC1C5}" srcId="{0FDB4A77-EF03-4EA8-A489-ED45DB209D0F}" destId="{037D34C7-9B9B-42F5-890E-099207A36F57}" srcOrd="2" destOrd="0" parTransId="{6012FA0D-9746-4606-BB67-5097FE73B877}" sibTransId="{55DE2A59-42FF-49C3-BCEE-3E63F9F410D5}"/>
     <dgm:cxn modelId="{512D13CA-CC13-49FD-8430-58CFDF475FBF}" srcId="{0FDB4A77-EF03-4EA8-A489-ED45DB209D0F}" destId="{5180E2A4-FB2D-4572-BD0A-07B50D63D856}" srcOrd="1" destOrd="0" parTransId="{74E334E9-5FC9-4508-9BB7-E0B5559786FB}" sibTransId="{7B8B956B-5D32-4A6B-A141-2D805F1709F9}"/>
-    <dgm:cxn modelId="{B62CB11F-FBFC-4D02-8751-BEC6C2CEF429}" type="presOf" srcId="{5180E2A4-FB2D-4572-BD0A-07B50D63D856}" destId="{CC58BFA0-8A7A-4242-9728-3FECC7AB79EE}" srcOrd="0" destOrd="0" presId="urn:microsoft.com/office/officeart/2005/8/layout/hierarchy4"/>
     <dgm:cxn modelId="{C2904801-76B9-42E8-B684-60B3D9E3834D}" type="presOf" srcId="{488DE1CD-0841-4579-87DD-4560FDAF17D7}" destId="{EF51B2DA-7A12-44C8-B814-95D28E393A05}" srcOrd="0" destOrd="0" presId="urn:microsoft.com/office/officeart/2005/8/layout/hierarchy4"/>
-    <dgm:cxn modelId="{FB51215E-6B4B-4D8F-BAA7-482F3A073D69}" type="presOf" srcId="{B7951108-7A1A-4D8C-9194-4E8468C98F0D}" destId="{2049B4ED-CAC1-4475-B155-1E68DF109902}" srcOrd="0" destOrd="0" presId="urn:microsoft.com/office/officeart/2005/8/layout/hierarchy4"/>
-    <dgm:cxn modelId="{5D45E615-C4E0-4D0A-AA1C-9982E91AC1C5}" srcId="{0FDB4A77-EF03-4EA8-A489-ED45DB209D0F}" destId="{037D34C7-9B9B-42F5-890E-099207A36F57}" srcOrd="2" destOrd="0" parTransId="{6012FA0D-9746-4606-BB67-5097FE73B877}" sibTransId="{55DE2A59-42FF-49C3-BCEE-3E63F9F410D5}"/>
-    <dgm:cxn modelId="{7CFEEF20-4EF1-4990-86FC-20A24A77806A}" srcId="{0FDB4A77-EF03-4EA8-A489-ED45DB209D0F}" destId="{488DE1CD-0841-4579-87DD-4560FDAF17D7}" srcOrd="3" destOrd="0" parTransId="{AECF4EF2-AC41-4D54-9D24-4221DE2DC6FB}" sibTransId="{82FEF85E-857E-433B-A769-FEE9595DBFA7}"/>
-    <dgm:cxn modelId="{C4D63C2C-A637-4E40-A824-4CB27000023A}" srcId="{B7951108-7A1A-4D8C-9194-4E8468C98F0D}" destId="{0FDB4A77-EF03-4EA8-A489-ED45DB209D0F}" srcOrd="0" destOrd="0" parTransId="{54C6D7F9-522F-4632-8C0B-3D0769DC057B}" sibTransId="{09DB5056-0228-427C-81AD-50938BB609EF}"/>
-    <dgm:cxn modelId="{F0B8F33A-2993-43F2-A241-EA9F62B7BE7A}" srcId="{0FDB4A77-EF03-4EA8-A489-ED45DB209D0F}" destId="{26843203-65BC-450B-ACFB-BA0ED32F7CD3}" srcOrd="0" destOrd="0" parTransId="{F35BC39C-7CF1-4A5A-8F59-BB33C7DF0830}" sibTransId="{B55B1A72-64D4-40A8-828E-90AF411F1D53}"/>
     <dgm:cxn modelId="{E1B0700D-7CDE-49E6-9EEE-953EB093E3F9}" type="presParOf" srcId="{2049B4ED-CAC1-4475-B155-1E68DF109902}" destId="{E2893A3D-4797-44D3-B0EB-C5A0ECCFEF5E}" srcOrd="0" destOrd="0" presId="urn:microsoft.com/office/officeart/2005/8/layout/hierarchy4"/>
     <dgm:cxn modelId="{A4EB1212-FAA0-44BE-99EF-1848584860FF}" type="presParOf" srcId="{E2893A3D-4797-44D3-B0EB-C5A0ECCFEF5E}" destId="{7943FF23-6CC4-4C61-A94C-9223816B49D4}" srcOrd="0" destOrd="0" presId="urn:microsoft.com/office/officeart/2005/8/layout/hierarchy4"/>
     <dgm:cxn modelId="{C5DEF356-A959-42FD-A531-D6D12A6A5CD4}" type="presParOf" srcId="{E2893A3D-4797-44D3-B0EB-C5A0ECCFEF5E}" destId="{764D746C-C7BC-4375-9184-1175264BA11A}" srcOrd="1" destOrd="0" presId="urn:microsoft.com/office/officeart/2005/8/layout/hierarchy4"/>
@@ -11767,7 +12018,6 @@
             <a:rPr lang="de-DE"/>
             <a:t>Initialisierung</a:t>
           </a:r>
-          <a:endParaRPr lang="de-DE"/>
         </a:p>
       </dgm:t>
     </dgm:pt>
@@ -11996,8 +12246,8 @@
     <dgm:cxn modelId="{AFEB6FD9-1627-4117-ABDC-5E18AE450F65}" type="presOf" srcId="{14480416-D723-4850-B680-D273EF5CEA38}" destId="{7F1CF72B-9C4A-41B8-8BDF-1B9FE9FBD80C}" srcOrd="0" destOrd="0" presId="urn:microsoft.com/office/officeart/2005/8/layout/hierarchy4"/>
     <dgm:cxn modelId="{CDAEEC5C-39DA-4293-8719-FD8BD247BF05}" srcId="{7A5313B1-4B03-4324-85F8-C4A8D5149849}" destId="{0C0640BE-5C3E-45A1-A64B-EDB324D0D8E2}" srcOrd="0" destOrd="0" parTransId="{A0CFD1CE-FDFD-4CBD-BF8A-261F5719177D}" sibTransId="{72A55C47-F087-476F-94DE-80E01D600968}"/>
     <dgm:cxn modelId="{C8C38D58-7994-4FC3-8D69-D8AF639960D9}" srcId="{7A5313B1-4B03-4324-85F8-C4A8D5149849}" destId="{14480416-D723-4850-B680-D273EF5CEA38}" srcOrd="1" destOrd="0" parTransId="{8708CACD-0DCD-428E-8AFF-E83936CFBD5C}" sibTransId="{91693767-4626-4394-833D-CF4CA0D854F6}"/>
+    <dgm:cxn modelId="{67464038-D7A9-4D16-B698-03122E37812C}" type="presOf" srcId="{0C0640BE-5C3E-45A1-A64B-EDB324D0D8E2}" destId="{60922B3A-3EA8-4537-9E70-59554EE65B5A}" srcOrd="0" destOrd="0" presId="urn:microsoft.com/office/officeart/2005/8/layout/hierarchy4"/>
     <dgm:cxn modelId="{A4DBF02A-8ED3-4045-9F94-32FEFDA3FF80}" type="presOf" srcId="{8AD537AD-6E7E-4C31-AB13-5B841640D630}" destId="{0B7021F6-3C8E-4A4C-80F5-2CD1D70A0AF0}" srcOrd="0" destOrd="0" presId="urn:microsoft.com/office/officeart/2005/8/layout/hierarchy4"/>
-    <dgm:cxn modelId="{67464038-D7A9-4D16-B698-03122E37812C}" type="presOf" srcId="{0C0640BE-5C3E-45A1-A64B-EDB324D0D8E2}" destId="{60922B3A-3EA8-4537-9E70-59554EE65B5A}" srcOrd="0" destOrd="0" presId="urn:microsoft.com/office/officeart/2005/8/layout/hierarchy4"/>
     <dgm:cxn modelId="{FBF146E6-4DCC-45E1-A9FD-88FE0AC9C62B}" type="presOf" srcId="{7A5313B1-4B03-4324-85F8-C4A8D5149849}" destId="{77C93BF6-337F-4563-8DE3-74C168D01EF3}" srcOrd="0" destOrd="0" presId="urn:microsoft.com/office/officeart/2005/8/layout/hierarchy4"/>
     <dgm:cxn modelId="{BEC4AE5A-9E50-43B2-BB3A-6C419C8FCCE6}" srcId="{7A5313B1-4B03-4324-85F8-C4A8D5149849}" destId="{8AD537AD-6E7E-4C31-AB13-5B841640D630}" srcOrd="2" destOrd="0" parTransId="{A8E2BCE4-BFB7-4651-A607-15EF3F291F5F}" sibTransId="{AD4542EE-08AE-4F80-8EFE-389C8354D23B}"/>
     <dgm:cxn modelId="{C077EDF6-7C26-49BE-83B6-8AC748169C86}" type="presParOf" srcId="{D417E714-19CB-407C-9BF2-090593A9430F}" destId="{7B3FDB73-D7DD-4A26-B0EB-F81E0504CF3E}" srcOrd="0" destOrd="0" presId="urn:microsoft.com/office/officeart/2005/8/layout/hierarchy4"/>
@@ -12051,7 +12301,6 @@
             <a:rPr lang="de-DE"/>
             <a:t>Definition</a:t>
           </a:r>
-          <a:endParaRPr lang="de-DE"/>
         </a:p>
       </dgm:t>
     </dgm:pt>
@@ -12523,7 +12772,6 @@
             <a:rPr lang="de-DE"/>
             <a:t>Planung</a:t>
           </a:r>
-          <a:endParaRPr lang="de-DE"/>
         </a:p>
       </dgm:t>
     </dgm:pt>
@@ -12803,17 +13051,17 @@
     </dgm:pt>
   </dgm:ptLst>
   <dgm:cxnLst>
-    <dgm:cxn modelId="{504BC4BA-0EEE-4FF6-8433-C4FD557E63C7}" srcId="{1851CE04-FCD4-45F6-A046-30A926A7FF1B}" destId="{C1E771FC-72A9-41A5-A78B-880237318248}" srcOrd="3" destOrd="0" parTransId="{B0ECA74E-046B-4FAE-AFF1-22C791B03D03}" sibTransId="{3DC9E265-1220-41AC-B951-C3AE0B767F56}"/>
     <dgm:cxn modelId="{58D3C833-130A-4EC5-8F0C-3C5BB3EFDA93}" type="presOf" srcId="{C1E771FC-72A9-41A5-A78B-880237318248}" destId="{1C12FFDE-CA4A-4B84-B407-C972624CF5E2}" srcOrd="0" destOrd="0" presId="urn:microsoft.com/office/officeart/2005/8/layout/hierarchy4"/>
     <dgm:cxn modelId="{F9F48B90-E0DC-4436-9957-C08D78E2144B}" type="presOf" srcId="{1851CE04-FCD4-45F6-A046-30A926A7FF1B}" destId="{9481B171-4B2A-416D-B18D-1023D861FB3F}" srcOrd="0" destOrd="0" presId="urn:microsoft.com/office/officeart/2005/8/layout/hierarchy4"/>
+    <dgm:cxn modelId="{A6A313D1-3B33-44B8-8A1E-BDD7C549319F}" type="presOf" srcId="{FAB62999-6AEC-411A-AA95-EB2AAB74F9BA}" destId="{87777BCA-BCCE-4FA0-A222-44453153CE7C}" srcOrd="0" destOrd="0" presId="urn:microsoft.com/office/officeart/2005/8/layout/hierarchy4"/>
+    <dgm:cxn modelId="{404C88BE-6D7A-4EFC-BB98-FEF18F9D1B9E}" srcId="{1851CE04-FCD4-45F6-A046-30A926A7FF1B}" destId="{0CEF5EC9-7474-4AD6-A3A8-880CB75C4A21}" srcOrd="0" destOrd="0" parTransId="{37BA75FA-FCCE-4D6C-8124-F2CD6BEC8BA9}" sibTransId="{90369423-9621-46DA-9402-12FA52D3D603}"/>
+    <dgm:cxn modelId="{504BC4BA-0EEE-4FF6-8433-C4FD557E63C7}" srcId="{1851CE04-FCD4-45F6-A046-30A926A7FF1B}" destId="{C1E771FC-72A9-41A5-A78B-880237318248}" srcOrd="3" destOrd="0" parTransId="{B0ECA74E-046B-4FAE-AFF1-22C791B03D03}" sibTransId="{3DC9E265-1220-41AC-B951-C3AE0B767F56}"/>
+    <dgm:cxn modelId="{62909D41-AAB6-4039-9E50-AE0983A81E0B}" type="presOf" srcId="{D629BE84-2302-4D38-85A2-D20F3276C725}" destId="{C781B3A6-D232-4294-A7BA-075AE7BBE43B}" srcOrd="0" destOrd="0" presId="urn:microsoft.com/office/officeart/2005/8/layout/hierarchy4"/>
+    <dgm:cxn modelId="{40001D4A-E22A-4CC1-8E94-333D52ED08F7}" type="presOf" srcId="{0CEF5EC9-7474-4AD6-A3A8-880CB75C4A21}" destId="{07C2D079-F2E1-4B42-9B02-D372B396F0AC}" srcOrd="0" destOrd="0" presId="urn:microsoft.com/office/officeart/2005/8/layout/hierarchy4"/>
     <dgm:cxn modelId="{280C1658-9AAC-4245-9353-4F087A852FBB}" type="presOf" srcId="{ACFA330A-76F1-41B4-B334-9619CE0B25D7}" destId="{A0A9A67D-A71A-43E7-B904-A7326484AB20}" srcOrd="0" destOrd="0" presId="urn:microsoft.com/office/officeart/2005/8/layout/hierarchy4"/>
     <dgm:cxn modelId="{473496AF-65AC-4B9A-9A0F-30CCB76CC726}" srcId="{1851CE04-FCD4-45F6-A046-30A926A7FF1B}" destId="{D629BE84-2302-4D38-85A2-D20F3276C725}" srcOrd="1" destOrd="0" parTransId="{CB7EE8B1-028A-4411-8FCA-A94976867E25}" sibTransId="{DBD4B3EE-F723-4E35-82C9-751EE1D26001}"/>
     <dgm:cxn modelId="{7D41060B-8E4F-468D-BC40-CE1E560BD312}" srcId="{FAB62999-6AEC-411A-AA95-EB2AAB74F9BA}" destId="{1851CE04-FCD4-45F6-A046-30A926A7FF1B}" srcOrd="0" destOrd="0" parTransId="{9C8897E2-F3CE-487B-B482-FA51A8073ADF}" sibTransId="{6BE3F37D-CC94-4D08-9147-49F606C15888}"/>
     <dgm:cxn modelId="{D254C914-1D91-467B-8597-B9A51A6D0FC5}" srcId="{1851CE04-FCD4-45F6-A046-30A926A7FF1B}" destId="{ACFA330A-76F1-41B4-B334-9619CE0B25D7}" srcOrd="2" destOrd="0" parTransId="{9E3FEC5D-16C0-430F-A75A-561EDA91F5BC}" sibTransId="{BD0C46CD-CA5D-4221-B976-0C489E3DC375}"/>
-    <dgm:cxn modelId="{62909D41-AAB6-4039-9E50-AE0983A81E0B}" type="presOf" srcId="{D629BE84-2302-4D38-85A2-D20F3276C725}" destId="{C781B3A6-D232-4294-A7BA-075AE7BBE43B}" srcOrd="0" destOrd="0" presId="urn:microsoft.com/office/officeart/2005/8/layout/hierarchy4"/>
-    <dgm:cxn modelId="{A6A313D1-3B33-44B8-8A1E-BDD7C549319F}" type="presOf" srcId="{FAB62999-6AEC-411A-AA95-EB2AAB74F9BA}" destId="{87777BCA-BCCE-4FA0-A222-44453153CE7C}" srcOrd="0" destOrd="0" presId="urn:microsoft.com/office/officeart/2005/8/layout/hierarchy4"/>
-    <dgm:cxn modelId="{404C88BE-6D7A-4EFC-BB98-FEF18F9D1B9E}" srcId="{1851CE04-FCD4-45F6-A046-30A926A7FF1B}" destId="{0CEF5EC9-7474-4AD6-A3A8-880CB75C4A21}" srcOrd="0" destOrd="0" parTransId="{37BA75FA-FCCE-4D6C-8124-F2CD6BEC8BA9}" sibTransId="{90369423-9621-46DA-9402-12FA52D3D603}"/>
-    <dgm:cxn modelId="{40001D4A-E22A-4CC1-8E94-333D52ED08F7}" type="presOf" srcId="{0CEF5EC9-7474-4AD6-A3A8-880CB75C4A21}" destId="{07C2D079-F2E1-4B42-9B02-D372B396F0AC}" srcOrd="0" destOrd="0" presId="urn:microsoft.com/office/officeart/2005/8/layout/hierarchy4"/>
     <dgm:cxn modelId="{94A9C831-B4FB-4813-AAA3-7C0F3C508EBF}" type="presParOf" srcId="{87777BCA-BCCE-4FA0-A222-44453153CE7C}" destId="{9FFC50DA-570B-480B-8B2D-C3E762E02E2C}" srcOrd="0" destOrd="0" presId="urn:microsoft.com/office/officeart/2005/8/layout/hierarchy4"/>
     <dgm:cxn modelId="{C6B3C2BF-767F-40A5-BF78-E609F7FB2E13}" type="presParOf" srcId="{9FFC50DA-570B-480B-8B2D-C3E762E02E2C}" destId="{9481B171-4B2A-416D-B18D-1023D861FB3F}" srcOrd="0" destOrd="0" presId="urn:microsoft.com/office/officeart/2005/8/layout/hierarchy4"/>
     <dgm:cxn modelId="{24763B58-D0EA-4D5D-A333-47893AA89137}" type="presParOf" srcId="{9FFC50DA-570B-480B-8B2D-C3E762E02E2C}" destId="{7550D192-02BA-4B52-AF52-0898BB992B36}" srcOrd="1" destOrd="0" presId="urn:microsoft.com/office/officeart/2005/8/layout/hierarchy4"/>
@@ -12869,7 +13117,6 @@
             <a:rPr lang="de-DE"/>
             <a:t>Steuerung</a:t>
           </a:r>
-          <a:endParaRPr lang="de-DE"/>
         </a:p>
       </dgm:t>
     </dgm:pt>
@@ -13205,18 +13452,18 @@
     </dgm:pt>
   </dgm:ptLst>
   <dgm:cxnLst>
-    <dgm:cxn modelId="{26006C6E-A327-4327-8CE6-EFE48E4DB50D}" type="presOf" srcId="{1DA23E65-B8DF-494C-85BB-C2227F8BCFDF}" destId="{4777BAAC-3E46-40AB-9420-6CB6F2FB7783}" srcOrd="0" destOrd="0" presId="urn:microsoft.com/office/officeart/2005/8/layout/hierarchy4"/>
-    <dgm:cxn modelId="{90B5D6E4-C941-4642-9252-4A0201ABCD61}" type="presOf" srcId="{B7F501E4-EEC5-477B-9D42-C1281DEE8B94}" destId="{B6633EFF-986B-4595-AFFC-7A8F01A58844}" srcOrd="0" destOrd="0" presId="urn:microsoft.com/office/officeart/2005/8/layout/hierarchy4"/>
-    <dgm:cxn modelId="{1F4646F9-AC7E-4AEE-A9DB-6E695733BB55}" type="presOf" srcId="{82A175EA-7F90-40B1-B19F-2768BEDD6221}" destId="{D15C5416-338D-4000-9600-FA1517D4E43A}" srcOrd="0" destOrd="0" presId="urn:microsoft.com/office/officeart/2005/8/layout/hierarchy4"/>
+    <dgm:cxn modelId="{F9745D53-5C99-46BE-844F-F61C030611EE}" type="presOf" srcId="{FB0800D2-EAAC-4D39-B05A-CB3E01274AD2}" destId="{7A92B82E-43EA-472C-9BB9-C9DCC4A42989}" srcOrd="0" destOrd="0" presId="urn:microsoft.com/office/officeart/2005/8/layout/hierarchy4"/>
     <dgm:cxn modelId="{0EF1E34E-F109-41EB-8C0B-1C7F8CE6FFC6}" srcId="{1DA23E65-B8DF-494C-85BB-C2227F8BCFDF}" destId="{DB4D2A83-8BC5-48EB-8DB2-AF90D1678E91}" srcOrd="0" destOrd="0" parTransId="{6F009BCB-D350-4602-858F-65609FACF903}" sibTransId="{829B186B-45FE-4D99-9387-07058BAA84F3}"/>
     <dgm:cxn modelId="{DFB57CED-1D5C-4021-AE73-64240EB61B2A}" srcId="{1DA23E65-B8DF-494C-85BB-C2227F8BCFDF}" destId="{82A175EA-7F90-40B1-B19F-2768BEDD6221}" srcOrd="1" destOrd="0" parTransId="{6060E28D-802A-4617-B3DD-2F1E8064AAB4}" sibTransId="{1D52E3D7-3335-4CD9-8E31-AD4BC6DFA920}"/>
+    <dgm:cxn modelId="{1F4646F9-AC7E-4AEE-A9DB-6E695733BB55}" type="presOf" srcId="{82A175EA-7F90-40B1-B19F-2768BEDD6221}" destId="{D15C5416-338D-4000-9600-FA1517D4E43A}" srcOrd="0" destOrd="0" presId="urn:microsoft.com/office/officeart/2005/8/layout/hierarchy4"/>
+    <dgm:cxn modelId="{5FED2E04-64EA-44FF-8972-77AEC21606B4}" type="presOf" srcId="{0DE9808A-4488-4DA6-AD89-4A6A357CE771}" destId="{C3689CF5-C0AF-443B-A724-6477F1FC8CE0}" srcOrd="0" destOrd="0" presId="urn:microsoft.com/office/officeart/2005/8/layout/hierarchy4"/>
+    <dgm:cxn modelId="{A29E56F9-04DF-4230-8D6B-F5FA911048C7}" type="presOf" srcId="{DB4D2A83-8BC5-48EB-8DB2-AF90D1678E91}" destId="{166C6867-68A7-457D-AB43-20EC2B4938A4}" srcOrd="0" destOrd="0" presId="urn:microsoft.com/office/officeart/2005/8/layout/hierarchy4"/>
+    <dgm:cxn modelId="{90B5D6E4-C941-4642-9252-4A0201ABCD61}" type="presOf" srcId="{B7F501E4-EEC5-477B-9D42-C1281DEE8B94}" destId="{B6633EFF-986B-4595-AFFC-7A8F01A58844}" srcOrd="0" destOrd="0" presId="urn:microsoft.com/office/officeart/2005/8/layout/hierarchy4"/>
+    <dgm:cxn modelId="{26006C6E-A327-4327-8CE6-EFE48E4DB50D}" type="presOf" srcId="{1DA23E65-B8DF-494C-85BB-C2227F8BCFDF}" destId="{4777BAAC-3E46-40AB-9420-6CB6F2FB7783}" srcOrd="0" destOrd="0" presId="urn:microsoft.com/office/officeart/2005/8/layout/hierarchy4"/>
+    <dgm:cxn modelId="{075AA3B2-8DFA-49F2-A5BD-E48BE2BE4E9D}" srcId="{1DA23E65-B8DF-494C-85BB-C2227F8BCFDF}" destId="{0DE9808A-4488-4DA6-AD89-4A6A357CE771}" srcOrd="4" destOrd="0" parTransId="{8A32EAEA-A22B-4164-A453-AA35768015DF}" sibTransId="{9CCBE8DC-C32F-4C5C-8FB5-65CD9A489771}"/>
+    <dgm:cxn modelId="{89A6D8CE-1A6A-4823-9C33-BE66C66FA993}" type="presOf" srcId="{FF16103A-5027-4CB4-B2EE-B3C8A3FF6160}" destId="{4EAB02EA-83EE-49AE-A005-A2BE373B1D95}" srcOrd="0" destOrd="0" presId="urn:microsoft.com/office/officeart/2005/8/layout/hierarchy4"/>
     <dgm:cxn modelId="{0D3DA201-6E93-4CE8-AD23-BEF89FCE5514}" srcId="{B7F501E4-EEC5-477B-9D42-C1281DEE8B94}" destId="{1DA23E65-B8DF-494C-85BB-C2227F8BCFDF}" srcOrd="0" destOrd="0" parTransId="{1D174795-44A7-461A-A5D5-93A2B31275F2}" sibTransId="{8596D98E-030D-49D5-8098-7AFD58DD9452}"/>
-    <dgm:cxn modelId="{5FED2E04-64EA-44FF-8972-77AEC21606B4}" type="presOf" srcId="{0DE9808A-4488-4DA6-AD89-4A6A357CE771}" destId="{C3689CF5-C0AF-443B-A724-6477F1FC8CE0}" srcOrd="0" destOrd="0" presId="urn:microsoft.com/office/officeart/2005/8/layout/hierarchy4"/>
     <dgm:cxn modelId="{4CA286B1-CE16-4F7C-8718-788AC089FDD9}" srcId="{1DA23E65-B8DF-494C-85BB-C2227F8BCFDF}" destId="{FB0800D2-EAAC-4D39-B05A-CB3E01274AD2}" srcOrd="2" destOrd="0" parTransId="{66155D6F-F015-4DF2-9322-146247B95552}" sibTransId="{6B26C4E8-BB62-4F3E-9C0A-C107BC1280F6}"/>
-    <dgm:cxn modelId="{A29E56F9-04DF-4230-8D6B-F5FA911048C7}" type="presOf" srcId="{DB4D2A83-8BC5-48EB-8DB2-AF90D1678E91}" destId="{166C6867-68A7-457D-AB43-20EC2B4938A4}" srcOrd="0" destOrd="0" presId="urn:microsoft.com/office/officeart/2005/8/layout/hierarchy4"/>
-    <dgm:cxn modelId="{89A6D8CE-1A6A-4823-9C33-BE66C66FA993}" type="presOf" srcId="{FF16103A-5027-4CB4-B2EE-B3C8A3FF6160}" destId="{4EAB02EA-83EE-49AE-A005-A2BE373B1D95}" srcOrd="0" destOrd="0" presId="urn:microsoft.com/office/officeart/2005/8/layout/hierarchy4"/>
-    <dgm:cxn modelId="{075AA3B2-8DFA-49F2-A5BD-E48BE2BE4E9D}" srcId="{1DA23E65-B8DF-494C-85BB-C2227F8BCFDF}" destId="{0DE9808A-4488-4DA6-AD89-4A6A357CE771}" srcOrd="4" destOrd="0" parTransId="{8A32EAEA-A22B-4164-A453-AA35768015DF}" sibTransId="{9CCBE8DC-C32F-4C5C-8FB5-65CD9A489771}"/>
-    <dgm:cxn modelId="{F9745D53-5C99-46BE-844F-F61C030611EE}" type="presOf" srcId="{FB0800D2-EAAC-4D39-B05A-CB3E01274AD2}" destId="{7A92B82E-43EA-472C-9BB9-C9DCC4A42989}" srcOrd="0" destOrd="0" presId="urn:microsoft.com/office/officeart/2005/8/layout/hierarchy4"/>
     <dgm:cxn modelId="{F5739AFE-C0C8-4FB1-A195-52E52787D956}" srcId="{1DA23E65-B8DF-494C-85BB-C2227F8BCFDF}" destId="{FF16103A-5027-4CB4-B2EE-B3C8A3FF6160}" srcOrd="3" destOrd="0" parTransId="{5EED8C26-DCA8-4123-9742-3FE2E4533C5E}" sibTransId="{45DDF2F7-4FC8-4350-916B-0B7D88605EFB}"/>
     <dgm:cxn modelId="{90D13CC7-3B99-4159-BFCF-8E8E53186FA5}" type="presParOf" srcId="{B6633EFF-986B-4595-AFFC-7A8F01A58844}" destId="{0D4659F4-6D0D-4C77-BE12-7884FD99E524}" srcOrd="0" destOrd="0" presId="urn:microsoft.com/office/officeart/2005/8/layout/hierarchy4"/>
     <dgm:cxn modelId="{62240010-7633-4043-B0C4-F3ECA6F109E4}" type="presParOf" srcId="{0D4659F4-6D0D-4C77-BE12-7884FD99E524}" destId="{4777BAAC-3E46-40AB-9420-6CB6F2FB7783}" srcOrd="0" destOrd="0" presId="urn:microsoft.com/office/officeart/2005/8/layout/hierarchy4"/>
@@ -16552,7 +16799,6 @@
             <a:rPr lang="de-DE" sz="6500" kern="1200"/>
             <a:t>Abschluss</a:t>
           </a:r>
-          <a:endParaRPr lang="de-DE" sz="6500" kern="1200"/>
         </a:p>
       </dsp:txBody>
       <dsp:txXfrm>
@@ -16819,8 +17065,8 @@
       </dsp:nvSpPr>
       <dsp:spPr>
         <a:xfrm>
-          <a:off x="3779" y="230"/>
-          <a:ext cx="10508041" cy="2037565"/>
+          <a:off x="3881" y="600"/>
+          <a:ext cx="10507836" cy="1330047"/>
         </a:xfrm>
         <a:prstGeom prst="roundRect">
           <a:avLst>
@@ -16864,12 +17110,12 @@
         </a:fontRef>
       </dsp:style>
       <dsp:txBody>
-        <a:bodyPr spcFirstLastPara="0" vert="horz" wrap="square" lIns="247650" tIns="247650" rIns="247650" bIns="247650" numCol="1" spcCol="1270" anchor="ctr" anchorCtr="0">
+        <a:bodyPr spcFirstLastPara="0" vert="horz" wrap="square" lIns="220980" tIns="220980" rIns="220980" bIns="220980" numCol="1" spcCol="1270" anchor="ctr" anchorCtr="0">
           <a:noAutofit/>
         </a:bodyPr>
         <a:lstStyle/>
         <a:p>
-          <a:pPr marL="0" lvl="0" indent="0" algn="ctr" defTabSz="2889250">
+          <a:pPr marL="0" lvl="0" indent="0" algn="ctr" defTabSz="2578100">
             <a:lnSpc>
               <a:spcPct val="90000"/>
             </a:lnSpc>
@@ -16882,26 +17128,25 @@
             <a:buNone/>
           </a:pPr>
           <a:r>
-            <a:rPr lang="de-DE" sz="6500" kern="1200"/>
+            <a:rPr lang="de-DE" sz="5800" kern="1200" dirty="0"/>
             <a:t>Design</a:t>
           </a:r>
-          <a:endParaRPr lang="de-DE" sz="6500" kern="1200"/>
         </a:p>
       </dsp:txBody>
       <dsp:txXfrm>
-        <a:off x="63457" y="59908"/>
-        <a:ext cx="10388685" cy="1918209"/>
+        <a:off x="42837" y="39556"/>
+        <a:ext cx="10429924" cy="1252135"/>
       </dsp:txXfrm>
     </dsp:sp>
-    <dsp:sp modelId="{E691C4EA-E48E-43BD-A0E8-701801E40CF7}">
+    <dsp:sp modelId="{7BD4B7AB-17A7-4E45-8E06-9DAFAB1DB37C}">
       <dsp:nvSpPr>
         <dsp:cNvPr id="0" name=""/>
         <dsp:cNvSpPr/>
       </dsp:nvSpPr>
       <dsp:spPr>
         <a:xfrm>
-          <a:off x="3779" y="2313542"/>
-          <a:ext cx="3316932" cy="2037565"/>
+          <a:off x="3881" y="1510645"/>
+          <a:ext cx="5148033" cy="1330047"/>
         </a:xfrm>
         <a:prstGeom prst="roundRect">
           <a:avLst>
@@ -16945,12 +17190,12 @@
         </a:fontRef>
       </dsp:style>
       <dsp:txBody>
-        <a:bodyPr spcFirstLastPara="0" vert="horz" wrap="square" lIns="179070" tIns="179070" rIns="179070" bIns="179070" numCol="1" spcCol="1270" anchor="ctr" anchorCtr="0">
+        <a:bodyPr spcFirstLastPara="0" vert="horz" wrap="square" lIns="220980" tIns="220980" rIns="220980" bIns="220980" numCol="1" spcCol="1270" anchor="ctr" anchorCtr="0">
           <a:noAutofit/>
         </a:bodyPr>
         <a:lstStyle/>
         <a:p>
-          <a:pPr marL="0" lvl="0" indent="0" algn="ctr" defTabSz="2089150">
+          <a:pPr marL="0" lvl="0" indent="0" algn="ctr" defTabSz="2578100">
             <a:lnSpc>
               <a:spcPct val="90000"/>
             </a:lnSpc>
@@ -16963,30 +17208,25 @@
             <a:buNone/>
           </a:pPr>
           <a:r>
-            <a:rPr lang="de-DE" sz="4700" kern="1200" dirty="0"/>
-            <a:t>Mock </a:t>
+            <a:rPr lang="de-DE" sz="5800" kern="1200" dirty="0"/>
+            <a:t>Umsetzung</a:t>
           </a:r>
-          <a:r>
-            <a:rPr lang="de-DE" sz="4700" kern="1200" dirty="0" err="1"/>
-            <a:t>Up</a:t>
-          </a:r>
-          <a:endParaRPr lang="de-DE" sz="4700" kern="1200" dirty="0"/>
         </a:p>
       </dsp:txBody>
       <dsp:txXfrm>
-        <a:off x="63457" y="2373220"/>
-        <a:ext cx="3197576" cy="1918209"/>
+        <a:off x="42837" y="1549601"/>
+        <a:ext cx="5070121" cy="1252135"/>
       </dsp:txXfrm>
     </dsp:sp>
-    <dsp:sp modelId="{C3482519-EAE5-4F94-A27A-77F4E460E113}">
+    <dsp:sp modelId="{60097A8B-5568-4FBC-916D-575075825EAB}">
       <dsp:nvSpPr>
         <dsp:cNvPr id="0" name=""/>
         <dsp:cNvSpPr/>
       </dsp:nvSpPr>
       <dsp:spPr>
         <a:xfrm>
-          <a:off x="3599333" y="2313542"/>
-          <a:ext cx="3316932" cy="2037565"/>
+          <a:off x="3881" y="3020690"/>
+          <a:ext cx="2521074" cy="1330047"/>
         </a:xfrm>
         <a:prstGeom prst="roundRect">
           <a:avLst>
@@ -17030,12 +17270,12 @@
         </a:fontRef>
       </dsp:style>
       <dsp:txBody>
-        <a:bodyPr spcFirstLastPara="0" vert="horz" wrap="square" lIns="179070" tIns="179070" rIns="179070" bIns="179070" numCol="1" spcCol="1270" anchor="ctr" anchorCtr="0">
+        <a:bodyPr spcFirstLastPara="0" vert="horz" wrap="square" lIns="137160" tIns="137160" rIns="137160" bIns="137160" numCol="1" spcCol="1270" anchor="ctr" anchorCtr="0">
           <a:noAutofit/>
         </a:bodyPr>
         <a:lstStyle/>
         <a:p>
-          <a:pPr marL="0" lvl="0" indent="0" algn="ctr" defTabSz="2089150">
+          <a:pPr marL="0" lvl="0" indent="0" algn="ctr" defTabSz="1600200">
             <a:lnSpc>
               <a:spcPct val="90000"/>
             </a:lnSpc>
@@ -17048,26 +17288,25 @@
             <a:buNone/>
           </a:pPr>
           <a:r>
-            <a:rPr lang="de-DE" sz="4700" kern="1200" dirty="0" err="1"/>
-            <a:t>WireFrame</a:t>
+            <a:rPr lang="de-DE" sz="3600" kern="1200" dirty="0"/>
+            <a:t>HTML</a:t>
           </a:r>
-          <a:endParaRPr lang="de-DE" sz="4700" kern="1200" dirty="0"/>
         </a:p>
       </dsp:txBody>
       <dsp:txXfrm>
-        <a:off x="3659011" y="2373220"/>
-        <a:ext cx="3197576" cy="1918209"/>
+        <a:off x="42837" y="3059646"/>
+        <a:ext cx="2443162" cy="1252135"/>
       </dsp:txXfrm>
     </dsp:sp>
-    <dsp:sp modelId="{6AC255C2-61BA-42D6-954F-512C42364D51}">
+    <dsp:sp modelId="{D43B44A2-6CE7-4681-B3D9-CB8A666F1D0C}">
       <dsp:nvSpPr>
         <dsp:cNvPr id="0" name=""/>
         <dsp:cNvSpPr/>
       </dsp:nvSpPr>
       <dsp:spPr>
         <a:xfrm>
-          <a:off x="7194888" y="2313542"/>
-          <a:ext cx="3316932" cy="2037565"/>
+          <a:off x="2630840" y="3020690"/>
+          <a:ext cx="2521074" cy="1330047"/>
         </a:xfrm>
         <a:prstGeom prst="roundRect">
           <a:avLst>
@@ -17111,12 +17350,12 @@
         </a:fontRef>
       </dsp:style>
       <dsp:txBody>
-        <a:bodyPr spcFirstLastPara="0" vert="horz" wrap="square" lIns="179070" tIns="179070" rIns="179070" bIns="179070" numCol="1" spcCol="1270" anchor="ctr" anchorCtr="0">
+        <a:bodyPr spcFirstLastPara="0" vert="horz" wrap="square" lIns="137160" tIns="137160" rIns="137160" bIns="137160" numCol="1" spcCol="1270" anchor="ctr" anchorCtr="0">
           <a:noAutofit/>
         </a:bodyPr>
         <a:lstStyle/>
         <a:p>
-          <a:pPr marL="0" lvl="0" indent="0" algn="ctr" defTabSz="2089150">
+          <a:pPr marL="0" lvl="0" indent="0" algn="ctr" defTabSz="1600200">
             <a:lnSpc>
               <a:spcPct val="90000"/>
             </a:lnSpc>
@@ -17129,37 +17368,25 @@
             <a:buNone/>
           </a:pPr>
           <a:r>
-            <a:rPr lang="de-DE" sz="4700" kern="1200" dirty="0"/>
-            <a:t>HTML / CSS Umsetzung</a:t>
+            <a:rPr lang="de-DE" sz="3600" kern="1200" dirty="0"/>
+            <a:t>CSS</a:t>
           </a:r>
         </a:p>
       </dsp:txBody>
       <dsp:txXfrm>
-        <a:off x="7254566" y="2373220"/>
-        <a:ext cx="3197576" cy="1918209"/>
+        <a:off x="2669796" y="3059646"/>
+        <a:ext cx="2443162" cy="1252135"/>
       </dsp:txXfrm>
     </dsp:sp>
-  </dsp:spTree>
-</dsp:drawing>
-</file>
-
-<file path=ppt/diagrams/drawing3.xml><?xml version="1.0" encoding="utf-8"?>
-<dsp:drawing xmlns:dgm="http://schemas.openxmlformats.org/drawingml/2006/diagram" xmlns:dsp="http://schemas.microsoft.com/office/drawing/2008/diagram" xmlns:a="http://schemas.openxmlformats.org/drawingml/2006/main">
-  <dsp:spTree>
-    <dsp:nvGrpSpPr>
-      <dsp:cNvPr id="0" name=""/>
-      <dsp:cNvGrpSpPr/>
-    </dsp:nvGrpSpPr>
-    <dsp:grpSpPr/>
-    <dsp:sp modelId="{11BA99A9-BB38-4BAC-8F98-710E8D80418A}">
+    <dsp:sp modelId="{E691C4EA-E48E-43BD-A0E8-701801E40CF7}">
       <dsp:nvSpPr>
         <dsp:cNvPr id="0" name=""/>
         <dsp:cNvSpPr/>
       </dsp:nvSpPr>
       <dsp:spPr>
         <a:xfrm>
-          <a:off x="1699" y="230"/>
-          <a:ext cx="10512200" cy="2037565"/>
+          <a:off x="5363685" y="1510645"/>
+          <a:ext cx="5148033" cy="1330047"/>
         </a:xfrm>
         <a:prstGeom prst="roundRect">
           <a:avLst>
@@ -17203,12 +17430,12 @@
         </a:fontRef>
       </dsp:style>
       <dsp:txBody>
-        <a:bodyPr spcFirstLastPara="0" vert="horz" wrap="square" lIns="247650" tIns="247650" rIns="247650" bIns="247650" numCol="1" spcCol="1270" anchor="ctr" anchorCtr="0">
+        <a:bodyPr spcFirstLastPara="0" vert="horz" wrap="square" lIns="220980" tIns="220980" rIns="220980" bIns="220980" numCol="1" spcCol="1270" anchor="ctr" anchorCtr="0">
           <a:noAutofit/>
         </a:bodyPr>
         <a:lstStyle/>
         <a:p>
-          <a:pPr marL="0" lvl="0" indent="0" algn="ctr" defTabSz="2889250">
+          <a:pPr marL="0" lvl="0" indent="0" algn="ctr" defTabSz="2578100">
             <a:lnSpc>
               <a:spcPct val="90000"/>
             </a:lnSpc>
@@ -17221,26 +17448,25 @@
             <a:buNone/>
           </a:pPr>
           <a:r>
-            <a:rPr lang="de-DE" sz="6500" kern="1200"/>
-            <a:t>Datenbankkonzept</a:t>
+            <a:rPr lang="de-DE" sz="5800" kern="1200" dirty="0"/>
+            <a:t>Konzept</a:t>
           </a:r>
-          <a:endParaRPr lang="de-DE" sz="6500" kern="1200"/>
         </a:p>
       </dsp:txBody>
       <dsp:txXfrm>
-        <a:off x="61377" y="59908"/>
-        <a:ext cx="10392844" cy="1918209"/>
+        <a:off x="5402641" y="1549601"/>
+        <a:ext cx="5070121" cy="1252135"/>
       </dsp:txXfrm>
     </dsp:sp>
-    <dsp:sp modelId="{6B70D70C-EF4A-47DB-B009-FDEBA3A524F4}">
+    <dsp:sp modelId="{79DABC98-E30B-4D43-9D9B-EBB1E15DFF45}">
       <dsp:nvSpPr>
         <dsp:cNvPr id="0" name=""/>
         <dsp:cNvSpPr/>
       </dsp:nvSpPr>
       <dsp:spPr>
         <a:xfrm>
-          <a:off x="1699" y="2313542"/>
-          <a:ext cx="2472295" cy="2037565"/>
+          <a:off x="5363685" y="3020690"/>
+          <a:ext cx="2521074" cy="1330047"/>
         </a:xfrm>
         <a:prstGeom prst="roundRect">
           <a:avLst>
@@ -17284,12 +17510,12 @@
         </a:fontRef>
       </dsp:style>
       <dsp:txBody>
-        <a:bodyPr spcFirstLastPara="0" vert="horz" wrap="square" lIns="110490" tIns="110490" rIns="110490" bIns="110490" numCol="1" spcCol="1270" anchor="ctr" anchorCtr="0">
+        <a:bodyPr spcFirstLastPara="0" vert="horz" wrap="square" lIns="137160" tIns="137160" rIns="137160" bIns="137160" numCol="1" spcCol="1270" anchor="ctr" anchorCtr="0">
           <a:noAutofit/>
         </a:bodyPr>
         <a:lstStyle/>
         <a:p>
-          <a:pPr marL="0" lvl="0" indent="0" algn="ctr" defTabSz="1289050">
+          <a:pPr marL="0" lvl="0" indent="0" algn="ctr" defTabSz="1600200">
             <a:lnSpc>
               <a:spcPct val="90000"/>
             </a:lnSpc>
@@ -17302,25 +17528,26 @@
             <a:buNone/>
           </a:pPr>
           <a:r>
-            <a:rPr lang="de-DE" sz="2900" kern="1200" dirty="0"/>
-            <a:t>Analyse Datenhaltung</a:t>
+            <a:rPr lang="de-DE" sz="3600" kern="1200" dirty="0" err="1"/>
+            <a:t>MockUp</a:t>
           </a:r>
+          <a:endParaRPr lang="de-DE" sz="3600" kern="1200" dirty="0"/>
         </a:p>
       </dsp:txBody>
       <dsp:txXfrm>
-        <a:off x="61377" y="2373220"/>
-        <a:ext cx="2352939" cy="1918209"/>
+        <a:off x="5402641" y="3059646"/>
+        <a:ext cx="2443162" cy="1252135"/>
       </dsp:txXfrm>
     </dsp:sp>
-    <dsp:sp modelId="{77D0D594-A976-4F76-BB22-8AAF68AC054B}">
+    <dsp:sp modelId="{1D258615-A3E1-47DC-A6C2-09D2AFE3E8B9}">
       <dsp:nvSpPr>
         <dsp:cNvPr id="0" name=""/>
         <dsp:cNvSpPr/>
       </dsp:nvSpPr>
       <dsp:spPr>
         <a:xfrm>
-          <a:off x="2681667" y="2313542"/>
-          <a:ext cx="2472295" cy="2037565"/>
+          <a:off x="7990644" y="3020690"/>
+          <a:ext cx="2521074" cy="1330047"/>
         </a:xfrm>
         <a:prstGeom prst="roundRect">
           <a:avLst>
@@ -17364,12 +17591,12 @@
         </a:fontRef>
       </dsp:style>
       <dsp:txBody>
-        <a:bodyPr spcFirstLastPara="0" vert="horz" wrap="square" lIns="110490" tIns="110490" rIns="110490" bIns="110490" numCol="1" spcCol="1270" anchor="ctr" anchorCtr="0">
+        <a:bodyPr spcFirstLastPara="0" vert="horz" wrap="square" lIns="137160" tIns="137160" rIns="137160" bIns="137160" numCol="1" spcCol="1270" anchor="ctr" anchorCtr="0">
           <a:noAutofit/>
         </a:bodyPr>
         <a:lstStyle/>
         <a:p>
-          <a:pPr marL="0" lvl="0" indent="0" algn="ctr" defTabSz="1289050">
+          <a:pPr marL="0" lvl="0" indent="0" algn="ctr" defTabSz="1600200">
             <a:lnSpc>
               <a:spcPct val="90000"/>
             </a:lnSpc>
@@ -17382,25 +17609,38 @@
             <a:buNone/>
           </a:pPr>
           <a:r>
-            <a:rPr lang="de-DE" sz="2900" kern="1200" dirty="0"/>
-            <a:t>Erstellung ERM</a:t>
+            <a:rPr lang="de-DE" sz="3600" kern="1200" dirty="0" err="1"/>
+            <a:t>WireFrame</a:t>
           </a:r>
+          <a:endParaRPr lang="de-DE" sz="3600" kern="1200" dirty="0"/>
         </a:p>
       </dsp:txBody>
       <dsp:txXfrm>
-        <a:off x="2741345" y="2373220"/>
-        <a:ext cx="2352939" cy="1918209"/>
+        <a:off x="8029600" y="3059646"/>
+        <a:ext cx="2443162" cy="1252135"/>
       </dsp:txXfrm>
     </dsp:sp>
-    <dsp:sp modelId="{5F0CE19F-D7B0-4A05-8002-68E1CD3B36E7}">
+  </dsp:spTree>
+</dsp:drawing>
+</file>
+
+<file path=ppt/diagrams/drawing3.xml><?xml version="1.0" encoding="utf-8"?>
+<dsp:drawing xmlns:dgm="http://schemas.openxmlformats.org/drawingml/2006/diagram" xmlns:dsp="http://schemas.microsoft.com/office/drawing/2008/diagram" xmlns:a="http://schemas.openxmlformats.org/drawingml/2006/main">
+  <dsp:spTree>
+    <dsp:nvGrpSpPr>
+      <dsp:cNvPr id="0" name=""/>
+      <dsp:cNvGrpSpPr/>
+    </dsp:nvGrpSpPr>
+    <dsp:grpSpPr/>
+    <dsp:sp modelId="{11BA99A9-BB38-4BAC-8F98-710E8D80418A}">
       <dsp:nvSpPr>
         <dsp:cNvPr id="0" name=""/>
         <dsp:cNvSpPr/>
       </dsp:nvSpPr>
       <dsp:spPr>
         <a:xfrm>
-          <a:off x="5361636" y="2313542"/>
-          <a:ext cx="2472295" cy="2037565"/>
+          <a:off x="3881" y="600"/>
+          <a:ext cx="10507836" cy="1330047"/>
         </a:xfrm>
         <a:prstGeom prst="roundRect">
           <a:avLst>
@@ -17444,12 +17684,12 @@
         </a:fontRef>
       </dsp:style>
       <dsp:txBody>
-        <a:bodyPr spcFirstLastPara="0" vert="horz" wrap="square" lIns="110490" tIns="110490" rIns="110490" bIns="110490" numCol="1" spcCol="1270" anchor="ctr" anchorCtr="0">
+        <a:bodyPr spcFirstLastPara="0" vert="horz" wrap="square" lIns="220980" tIns="220980" rIns="220980" bIns="220980" numCol="1" spcCol="1270" anchor="ctr" anchorCtr="0">
           <a:noAutofit/>
         </a:bodyPr>
         <a:lstStyle/>
         <a:p>
-          <a:pPr marL="0" lvl="0" indent="0" algn="ctr" defTabSz="1289050">
+          <a:pPr marL="0" lvl="0" indent="0" algn="ctr" defTabSz="2578100">
             <a:lnSpc>
               <a:spcPct val="90000"/>
             </a:lnSpc>
@@ -17462,25 +17702,25 @@
             <a:buNone/>
           </a:pPr>
           <a:r>
-            <a:rPr lang="de-DE" sz="2900" kern="1200" dirty="0"/>
-            <a:t>Erstellung SQL</a:t>
+            <a:rPr lang="de-DE" sz="5800" kern="1200" dirty="0"/>
+            <a:t>Datenbankkonzept</a:t>
           </a:r>
         </a:p>
       </dsp:txBody>
       <dsp:txXfrm>
-        <a:off x="5421314" y="2373220"/>
-        <a:ext cx="2352939" cy="1918209"/>
+        <a:off x="42837" y="39556"/>
+        <a:ext cx="10429924" cy="1252135"/>
       </dsp:txXfrm>
     </dsp:sp>
-    <dsp:sp modelId="{2FB4CB63-03B6-4728-9DF5-A1CB7309B6C8}">
+    <dsp:sp modelId="{C4D0CBCA-A900-42C4-9CB8-9544DB8FC493}">
       <dsp:nvSpPr>
         <dsp:cNvPr id="0" name=""/>
         <dsp:cNvSpPr/>
       </dsp:nvSpPr>
       <dsp:spPr>
         <a:xfrm>
-          <a:off x="8041604" y="2313542"/>
-          <a:ext cx="2472295" cy="2037565"/>
+          <a:off x="3881" y="1510645"/>
+          <a:ext cx="5148033" cy="1330047"/>
         </a:xfrm>
         <a:prstGeom prst="roundRect">
           <a:avLst>
@@ -17524,12 +17764,12 @@
         </a:fontRef>
       </dsp:style>
       <dsp:txBody>
-        <a:bodyPr spcFirstLastPara="0" vert="horz" wrap="square" lIns="110490" tIns="110490" rIns="110490" bIns="110490" numCol="1" spcCol="1270" anchor="ctr" anchorCtr="0">
+        <a:bodyPr spcFirstLastPara="0" vert="horz" wrap="square" lIns="190500" tIns="190500" rIns="190500" bIns="190500" numCol="1" spcCol="1270" anchor="ctr" anchorCtr="0">
           <a:noAutofit/>
         </a:bodyPr>
         <a:lstStyle/>
         <a:p>
-          <a:pPr marL="0" lvl="0" indent="0" algn="ctr" defTabSz="1289050">
+          <a:pPr marL="0" lvl="0" indent="0" algn="ctr" defTabSz="2222500">
             <a:lnSpc>
               <a:spcPct val="90000"/>
             </a:lnSpc>
@@ -17542,14 +17782,414 @@
             <a:buNone/>
           </a:pPr>
           <a:r>
-            <a:rPr lang="de-DE" sz="2900" kern="1200" dirty="0"/>
-            <a:t>SQL Abfragen</a:t>
+            <a:rPr lang="de-DE" sz="5000" kern="1200" dirty="0"/>
+            <a:t>Konzept / Analyse</a:t>
           </a:r>
         </a:p>
       </dsp:txBody>
       <dsp:txXfrm>
-        <a:off x="8101282" y="2373220"/>
-        <a:ext cx="2352939" cy="1918209"/>
+        <a:off x="42837" y="1549601"/>
+        <a:ext cx="5070121" cy="1252135"/>
+      </dsp:txXfrm>
+    </dsp:sp>
+    <dsp:sp modelId="{DCA89DAD-7D14-4B33-9BB1-39033B6780C1}">
+      <dsp:nvSpPr>
+        <dsp:cNvPr id="0" name=""/>
+        <dsp:cNvSpPr/>
+      </dsp:nvSpPr>
+      <dsp:spPr>
+        <a:xfrm>
+          <a:off x="3881" y="3020690"/>
+          <a:ext cx="2521074" cy="1330047"/>
+        </a:xfrm>
+        <a:prstGeom prst="roundRect">
+          <a:avLst>
+            <a:gd name="adj" fmla="val 10000"/>
+          </a:avLst>
+        </a:prstGeom>
+        <a:solidFill>
+          <a:schemeClr val="accent1">
+            <a:hueOff val="0"/>
+            <a:satOff val="0"/>
+            <a:lumOff val="0"/>
+            <a:alphaOff val="0"/>
+          </a:schemeClr>
+        </a:solidFill>
+        <a:ln w="12700" cap="flat" cmpd="sng" algn="ctr">
+          <a:solidFill>
+            <a:schemeClr val="lt1">
+              <a:hueOff val="0"/>
+              <a:satOff val="0"/>
+              <a:lumOff val="0"/>
+              <a:alphaOff val="0"/>
+            </a:schemeClr>
+          </a:solidFill>
+          <a:prstDash val="solid"/>
+          <a:miter lim="800000"/>
+        </a:ln>
+        <a:effectLst/>
+      </dsp:spPr>
+      <dsp:style>
+        <a:lnRef idx="2">
+          <a:scrgbClr r="0" g="0" b="0"/>
+        </a:lnRef>
+        <a:fillRef idx="1">
+          <a:scrgbClr r="0" g="0" b="0"/>
+        </a:fillRef>
+        <a:effectRef idx="0">
+          <a:scrgbClr r="0" g="0" b="0"/>
+        </a:effectRef>
+        <a:fontRef idx="minor">
+          <a:schemeClr val="lt1"/>
+        </a:fontRef>
+      </dsp:style>
+      <dsp:txBody>
+        <a:bodyPr spcFirstLastPara="0" vert="horz" wrap="square" lIns="95250" tIns="95250" rIns="95250" bIns="95250" numCol="1" spcCol="1270" anchor="ctr" anchorCtr="0">
+          <a:noAutofit/>
+        </a:bodyPr>
+        <a:lstStyle/>
+        <a:p>
+          <a:pPr marL="0" lvl="0" indent="0" algn="ctr" defTabSz="1111250">
+            <a:lnSpc>
+              <a:spcPct val="90000"/>
+            </a:lnSpc>
+            <a:spcBef>
+              <a:spcPct val="0"/>
+            </a:spcBef>
+            <a:spcAft>
+              <a:spcPct val="35000"/>
+            </a:spcAft>
+            <a:buNone/>
+          </a:pPr>
+          <a:r>
+            <a:rPr lang="de-DE" sz="2500" kern="1200" dirty="0"/>
+            <a:t>Erstellung ERM</a:t>
+          </a:r>
+        </a:p>
+      </dsp:txBody>
+      <dsp:txXfrm>
+        <a:off x="42837" y="3059646"/>
+        <a:ext cx="2443162" cy="1252135"/>
+      </dsp:txXfrm>
+    </dsp:sp>
+    <dsp:sp modelId="{C1F43AFC-F18B-4DD8-9577-9434DCD3C50A}">
+      <dsp:nvSpPr>
+        <dsp:cNvPr id="0" name=""/>
+        <dsp:cNvSpPr/>
+      </dsp:nvSpPr>
+      <dsp:spPr>
+        <a:xfrm>
+          <a:off x="2630840" y="3020690"/>
+          <a:ext cx="2521074" cy="1330047"/>
+        </a:xfrm>
+        <a:prstGeom prst="roundRect">
+          <a:avLst>
+            <a:gd name="adj" fmla="val 10000"/>
+          </a:avLst>
+        </a:prstGeom>
+        <a:solidFill>
+          <a:schemeClr val="accent1">
+            <a:hueOff val="0"/>
+            <a:satOff val="0"/>
+            <a:lumOff val="0"/>
+            <a:alphaOff val="0"/>
+          </a:schemeClr>
+        </a:solidFill>
+        <a:ln w="12700" cap="flat" cmpd="sng" algn="ctr">
+          <a:solidFill>
+            <a:schemeClr val="lt1">
+              <a:hueOff val="0"/>
+              <a:satOff val="0"/>
+              <a:lumOff val="0"/>
+              <a:alphaOff val="0"/>
+            </a:schemeClr>
+          </a:solidFill>
+          <a:prstDash val="solid"/>
+          <a:miter lim="800000"/>
+        </a:ln>
+        <a:effectLst/>
+      </dsp:spPr>
+      <dsp:style>
+        <a:lnRef idx="2">
+          <a:scrgbClr r="0" g="0" b="0"/>
+        </a:lnRef>
+        <a:fillRef idx="1">
+          <a:scrgbClr r="0" g="0" b="0"/>
+        </a:fillRef>
+        <a:effectRef idx="0">
+          <a:scrgbClr r="0" g="0" b="0"/>
+        </a:effectRef>
+        <a:fontRef idx="minor">
+          <a:schemeClr val="lt1"/>
+        </a:fontRef>
+      </dsp:style>
+      <dsp:txBody>
+        <a:bodyPr spcFirstLastPara="0" vert="horz" wrap="square" lIns="95250" tIns="95250" rIns="95250" bIns="95250" numCol="1" spcCol="1270" anchor="ctr" anchorCtr="0">
+          <a:noAutofit/>
+        </a:bodyPr>
+        <a:lstStyle/>
+        <a:p>
+          <a:pPr marL="0" lvl="0" indent="0" algn="ctr" defTabSz="1111250">
+            <a:lnSpc>
+              <a:spcPct val="90000"/>
+            </a:lnSpc>
+            <a:spcBef>
+              <a:spcPct val="0"/>
+            </a:spcBef>
+            <a:spcAft>
+              <a:spcPct val="35000"/>
+            </a:spcAft>
+            <a:buNone/>
+          </a:pPr>
+          <a:r>
+            <a:rPr lang="de-DE" sz="2500" kern="1200" dirty="0"/>
+            <a:t> Analyse Datenhaltung</a:t>
+          </a:r>
+        </a:p>
+      </dsp:txBody>
+      <dsp:txXfrm>
+        <a:off x="2669796" y="3059646"/>
+        <a:ext cx="2443162" cy="1252135"/>
+      </dsp:txXfrm>
+    </dsp:sp>
+    <dsp:sp modelId="{6B70D70C-EF4A-47DB-B009-FDEBA3A524F4}">
+      <dsp:nvSpPr>
+        <dsp:cNvPr id="0" name=""/>
+        <dsp:cNvSpPr/>
+      </dsp:nvSpPr>
+      <dsp:spPr>
+        <a:xfrm>
+          <a:off x="5363685" y="1510645"/>
+          <a:ext cx="5148033" cy="1330047"/>
+        </a:xfrm>
+        <a:prstGeom prst="roundRect">
+          <a:avLst>
+            <a:gd name="adj" fmla="val 10000"/>
+          </a:avLst>
+        </a:prstGeom>
+        <a:solidFill>
+          <a:schemeClr val="accent1">
+            <a:hueOff val="0"/>
+            <a:satOff val="0"/>
+            <a:lumOff val="0"/>
+            <a:alphaOff val="0"/>
+          </a:schemeClr>
+        </a:solidFill>
+        <a:ln w="12700" cap="flat" cmpd="sng" algn="ctr">
+          <a:solidFill>
+            <a:schemeClr val="lt1">
+              <a:hueOff val="0"/>
+              <a:satOff val="0"/>
+              <a:lumOff val="0"/>
+              <a:alphaOff val="0"/>
+            </a:schemeClr>
+          </a:solidFill>
+          <a:prstDash val="solid"/>
+          <a:miter lim="800000"/>
+        </a:ln>
+        <a:effectLst/>
+      </dsp:spPr>
+      <dsp:style>
+        <a:lnRef idx="2">
+          <a:scrgbClr r="0" g="0" b="0"/>
+        </a:lnRef>
+        <a:fillRef idx="1">
+          <a:scrgbClr r="0" g="0" b="0"/>
+        </a:fillRef>
+        <a:effectRef idx="0">
+          <a:scrgbClr r="0" g="0" b="0"/>
+        </a:effectRef>
+        <a:fontRef idx="minor">
+          <a:schemeClr val="lt1"/>
+        </a:fontRef>
+      </dsp:style>
+      <dsp:txBody>
+        <a:bodyPr spcFirstLastPara="0" vert="horz" wrap="square" lIns="190500" tIns="190500" rIns="190500" bIns="190500" numCol="1" spcCol="1270" anchor="ctr" anchorCtr="0">
+          <a:noAutofit/>
+        </a:bodyPr>
+        <a:lstStyle/>
+        <a:p>
+          <a:pPr marL="0" lvl="0" indent="0" algn="ctr" defTabSz="2222500">
+            <a:lnSpc>
+              <a:spcPct val="90000"/>
+            </a:lnSpc>
+            <a:spcBef>
+              <a:spcPct val="0"/>
+            </a:spcBef>
+            <a:spcAft>
+              <a:spcPct val="35000"/>
+            </a:spcAft>
+            <a:buNone/>
+          </a:pPr>
+          <a:r>
+            <a:rPr lang="de-DE" sz="5000" kern="1200" dirty="0"/>
+            <a:t>Umsetzung</a:t>
+          </a:r>
+        </a:p>
+      </dsp:txBody>
+      <dsp:txXfrm>
+        <a:off x="5402641" y="1549601"/>
+        <a:ext cx="5070121" cy="1252135"/>
+      </dsp:txXfrm>
+    </dsp:sp>
+    <dsp:sp modelId="{14EAB66A-1CF3-4287-9A42-298DAF92A41B}">
+      <dsp:nvSpPr>
+        <dsp:cNvPr id="0" name=""/>
+        <dsp:cNvSpPr/>
+      </dsp:nvSpPr>
+      <dsp:spPr>
+        <a:xfrm>
+          <a:off x="5363685" y="3020690"/>
+          <a:ext cx="2521074" cy="1330047"/>
+        </a:xfrm>
+        <a:prstGeom prst="roundRect">
+          <a:avLst>
+            <a:gd name="adj" fmla="val 10000"/>
+          </a:avLst>
+        </a:prstGeom>
+        <a:solidFill>
+          <a:schemeClr val="accent1">
+            <a:hueOff val="0"/>
+            <a:satOff val="0"/>
+            <a:lumOff val="0"/>
+            <a:alphaOff val="0"/>
+          </a:schemeClr>
+        </a:solidFill>
+        <a:ln w="12700" cap="flat" cmpd="sng" algn="ctr">
+          <a:solidFill>
+            <a:schemeClr val="lt1">
+              <a:hueOff val="0"/>
+              <a:satOff val="0"/>
+              <a:lumOff val="0"/>
+              <a:alphaOff val="0"/>
+            </a:schemeClr>
+          </a:solidFill>
+          <a:prstDash val="solid"/>
+          <a:miter lim="800000"/>
+        </a:ln>
+        <a:effectLst/>
+      </dsp:spPr>
+      <dsp:style>
+        <a:lnRef idx="2">
+          <a:scrgbClr r="0" g="0" b="0"/>
+        </a:lnRef>
+        <a:fillRef idx="1">
+          <a:scrgbClr r="0" g="0" b="0"/>
+        </a:fillRef>
+        <a:effectRef idx="0">
+          <a:scrgbClr r="0" g="0" b="0"/>
+        </a:effectRef>
+        <a:fontRef idx="minor">
+          <a:schemeClr val="lt1"/>
+        </a:fontRef>
+      </dsp:style>
+      <dsp:txBody>
+        <a:bodyPr spcFirstLastPara="0" vert="horz" wrap="square" lIns="95250" tIns="95250" rIns="95250" bIns="95250" numCol="1" spcCol="1270" anchor="ctr" anchorCtr="0">
+          <a:noAutofit/>
+        </a:bodyPr>
+        <a:lstStyle/>
+        <a:p>
+          <a:pPr marL="0" lvl="0" indent="0" algn="ctr" defTabSz="1111250">
+            <a:lnSpc>
+              <a:spcPct val="90000"/>
+            </a:lnSpc>
+            <a:spcBef>
+              <a:spcPct val="0"/>
+            </a:spcBef>
+            <a:spcAft>
+              <a:spcPct val="35000"/>
+            </a:spcAft>
+            <a:buNone/>
+          </a:pPr>
+          <a:r>
+            <a:rPr lang="de-DE" sz="2500" kern="1200" dirty="0"/>
+            <a:t>SQL Tabellen</a:t>
+          </a:r>
+        </a:p>
+      </dsp:txBody>
+      <dsp:txXfrm>
+        <a:off x="5402641" y="3059646"/>
+        <a:ext cx="2443162" cy="1252135"/>
+      </dsp:txXfrm>
+    </dsp:sp>
+    <dsp:sp modelId="{20F84B83-FF4B-4632-B676-4F44D91F6204}">
+      <dsp:nvSpPr>
+        <dsp:cNvPr id="0" name=""/>
+        <dsp:cNvSpPr/>
+      </dsp:nvSpPr>
+      <dsp:spPr>
+        <a:xfrm>
+          <a:off x="7990644" y="3020690"/>
+          <a:ext cx="2521074" cy="1330047"/>
+        </a:xfrm>
+        <a:prstGeom prst="roundRect">
+          <a:avLst>
+            <a:gd name="adj" fmla="val 10000"/>
+          </a:avLst>
+        </a:prstGeom>
+        <a:solidFill>
+          <a:schemeClr val="accent1">
+            <a:hueOff val="0"/>
+            <a:satOff val="0"/>
+            <a:lumOff val="0"/>
+            <a:alphaOff val="0"/>
+          </a:schemeClr>
+        </a:solidFill>
+        <a:ln w="12700" cap="flat" cmpd="sng" algn="ctr">
+          <a:solidFill>
+            <a:schemeClr val="lt1">
+              <a:hueOff val="0"/>
+              <a:satOff val="0"/>
+              <a:lumOff val="0"/>
+              <a:alphaOff val="0"/>
+            </a:schemeClr>
+          </a:solidFill>
+          <a:prstDash val="solid"/>
+          <a:miter lim="800000"/>
+        </a:ln>
+        <a:effectLst/>
+      </dsp:spPr>
+      <dsp:style>
+        <a:lnRef idx="2">
+          <a:scrgbClr r="0" g="0" b="0"/>
+        </a:lnRef>
+        <a:fillRef idx="1">
+          <a:scrgbClr r="0" g="0" b="0"/>
+        </a:fillRef>
+        <a:effectRef idx="0">
+          <a:scrgbClr r="0" g="0" b="0"/>
+        </a:effectRef>
+        <a:fontRef idx="minor">
+          <a:schemeClr val="lt1"/>
+        </a:fontRef>
+      </dsp:style>
+      <dsp:txBody>
+        <a:bodyPr spcFirstLastPara="0" vert="horz" wrap="square" lIns="95250" tIns="95250" rIns="95250" bIns="95250" numCol="1" spcCol="1270" anchor="ctr" anchorCtr="0">
+          <a:noAutofit/>
+        </a:bodyPr>
+        <a:lstStyle/>
+        <a:p>
+          <a:pPr marL="0" lvl="0" indent="0" algn="ctr" defTabSz="1111250">
+            <a:lnSpc>
+              <a:spcPct val="90000"/>
+            </a:lnSpc>
+            <a:spcBef>
+              <a:spcPct val="0"/>
+            </a:spcBef>
+            <a:spcAft>
+              <a:spcPct val="35000"/>
+            </a:spcAft>
+            <a:buNone/>
+          </a:pPr>
+          <a:r>
+            <a:rPr lang="de-DE" sz="2500" kern="1200" dirty="0"/>
+            <a:t>SQL Programmierung</a:t>
+          </a:r>
+        </a:p>
+      </dsp:txBody>
+      <dsp:txXfrm>
+        <a:off x="8029600" y="3059646"/>
+        <a:ext cx="2443162" cy="1252135"/>
       </dsp:txXfrm>
     </dsp:sp>
   </dsp:spTree>
@@ -17637,7 +18277,6 @@
             <a:rPr lang="de-DE" sz="6500" kern="1200"/>
             <a:t>Backend</a:t>
           </a:r>
-          <a:endParaRPr lang="de-DE" sz="6500" kern="1200"/>
         </a:p>
       </dsp:txBody>
       <dsp:txXfrm>
@@ -18382,7 +19021,6 @@
             <a:rPr lang="de-DE" sz="6500" kern="1200"/>
             <a:t>Initialisierung</a:t>
           </a:r>
-          <a:endParaRPr lang="de-DE" sz="6500" kern="1200"/>
         </a:p>
       </dsp:txBody>
       <dsp:txXfrm>
@@ -18715,7 +19353,6 @@
             <a:rPr lang="de-DE" sz="6500" kern="1200"/>
             <a:t>Definition</a:t>
           </a:r>
-          <a:endParaRPr lang="de-DE" sz="6500" kern="1200"/>
         </a:p>
       </dsp:txBody>
       <dsp:txXfrm>
@@ -19290,7 +19927,6 @@
             <a:rPr lang="de-DE" sz="6500" kern="1200"/>
             <a:t>Planung</a:t>
           </a:r>
-          <a:endParaRPr lang="de-DE" sz="6500" kern="1200"/>
         </a:p>
       </dsp:txBody>
       <dsp:txXfrm>
@@ -19703,7 +20339,6 @@
             <a:rPr lang="de-DE" sz="6500" kern="1200"/>
             <a:t>Steuerung</a:t>
           </a:r>
-          <a:endParaRPr lang="de-DE" sz="6500" kern="1200"/>
         </a:p>
       </dsp:txBody>
       <dsp:txXfrm>
@@ -35720,7 +36355,6 @@
               <a:rPr lang="de-DE"/>
               <a:t>Titelmasterformat durch Klicken bearbeiten</a:t>
             </a:r>
-            <a:endParaRPr lang="de-DE"/>
           </a:p>
         </p:txBody>
       </p:sp>
@@ -35785,7 +36419,6 @@
               <a:rPr lang="de-DE"/>
               <a:t>Formatvorlage des Untertitelmasters durch Klicken bearbeiten</a:t>
             </a:r>
-            <a:endParaRPr lang="de-DE"/>
           </a:p>
         </p:txBody>
       </p:sp>
@@ -35806,7 +36439,7 @@
           <a:p>
             <a:fld id="{E4214342-2956-4866-891E-4E409F84F277}" type="datetimeFigureOut">
               <a:rPr lang="de-DE" smtClean="0"/>
-              <a:t>12.07.2016</a:t>
+              <a:t>18.07.2016</a:t>
             </a:fld>
             <a:endParaRPr lang="de-DE"/>
           </a:p>
@@ -35903,7 +36536,6 @@
               <a:rPr lang="de-DE"/>
               <a:t>Titelmasterformat durch Klicken bearbeiten</a:t>
             </a:r>
-            <a:endParaRPr lang="de-DE"/>
           </a:p>
         </p:txBody>
       </p:sp>
@@ -35955,7 +36587,6 @@
               <a:rPr lang="de-DE"/>
               <a:t>Fünfte Ebene</a:t>
             </a:r>
-            <a:endParaRPr lang="de-DE"/>
           </a:p>
         </p:txBody>
       </p:sp>
@@ -35976,7 +36607,7 @@
           <a:p>
             <a:fld id="{E4214342-2956-4866-891E-4E409F84F277}" type="datetimeFigureOut">
               <a:rPr lang="de-DE" smtClean="0"/>
-              <a:t>12.07.2016</a:t>
+              <a:t>18.07.2016</a:t>
             </a:fld>
             <a:endParaRPr lang="de-DE"/>
           </a:p>
@@ -36078,7 +36709,6 @@
               <a:rPr lang="de-DE"/>
               <a:t>Titelmasterformat durch Klicken bearbeiten</a:t>
             </a:r>
-            <a:endParaRPr lang="de-DE"/>
           </a:p>
         </p:txBody>
       </p:sp>
@@ -36135,7 +36765,6 @@
               <a:rPr lang="de-DE"/>
               <a:t>Fünfte Ebene</a:t>
             </a:r>
-            <a:endParaRPr lang="de-DE"/>
           </a:p>
         </p:txBody>
       </p:sp>
@@ -36156,7 +36785,7 @@
           <a:p>
             <a:fld id="{E4214342-2956-4866-891E-4E409F84F277}" type="datetimeFigureOut">
               <a:rPr lang="de-DE" smtClean="0"/>
-              <a:t>12.07.2016</a:t>
+              <a:t>18.07.2016</a:t>
             </a:fld>
             <a:endParaRPr lang="de-DE"/>
           </a:p>
@@ -36253,7 +36882,6 @@
               <a:rPr lang="de-DE"/>
               <a:t>Titelmasterformat durch Klicken bearbeiten</a:t>
             </a:r>
-            <a:endParaRPr lang="de-DE"/>
           </a:p>
         </p:txBody>
       </p:sp>
@@ -36305,7 +36933,6 @@
               <a:rPr lang="de-DE"/>
               <a:t>Fünfte Ebene</a:t>
             </a:r>
-            <a:endParaRPr lang="de-DE"/>
           </a:p>
         </p:txBody>
       </p:sp>
@@ -36326,7 +36953,7 @@
           <a:p>
             <a:fld id="{E4214342-2956-4866-891E-4E409F84F277}" type="datetimeFigureOut">
               <a:rPr lang="de-DE" smtClean="0"/>
-              <a:t>12.07.2016</a:t>
+              <a:t>18.07.2016</a:t>
             </a:fld>
             <a:endParaRPr lang="de-DE"/>
           </a:p>
@@ -36432,7 +37059,6 @@
               <a:rPr lang="de-DE"/>
               <a:t>Titelmasterformat durch Klicken bearbeiten</a:t>
             </a:r>
-            <a:endParaRPr lang="de-DE"/>
           </a:p>
         </p:txBody>
       </p:sp>
@@ -36572,7 +37198,7 @@
           <a:p>
             <a:fld id="{E4214342-2956-4866-891E-4E409F84F277}" type="datetimeFigureOut">
               <a:rPr lang="de-DE" smtClean="0"/>
-              <a:t>12.07.2016</a:t>
+              <a:t>18.07.2016</a:t>
             </a:fld>
             <a:endParaRPr lang="de-DE"/>
           </a:p>
@@ -36669,7 +37295,6 @@
               <a:rPr lang="de-DE"/>
               <a:t>Titelmasterformat durch Klicken bearbeiten</a:t>
             </a:r>
-            <a:endParaRPr lang="de-DE"/>
           </a:p>
         </p:txBody>
       </p:sp>
@@ -36726,7 +37351,6 @@
               <a:rPr lang="de-DE"/>
               <a:t>Fünfte Ebene</a:t>
             </a:r>
-            <a:endParaRPr lang="de-DE"/>
           </a:p>
         </p:txBody>
       </p:sp>
@@ -36783,7 +37407,6 @@
               <a:rPr lang="de-DE"/>
               <a:t>Fünfte Ebene</a:t>
             </a:r>
-            <a:endParaRPr lang="de-DE"/>
           </a:p>
         </p:txBody>
       </p:sp>
@@ -36804,7 +37427,7 @@
           <a:p>
             <a:fld id="{E4214342-2956-4866-891E-4E409F84F277}" type="datetimeFigureOut">
               <a:rPr lang="de-DE" smtClean="0"/>
-              <a:t>12.07.2016</a:t>
+              <a:t>18.07.2016</a:t>
             </a:fld>
             <a:endParaRPr lang="de-DE"/>
           </a:p>
@@ -36906,7 +37529,6 @@
               <a:rPr lang="de-DE"/>
               <a:t>Titelmasterformat durch Klicken bearbeiten</a:t>
             </a:r>
-            <a:endParaRPr lang="de-DE"/>
           </a:p>
         </p:txBody>
       </p:sp>
@@ -37028,7 +37650,6 @@
               <a:rPr lang="de-DE"/>
               <a:t>Fünfte Ebene</a:t>
             </a:r>
-            <a:endParaRPr lang="de-DE"/>
           </a:p>
         </p:txBody>
       </p:sp>
@@ -37150,7 +37771,6 @@
               <a:rPr lang="de-DE"/>
               <a:t>Fünfte Ebene</a:t>
             </a:r>
-            <a:endParaRPr lang="de-DE"/>
           </a:p>
         </p:txBody>
       </p:sp>
@@ -37171,7 +37791,7 @@
           <a:p>
             <a:fld id="{E4214342-2956-4866-891E-4E409F84F277}" type="datetimeFigureOut">
               <a:rPr lang="de-DE" smtClean="0"/>
-              <a:t>12.07.2016</a:t>
+              <a:t>18.07.2016</a:t>
             </a:fld>
             <a:endParaRPr lang="de-DE"/>
           </a:p>
@@ -37268,7 +37888,6 @@
               <a:rPr lang="de-DE"/>
               <a:t>Titelmasterformat durch Klicken bearbeiten</a:t>
             </a:r>
-            <a:endParaRPr lang="de-DE"/>
           </a:p>
         </p:txBody>
       </p:sp>
@@ -37289,7 +37908,7 @@
           <a:p>
             <a:fld id="{E4214342-2956-4866-891E-4E409F84F277}" type="datetimeFigureOut">
               <a:rPr lang="de-DE" smtClean="0"/>
-              <a:t>12.07.2016</a:t>
+              <a:t>18.07.2016</a:t>
             </a:fld>
             <a:endParaRPr lang="de-DE"/>
           </a:p>
@@ -37384,7 +38003,7 @@
           <a:p>
             <a:fld id="{E4214342-2956-4866-891E-4E409F84F277}" type="datetimeFigureOut">
               <a:rPr lang="de-DE" smtClean="0"/>
-              <a:t>12.07.2016</a:t>
+              <a:t>18.07.2016</a:t>
             </a:fld>
             <a:endParaRPr lang="de-DE"/>
           </a:p>
@@ -37490,7 +38109,6 @@
               <a:rPr lang="de-DE"/>
               <a:t>Titelmasterformat durch Klicken bearbeiten</a:t>
             </a:r>
-            <a:endParaRPr lang="de-DE"/>
           </a:p>
         </p:txBody>
       </p:sp>
@@ -37575,7 +38193,6 @@
               <a:rPr lang="de-DE"/>
               <a:t>Fünfte Ebene</a:t>
             </a:r>
-            <a:endParaRPr lang="de-DE"/>
           </a:p>
         </p:txBody>
       </p:sp>
@@ -37661,7 +38278,7 @@
           <a:p>
             <a:fld id="{E4214342-2956-4866-891E-4E409F84F277}" type="datetimeFigureOut">
               <a:rPr lang="de-DE" smtClean="0"/>
-              <a:t>12.07.2016</a:t>
+              <a:t>18.07.2016</a:t>
             </a:fld>
             <a:endParaRPr lang="de-DE"/>
           </a:p>
@@ -37767,7 +38384,6 @@
               <a:rPr lang="de-DE"/>
               <a:t>Titelmasterformat durch Klicken bearbeiten</a:t>
             </a:r>
-            <a:endParaRPr lang="de-DE"/>
           </a:p>
         </p:txBody>
       </p:sp>
@@ -37914,7 +38530,7 @@
           <a:p>
             <a:fld id="{E4214342-2956-4866-891E-4E409F84F277}" type="datetimeFigureOut">
               <a:rPr lang="de-DE" smtClean="0"/>
-              <a:t>12.07.2016</a:t>
+              <a:t>18.07.2016</a:t>
             </a:fld>
             <a:endParaRPr lang="de-DE"/>
           </a:p>
@@ -38026,7 +38642,6 @@
               <a:rPr lang="de-DE"/>
               <a:t>Titelmasterformat durch Klicken bearbeiten</a:t>
             </a:r>
-            <a:endParaRPr lang="de-DE"/>
           </a:p>
         </p:txBody>
       </p:sp>
@@ -38088,7 +38703,6 @@
               <a:rPr lang="de-DE"/>
               <a:t>Fünfte Ebene</a:t>
             </a:r>
-            <a:endParaRPr lang="de-DE"/>
           </a:p>
         </p:txBody>
       </p:sp>
@@ -38127,7 +38741,7 @@
           <a:p>
             <a:fld id="{E4214342-2956-4866-891E-4E409F84F277}" type="datetimeFigureOut">
               <a:rPr lang="de-DE" smtClean="0"/>
-              <a:t>12.07.2016</a:t>
+              <a:t>18.07.2016</a:t>
             </a:fld>
             <a:endParaRPr lang="de-DE"/>
           </a:p>
@@ -38887,7 +39501,7 @@
             <p:ph idx="1"/>
             <p:extLst>
               <p:ext uri="{D42A27DB-BD31-4B8C-83A1-F6EECF244321}">
-                <p14:modId xmlns:p14="http://schemas.microsoft.com/office/powerpoint/2010/main" val="1815094264"/>
+                <p14:modId xmlns:p14="http://schemas.microsoft.com/office/powerpoint/2010/main" val="255002155"/>
               </p:ext>
             </p:extLst>
           </p:nvPr>
@@ -38964,7 +39578,7 @@
             <p:ph idx="1"/>
             <p:extLst>
               <p:ext uri="{D42A27DB-BD31-4B8C-83A1-F6EECF244321}">
-                <p14:modId xmlns:p14="http://schemas.microsoft.com/office/powerpoint/2010/main" val="2247790160"/>
+                <p14:modId xmlns:p14="http://schemas.microsoft.com/office/powerpoint/2010/main" val="3790643206"/>
               </p:ext>
             </p:extLst>
           </p:nvPr>

</xml_diff>